<commit_message>
First update of the project plan presentation
Updated first draft of the presentation
</commit_message>
<xml_diff>
--- a/Presentations/Projectplan - planning and progress.pptx
+++ b/Presentations/Projectplan - planning and progress.pptx
@@ -4,15 +4,20 @@
   <p:sldMasterIdLst>
     <p:sldMasterId id="2147483660" r:id="rId1"/>
   </p:sldMasterIdLst>
+  <p:notesMasterIdLst>
+    <p:notesMasterId r:id="rId12"/>
+  </p:notesMasterIdLst>
   <p:sldIdLst>
     <p:sldId id="256" r:id="rId2"/>
     <p:sldId id="258" r:id="rId3"/>
     <p:sldId id="259" r:id="rId4"/>
-    <p:sldId id="261" r:id="rId5"/>
-    <p:sldId id="264" r:id="rId6"/>
-    <p:sldId id="263" r:id="rId7"/>
-    <p:sldId id="260" r:id="rId8"/>
-    <p:sldId id="262" r:id="rId9"/>
+    <p:sldId id="264" r:id="rId5"/>
+    <p:sldId id="263" r:id="rId6"/>
+    <p:sldId id="265" r:id="rId7"/>
+    <p:sldId id="262" r:id="rId8"/>
+    <p:sldId id="266" r:id="rId9"/>
+    <p:sldId id="260" r:id="rId10"/>
+    <p:sldId id="267" r:id="rId11"/>
   </p:sldIdLst>
   <p:sldSz cx="9144000" cy="6858000" type="screen4x3"/>
   <p:notesSz cx="6858000" cy="9144000"/>
@@ -112,6 +117,1403 @@
     </a:lvl9pPr>
   </p:defaultTextStyle>
 </p:presentation>
+</file>
+
+<file path=ppt/notesMasters/notesMaster1.xml><?xml version="1.0" encoding="utf-8"?>
+<p:notesMaster xmlns:a="http://schemas.openxmlformats.org/drawingml/2006/main" xmlns:r="http://schemas.openxmlformats.org/officeDocument/2006/relationships" xmlns:p="http://schemas.openxmlformats.org/presentationml/2006/main">
+  <p:cSld>
+    <p:bg>
+      <p:bgRef idx="1001">
+        <a:schemeClr val="bg1"/>
+      </p:bgRef>
+    </p:bg>
+    <p:spTree>
+      <p:nvGrpSpPr>
+        <p:cNvPr id="1" name=""/>
+        <p:cNvGrpSpPr/>
+        <p:nvPr/>
+      </p:nvGrpSpPr>
+      <p:grpSpPr>
+        <a:xfrm>
+          <a:off x="0" y="0"/>
+          <a:ext cx="0" cy="0"/>
+          <a:chOff x="0" y="0"/>
+          <a:chExt cx="0" cy="0"/>
+        </a:xfrm>
+      </p:grpSpPr>
+      <p:sp>
+        <p:nvSpPr>
+          <p:cNvPr id="2" name="Header Placeholder 1"/>
+          <p:cNvSpPr>
+            <a:spLocks noGrp="1"/>
+          </p:cNvSpPr>
+          <p:nvPr>
+            <p:ph type="hdr" sz="quarter"/>
+          </p:nvPr>
+        </p:nvSpPr>
+        <p:spPr>
+          <a:xfrm>
+            <a:off x="0" y="0"/>
+            <a:ext cx="2971800" cy="457200"/>
+          </a:xfrm>
+          <a:prstGeom prst="rect">
+            <a:avLst/>
+          </a:prstGeom>
+        </p:spPr>
+        <p:txBody>
+          <a:bodyPr vert="horz" lIns="91440" tIns="45720" rIns="91440" bIns="45720" rtlCol="0"/>
+          <a:lstStyle>
+            <a:lvl1pPr algn="l">
+              <a:defRPr sz="1200"/>
+            </a:lvl1pPr>
+          </a:lstStyle>
+          <a:p>
+            <a:endParaRPr lang="en-US"/>
+          </a:p>
+        </p:txBody>
+      </p:sp>
+      <p:sp>
+        <p:nvSpPr>
+          <p:cNvPr id="3" name="Date Placeholder 2"/>
+          <p:cNvSpPr>
+            <a:spLocks noGrp="1"/>
+          </p:cNvSpPr>
+          <p:nvPr>
+            <p:ph type="dt" idx="1"/>
+          </p:nvPr>
+        </p:nvSpPr>
+        <p:spPr>
+          <a:xfrm>
+            <a:off x="3884613" y="0"/>
+            <a:ext cx="2971800" cy="457200"/>
+          </a:xfrm>
+          <a:prstGeom prst="rect">
+            <a:avLst/>
+          </a:prstGeom>
+        </p:spPr>
+        <p:txBody>
+          <a:bodyPr vert="horz" lIns="91440" tIns="45720" rIns="91440" bIns="45720" rtlCol="0"/>
+          <a:lstStyle>
+            <a:lvl1pPr algn="r">
+              <a:defRPr sz="1200"/>
+            </a:lvl1pPr>
+          </a:lstStyle>
+          <a:p>
+            <a:fld id="{7D543C8F-D305-452D-B313-E2E0AE732763}" type="datetimeFigureOut">
+              <a:rPr lang="en-US" smtClean="0"/>
+              <a:t>3/3/2014</a:t>
+            </a:fld>
+            <a:endParaRPr lang="en-US"/>
+          </a:p>
+        </p:txBody>
+      </p:sp>
+      <p:sp>
+        <p:nvSpPr>
+          <p:cNvPr id="4" name="Slide Image Placeholder 3"/>
+          <p:cNvSpPr>
+            <a:spLocks noGrp="1" noRot="1" noChangeAspect="1"/>
+          </p:cNvSpPr>
+          <p:nvPr>
+            <p:ph type="sldImg" idx="2"/>
+          </p:nvPr>
+        </p:nvSpPr>
+        <p:spPr>
+          <a:xfrm>
+            <a:off x="1143000" y="685800"/>
+            <a:ext cx="4572000" cy="3429000"/>
+          </a:xfrm>
+          <a:prstGeom prst="rect">
+            <a:avLst/>
+          </a:prstGeom>
+          <a:noFill/>
+          <a:ln w="12700">
+            <a:solidFill>
+              <a:prstClr val="black"/>
+            </a:solidFill>
+          </a:ln>
+        </p:spPr>
+        <p:txBody>
+          <a:bodyPr vert="horz" lIns="91440" tIns="45720" rIns="91440" bIns="45720" rtlCol="0" anchor="ctr"/>
+          <a:lstStyle/>
+          <a:p>
+            <a:endParaRPr lang="en-US"/>
+          </a:p>
+        </p:txBody>
+      </p:sp>
+      <p:sp>
+        <p:nvSpPr>
+          <p:cNvPr id="5" name="Notes Placeholder 4"/>
+          <p:cNvSpPr>
+            <a:spLocks noGrp="1"/>
+          </p:cNvSpPr>
+          <p:nvPr>
+            <p:ph type="body" sz="quarter" idx="3"/>
+          </p:nvPr>
+        </p:nvSpPr>
+        <p:spPr>
+          <a:xfrm>
+            <a:off x="685800" y="4343400"/>
+            <a:ext cx="5486400" cy="4114800"/>
+          </a:xfrm>
+          <a:prstGeom prst="rect">
+            <a:avLst/>
+          </a:prstGeom>
+        </p:spPr>
+        <p:txBody>
+          <a:bodyPr vert="horz" lIns="91440" tIns="45720" rIns="91440" bIns="45720" rtlCol="0"/>
+          <a:lstStyle/>
+          <a:p>
+            <a:pPr lvl="0"/>
+            <a:r>
+              <a:rPr lang="en-US" smtClean="0"/>
+              <a:t>Click to edit Master text styles</a:t>
+            </a:r>
+          </a:p>
+          <a:p>
+            <a:pPr lvl="1"/>
+            <a:r>
+              <a:rPr lang="en-US" smtClean="0"/>
+              <a:t>Second level</a:t>
+            </a:r>
+          </a:p>
+          <a:p>
+            <a:pPr lvl="2"/>
+            <a:r>
+              <a:rPr lang="en-US" smtClean="0"/>
+              <a:t>Third level</a:t>
+            </a:r>
+          </a:p>
+          <a:p>
+            <a:pPr lvl="3"/>
+            <a:r>
+              <a:rPr lang="en-US" smtClean="0"/>
+              <a:t>Fourth level</a:t>
+            </a:r>
+          </a:p>
+          <a:p>
+            <a:pPr lvl="4"/>
+            <a:r>
+              <a:rPr lang="en-US" smtClean="0"/>
+              <a:t>Fifth level</a:t>
+            </a:r>
+            <a:endParaRPr lang="en-US"/>
+          </a:p>
+        </p:txBody>
+      </p:sp>
+      <p:sp>
+        <p:nvSpPr>
+          <p:cNvPr id="6" name="Footer Placeholder 5"/>
+          <p:cNvSpPr>
+            <a:spLocks noGrp="1"/>
+          </p:cNvSpPr>
+          <p:nvPr>
+            <p:ph type="ftr" sz="quarter" idx="4"/>
+          </p:nvPr>
+        </p:nvSpPr>
+        <p:spPr>
+          <a:xfrm>
+            <a:off x="0" y="8685213"/>
+            <a:ext cx="2971800" cy="457200"/>
+          </a:xfrm>
+          <a:prstGeom prst="rect">
+            <a:avLst/>
+          </a:prstGeom>
+        </p:spPr>
+        <p:txBody>
+          <a:bodyPr vert="horz" lIns="91440" tIns="45720" rIns="91440" bIns="45720" rtlCol="0" anchor="b"/>
+          <a:lstStyle>
+            <a:lvl1pPr algn="l">
+              <a:defRPr sz="1200"/>
+            </a:lvl1pPr>
+          </a:lstStyle>
+          <a:p>
+            <a:endParaRPr lang="en-US"/>
+          </a:p>
+        </p:txBody>
+      </p:sp>
+      <p:sp>
+        <p:nvSpPr>
+          <p:cNvPr id="7" name="Slide Number Placeholder 6"/>
+          <p:cNvSpPr>
+            <a:spLocks noGrp="1"/>
+          </p:cNvSpPr>
+          <p:nvPr>
+            <p:ph type="sldNum" sz="quarter" idx="5"/>
+          </p:nvPr>
+        </p:nvSpPr>
+        <p:spPr>
+          <a:xfrm>
+            <a:off x="3884613" y="8685213"/>
+            <a:ext cx="2971800" cy="457200"/>
+          </a:xfrm>
+          <a:prstGeom prst="rect">
+            <a:avLst/>
+          </a:prstGeom>
+        </p:spPr>
+        <p:txBody>
+          <a:bodyPr vert="horz" lIns="91440" tIns="45720" rIns="91440" bIns="45720" rtlCol="0" anchor="b"/>
+          <a:lstStyle>
+            <a:lvl1pPr algn="r">
+              <a:defRPr sz="1200"/>
+            </a:lvl1pPr>
+          </a:lstStyle>
+          <a:p>
+            <a:fld id="{99A3DC0A-0F13-4D73-8F44-7A783FA67ED0}" type="slidenum">
+              <a:rPr lang="en-US" smtClean="0"/>
+              <a:t>‹#›</a:t>
+            </a:fld>
+            <a:endParaRPr lang="en-US"/>
+          </a:p>
+        </p:txBody>
+      </p:sp>
+    </p:spTree>
+    <p:extLst>
+      <p:ext uri="{BB962C8B-B14F-4D97-AF65-F5344CB8AC3E}">
+        <p14:creationId xmlns:p14="http://schemas.microsoft.com/office/powerpoint/2010/main" val="1322677163"/>
+      </p:ext>
+    </p:extLst>
+  </p:cSld>
+  <p:clrMap bg1="lt1" tx1="dk1" bg2="lt2" tx2="dk2" accent1="accent1" accent2="accent2" accent3="accent3" accent4="accent4" accent5="accent5" accent6="accent6" hlink="hlink" folHlink="folHlink"/>
+  <p:notesStyle>
+    <a:lvl1pPr marL="0" algn="l" defTabSz="914400" rtl="0" eaLnBrk="1" latinLnBrk="0" hangingPunct="1">
+      <a:defRPr sz="1200" kern="1200">
+        <a:solidFill>
+          <a:schemeClr val="tx1"/>
+        </a:solidFill>
+        <a:latin typeface="+mn-lt"/>
+        <a:ea typeface="+mn-ea"/>
+        <a:cs typeface="+mn-cs"/>
+      </a:defRPr>
+    </a:lvl1pPr>
+    <a:lvl2pPr marL="457200" algn="l" defTabSz="914400" rtl="0" eaLnBrk="1" latinLnBrk="0" hangingPunct="1">
+      <a:defRPr sz="1200" kern="1200">
+        <a:solidFill>
+          <a:schemeClr val="tx1"/>
+        </a:solidFill>
+        <a:latin typeface="+mn-lt"/>
+        <a:ea typeface="+mn-ea"/>
+        <a:cs typeface="+mn-cs"/>
+      </a:defRPr>
+    </a:lvl2pPr>
+    <a:lvl3pPr marL="914400" algn="l" defTabSz="914400" rtl="0" eaLnBrk="1" latinLnBrk="0" hangingPunct="1">
+      <a:defRPr sz="1200" kern="1200">
+        <a:solidFill>
+          <a:schemeClr val="tx1"/>
+        </a:solidFill>
+        <a:latin typeface="+mn-lt"/>
+        <a:ea typeface="+mn-ea"/>
+        <a:cs typeface="+mn-cs"/>
+      </a:defRPr>
+    </a:lvl3pPr>
+    <a:lvl4pPr marL="1371600" algn="l" defTabSz="914400" rtl="0" eaLnBrk="1" latinLnBrk="0" hangingPunct="1">
+      <a:defRPr sz="1200" kern="1200">
+        <a:solidFill>
+          <a:schemeClr val="tx1"/>
+        </a:solidFill>
+        <a:latin typeface="+mn-lt"/>
+        <a:ea typeface="+mn-ea"/>
+        <a:cs typeface="+mn-cs"/>
+      </a:defRPr>
+    </a:lvl4pPr>
+    <a:lvl5pPr marL="1828800" algn="l" defTabSz="914400" rtl="0" eaLnBrk="1" latinLnBrk="0" hangingPunct="1">
+      <a:defRPr sz="1200" kern="1200">
+        <a:solidFill>
+          <a:schemeClr val="tx1"/>
+        </a:solidFill>
+        <a:latin typeface="+mn-lt"/>
+        <a:ea typeface="+mn-ea"/>
+        <a:cs typeface="+mn-cs"/>
+      </a:defRPr>
+    </a:lvl5pPr>
+    <a:lvl6pPr marL="2286000" algn="l" defTabSz="914400" rtl="0" eaLnBrk="1" latinLnBrk="0" hangingPunct="1">
+      <a:defRPr sz="1200" kern="1200">
+        <a:solidFill>
+          <a:schemeClr val="tx1"/>
+        </a:solidFill>
+        <a:latin typeface="+mn-lt"/>
+        <a:ea typeface="+mn-ea"/>
+        <a:cs typeface="+mn-cs"/>
+      </a:defRPr>
+    </a:lvl6pPr>
+    <a:lvl7pPr marL="2743200" algn="l" defTabSz="914400" rtl="0" eaLnBrk="1" latinLnBrk="0" hangingPunct="1">
+      <a:defRPr sz="1200" kern="1200">
+        <a:solidFill>
+          <a:schemeClr val="tx1"/>
+        </a:solidFill>
+        <a:latin typeface="+mn-lt"/>
+        <a:ea typeface="+mn-ea"/>
+        <a:cs typeface="+mn-cs"/>
+      </a:defRPr>
+    </a:lvl7pPr>
+    <a:lvl8pPr marL="3200400" algn="l" defTabSz="914400" rtl="0" eaLnBrk="1" latinLnBrk="0" hangingPunct="1">
+      <a:defRPr sz="1200" kern="1200">
+        <a:solidFill>
+          <a:schemeClr val="tx1"/>
+        </a:solidFill>
+        <a:latin typeface="+mn-lt"/>
+        <a:ea typeface="+mn-ea"/>
+        <a:cs typeface="+mn-cs"/>
+      </a:defRPr>
+    </a:lvl8pPr>
+    <a:lvl9pPr marL="3657600" algn="l" defTabSz="914400" rtl="0" eaLnBrk="1" latinLnBrk="0" hangingPunct="1">
+      <a:defRPr sz="1200" kern="1200">
+        <a:solidFill>
+          <a:schemeClr val="tx1"/>
+        </a:solidFill>
+        <a:latin typeface="+mn-lt"/>
+        <a:ea typeface="+mn-ea"/>
+        <a:cs typeface="+mn-cs"/>
+      </a:defRPr>
+    </a:lvl9pPr>
+  </p:notesStyle>
+</p:notesMaster>
+</file>
+
+<file path=ppt/notesSlides/notesSlide1.xml><?xml version="1.0" encoding="utf-8"?>
+<p:notes xmlns:a="http://schemas.openxmlformats.org/drawingml/2006/main" xmlns:r="http://schemas.openxmlformats.org/officeDocument/2006/relationships" xmlns:p="http://schemas.openxmlformats.org/presentationml/2006/main">
+  <p:cSld>
+    <p:spTree>
+      <p:nvGrpSpPr>
+        <p:cNvPr id="1" name=""/>
+        <p:cNvGrpSpPr/>
+        <p:nvPr/>
+      </p:nvGrpSpPr>
+      <p:grpSpPr>
+        <a:xfrm>
+          <a:off x="0" y="0"/>
+          <a:ext cx="0" cy="0"/>
+          <a:chOff x="0" y="0"/>
+          <a:chExt cx="0" cy="0"/>
+        </a:xfrm>
+      </p:grpSpPr>
+      <p:sp>
+        <p:nvSpPr>
+          <p:cNvPr id="2" name="Slide Image Placeholder 1"/>
+          <p:cNvSpPr>
+            <a:spLocks noGrp="1" noRot="1" noChangeAspect="1"/>
+          </p:cNvSpPr>
+          <p:nvPr>
+            <p:ph type="sldImg"/>
+          </p:nvPr>
+        </p:nvSpPr>
+        <p:spPr/>
+      </p:sp>
+      <p:sp>
+        <p:nvSpPr>
+          <p:cNvPr id="3" name="Notes Placeholder 2"/>
+          <p:cNvSpPr>
+            <a:spLocks noGrp="1"/>
+          </p:cNvSpPr>
+          <p:nvPr>
+            <p:ph type="body" idx="1"/>
+          </p:nvPr>
+        </p:nvSpPr>
+        <p:spPr/>
+        <p:txBody>
+          <a:bodyPr/>
+          <a:lstStyle/>
+          <a:p>
+            <a:r>
+              <a:rPr lang="en-US" baseline="0" dirty="0" smtClean="0"/>
+              <a:t>Hello everyone, I am Marcel van de </a:t>
+            </a:r>
+            <a:r>
+              <a:rPr lang="en-US" baseline="0" dirty="0" err="1" smtClean="0"/>
+              <a:t>Streek</a:t>
+            </a:r>
+            <a:r>
+              <a:rPr lang="en-US" baseline="0" dirty="0" smtClean="0"/>
+              <a:t>. I am the speaker for the Mango group.</a:t>
+            </a:r>
+          </a:p>
+          <a:p>
+            <a:r>
+              <a:rPr lang="en-US" baseline="0" dirty="0" smtClean="0"/>
+              <a:t>To show you our project plan, I will start with the background and how we progressed in the first few days.</a:t>
+            </a:r>
+          </a:p>
+          <a:p>
+            <a:r>
+              <a:rPr lang="en-US" baseline="0" dirty="0" smtClean="0"/>
+              <a:t>After the project kick-off, we will move on to the pipeline and our planning for the next two weeks.</a:t>
+            </a:r>
+          </a:p>
+          <a:p>
+            <a:r>
+              <a:rPr lang="en-US" dirty="0" smtClean="0"/>
+              <a:t>But first, lets move on to the background</a:t>
+            </a:r>
+            <a:endParaRPr lang="en-US" dirty="0"/>
+          </a:p>
+        </p:txBody>
+      </p:sp>
+      <p:sp>
+        <p:nvSpPr>
+          <p:cNvPr id="4" name="Slide Number Placeholder 3"/>
+          <p:cNvSpPr>
+            <a:spLocks noGrp="1"/>
+          </p:cNvSpPr>
+          <p:nvPr>
+            <p:ph type="sldNum" sz="quarter" idx="10"/>
+          </p:nvPr>
+        </p:nvSpPr>
+        <p:spPr/>
+        <p:txBody>
+          <a:bodyPr/>
+          <a:lstStyle/>
+          <a:p>
+            <a:fld id="{99A3DC0A-0F13-4D73-8F44-7A783FA67ED0}" type="slidenum">
+              <a:rPr lang="en-US" smtClean="0"/>
+              <a:t>2</a:t>
+            </a:fld>
+            <a:endParaRPr lang="en-US"/>
+          </a:p>
+        </p:txBody>
+      </p:sp>
+    </p:spTree>
+    <p:extLst>
+      <p:ext uri="{BB962C8B-B14F-4D97-AF65-F5344CB8AC3E}">
+        <p14:creationId xmlns:p14="http://schemas.microsoft.com/office/powerpoint/2010/main" val="1712229339"/>
+      </p:ext>
+    </p:extLst>
+  </p:cSld>
+  <p:clrMapOvr>
+    <a:masterClrMapping/>
+  </p:clrMapOvr>
+</p:notes>
+</file>
+
+<file path=ppt/notesSlides/notesSlide2.xml><?xml version="1.0" encoding="utf-8"?>
+<p:notes xmlns:a="http://schemas.openxmlformats.org/drawingml/2006/main" xmlns:r="http://schemas.openxmlformats.org/officeDocument/2006/relationships" xmlns:p="http://schemas.openxmlformats.org/presentationml/2006/main">
+  <p:cSld>
+    <p:spTree>
+      <p:nvGrpSpPr>
+        <p:cNvPr id="1" name=""/>
+        <p:cNvGrpSpPr/>
+        <p:nvPr/>
+      </p:nvGrpSpPr>
+      <p:grpSpPr>
+        <a:xfrm>
+          <a:off x="0" y="0"/>
+          <a:ext cx="0" cy="0"/>
+          <a:chOff x="0" y="0"/>
+          <a:chExt cx="0" cy="0"/>
+        </a:xfrm>
+      </p:grpSpPr>
+      <p:sp>
+        <p:nvSpPr>
+          <p:cNvPr id="2" name="Slide Image Placeholder 1"/>
+          <p:cNvSpPr>
+            <a:spLocks noGrp="1" noRot="1" noChangeAspect="1"/>
+          </p:cNvSpPr>
+          <p:nvPr>
+            <p:ph type="sldImg"/>
+          </p:nvPr>
+        </p:nvSpPr>
+        <p:spPr/>
+      </p:sp>
+      <p:sp>
+        <p:nvSpPr>
+          <p:cNvPr id="3" name="Notes Placeholder 2"/>
+          <p:cNvSpPr>
+            <a:spLocks noGrp="1"/>
+          </p:cNvSpPr>
+          <p:nvPr>
+            <p:ph type="body" idx="1"/>
+          </p:nvPr>
+        </p:nvSpPr>
+        <p:spPr/>
+        <p:txBody>
+          <a:bodyPr/>
+          <a:lstStyle/>
+          <a:p>
+            <a:r>
+              <a:rPr lang="en-US" dirty="0" smtClean="0"/>
+              <a:t>We could select from two projects, differential expression and co-expression. Since</a:t>
+            </a:r>
+            <a:r>
+              <a:rPr lang="en-US" baseline="0" dirty="0" smtClean="0"/>
+              <a:t> we thought differential expression was interesting, we selected this project.</a:t>
+            </a:r>
+            <a:r>
+              <a:rPr lang="en-US" dirty="0" smtClean="0"/>
+              <a:t> Even</a:t>
+            </a:r>
+            <a:r>
+              <a:rPr lang="en-US" baseline="0" dirty="0" smtClean="0"/>
+              <a:t> though it was suggested that we find datasets from published papers, we selected the provided dataset of yeast. We selected this dataset because we are convinced the coaches have validate the provided datasets, we will use these to test our final pipeline.</a:t>
+            </a:r>
+          </a:p>
+          <a:p>
+            <a:endParaRPr lang="en-US" baseline="0" dirty="0" smtClean="0"/>
+          </a:p>
+          <a:p>
+            <a:r>
+              <a:rPr lang="en-US" dirty="0" smtClean="0"/>
+              <a:t>So what did we do in the first few days?</a:t>
+            </a:r>
+          </a:p>
+          <a:p>
+            <a:r>
+              <a:rPr lang="en-US" dirty="0" smtClean="0"/>
+              <a:t>We started Friday by looking at the</a:t>
+            </a:r>
+            <a:r>
+              <a:rPr lang="en-US" baseline="0" dirty="0" smtClean="0"/>
+              <a:t> biological aspects of the pipeline. At this point we only prior knowledge from the previous classes. Therefore, we could still think broadly about the pipeline’s requirements. The final product of this discussion will be discussed later. After constructing our secret pipeline, we assigned priorities to each part of the pipeline using the </a:t>
+            </a:r>
+            <a:r>
+              <a:rPr lang="en-US" baseline="0" dirty="0" err="1" smtClean="0"/>
+              <a:t>MoSCoW</a:t>
+            </a:r>
+            <a:r>
+              <a:rPr lang="en-US" baseline="0" dirty="0" smtClean="0"/>
+              <a:t> approach as discussed by Harm and shown on the slide.</a:t>
+            </a:r>
+            <a:endParaRPr lang="en-US" dirty="0" smtClean="0"/>
+          </a:p>
+          <a:p>
+            <a:endParaRPr lang="en-US" baseline="0" dirty="0" smtClean="0"/>
+          </a:p>
+        </p:txBody>
+      </p:sp>
+      <p:sp>
+        <p:nvSpPr>
+          <p:cNvPr id="4" name="Slide Number Placeholder 3"/>
+          <p:cNvSpPr>
+            <a:spLocks noGrp="1"/>
+          </p:cNvSpPr>
+          <p:nvPr>
+            <p:ph type="sldNum" sz="quarter" idx="10"/>
+          </p:nvPr>
+        </p:nvSpPr>
+        <p:spPr/>
+        <p:txBody>
+          <a:bodyPr/>
+          <a:lstStyle/>
+          <a:p>
+            <a:fld id="{99A3DC0A-0F13-4D73-8F44-7A783FA67ED0}" type="slidenum">
+              <a:rPr lang="en-US" smtClean="0"/>
+              <a:t>3</a:t>
+            </a:fld>
+            <a:endParaRPr lang="en-US"/>
+          </a:p>
+        </p:txBody>
+      </p:sp>
+    </p:spTree>
+    <p:extLst>
+      <p:ext uri="{BB962C8B-B14F-4D97-AF65-F5344CB8AC3E}">
+        <p14:creationId xmlns:p14="http://schemas.microsoft.com/office/powerpoint/2010/main" val="78428398"/>
+      </p:ext>
+    </p:extLst>
+  </p:cSld>
+  <p:clrMapOvr>
+    <a:masterClrMapping/>
+  </p:clrMapOvr>
+</p:notes>
+</file>
+
+<file path=ppt/notesSlides/notesSlide3.xml><?xml version="1.0" encoding="utf-8"?>
+<p:notes xmlns:a="http://schemas.openxmlformats.org/drawingml/2006/main" xmlns:r="http://schemas.openxmlformats.org/officeDocument/2006/relationships" xmlns:p="http://schemas.openxmlformats.org/presentationml/2006/main">
+  <p:cSld>
+    <p:spTree>
+      <p:nvGrpSpPr>
+        <p:cNvPr id="1" name=""/>
+        <p:cNvGrpSpPr/>
+        <p:nvPr/>
+      </p:nvGrpSpPr>
+      <p:grpSpPr>
+        <a:xfrm>
+          <a:off x="0" y="0"/>
+          <a:ext cx="0" cy="0"/>
+          <a:chOff x="0" y="0"/>
+          <a:chExt cx="0" cy="0"/>
+        </a:xfrm>
+      </p:grpSpPr>
+      <p:sp>
+        <p:nvSpPr>
+          <p:cNvPr id="2" name="Slide Image Placeholder 1"/>
+          <p:cNvSpPr>
+            <a:spLocks noGrp="1" noRot="1" noChangeAspect="1"/>
+          </p:cNvSpPr>
+          <p:nvPr>
+            <p:ph type="sldImg"/>
+          </p:nvPr>
+        </p:nvSpPr>
+        <p:spPr/>
+      </p:sp>
+      <p:sp>
+        <p:nvSpPr>
+          <p:cNvPr id="3" name="Notes Placeholder 2"/>
+          <p:cNvSpPr>
+            <a:spLocks noGrp="1"/>
+          </p:cNvSpPr>
+          <p:nvPr>
+            <p:ph type="body" idx="1"/>
+          </p:nvPr>
+        </p:nvSpPr>
+        <p:spPr/>
+        <p:txBody>
+          <a:bodyPr/>
+          <a:lstStyle/>
+          <a:p>
+            <a:r>
+              <a:rPr lang="en-US" dirty="0" smtClean="0"/>
+              <a:t>Since we expect to have a tight schedule, we tried to strip-off</a:t>
+            </a:r>
+            <a:r>
+              <a:rPr lang="en-US" baseline="0" dirty="0" smtClean="0"/>
+              <a:t> all the unnecessary features leading to the MUST list as shown on the slide. Essential requirements of the pipeline remains. The initial </a:t>
+            </a:r>
+            <a:r>
+              <a:rPr lang="en-US" baseline="0" dirty="0" err="1" smtClean="0"/>
+              <a:t>dataformating</a:t>
+            </a:r>
+            <a:r>
+              <a:rPr lang="en-US" baseline="0" dirty="0" smtClean="0"/>
+              <a:t>, quality control, quality improvement, mapping, read counting, data normalization, DE and enrichment. In which enrichment is providing an output consisting of a basic list with genes which are enriched.</a:t>
+            </a:r>
+          </a:p>
+          <a:p>
+            <a:endParaRPr lang="en-US" baseline="0" dirty="0" smtClean="0"/>
+          </a:p>
+          <a:p>
+            <a:r>
+              <a:rPr lang="en-US" baseline="0" dirty="0" smtClean="0"/>
+              <a:t>Because we want to create a feasible pipeline we should chose appropriate software, however this is not a MUST since we most likely create a pipeline using less efficient software. Moreover, you can spend a lot of time discussion which software is the best for each step. Making it a thesis project while your add it. Therefore, this is moved to the should list.</a:t>
+            </a:r>
+          </a:p>
+          <a:p>
+            <a:r>
+              <a:rPr lang="en-US" baseline="0" dirty="0" smtClean="0"/>
+              <a:t>Then we have checking the quality of the mapping. Since we wish to improve the output, we included enrichment again to include GO terms and functions of the enriched genes.</a:t>
+            </a:r>
+          </a:p>
+          <a:p>
+            <a:r>
+              <a:rPr lang="en-US" baseline="0" dirty="0" smtClean="0"/>
+              <a:t>Possibly add output functions for the R package </a:t>
+            </a:r>
+            <a:r>
+              <a:rPr lang="en-US" baseline="0" dirty="0" err="1" smtClean="0"/>
+              <a:t>bioconductor</a:t>
+            </a:r>
+            <a:r>
+              <a:rPr lang="en-US" baseline="0" dirty="0" smtClean="0"/>
+              <a:t>.</a:t>
+            </a:r>
+          </a:p>
+          <a:p>
+            <a:endParaRPr lang="en-US" baseline="0" dirty="0" smtClean="0"/>
+          </a:p>
+          <a:p>
+            <a:r>
+              <a:rPr lang="en-US" baseline="0" dirty="0" smtClean="0"/>
+              <a:t>Then we are left with a COULD list we could make if we have time left. Due to the time pressure, we haven’t spend time on the WOULD list.</a:t>
+            </a:r>
+          </a:p>
+          <a:p>
+            <a:endParaRPr lang="en-US" baseline="0" dirty="0" smtClean="0"/>
+          </a:p>
+          <a:p>
+            <a:r>
+              <a:rPr lang="en-US" baseline="0" dirty="0" smtClean="0"/>
+              <a:t>We will now continue to our proposed pipeline</a:t>
+            </a:r>
+          </a:p>
+        </p:txBody>
+      </p:sp>
+      <p:sp>
+        <p:nvSpPr>
+          <p:cNvPr id="4" name="Slide Number Placeholder 3"/>
+          <p:cNvSpPr>
+            <a:spLocks noGrp="1"/>
+          </p:cNvSpPr>
+          <p:nvPr>
+            <p:ph type="sldNum" sz="quarter" idx="10"/>
+          </p:nvPr>
+        </p:nvSpPr>
+        <p:spPr/>
+        <p:txBody>
+          <a:bodyPr/>
+          <a:lstStyle/>
+          <a:p>
+            <a:fld id="{99A3DC0A-0F13-4D73-8F44-7A783FA67ED0}" type="slidenum">
+              <a:rPr lang="en-US" smtClean="0"/>
+              <a:t>4</a:t>
+            </a:fld>
+            <a:endParaRPr lang="en-US"/>
+          </a:p>
+        </p:txBody>
+      </p:sp>
+    </p:spTree>
+    <p:extLst>
+      <p:ext uri="{BB962C8B-B14F-4D97-AF65-F5344CB8AC3E}">
+        <p14:creationId xmlns:p14="http://schemas.microsoft.com/office/powerpoint/2010/main" val="2122666967"/>
+      </p:ext>
+    </p:extLst>
+  </p:cSld>
+  <p:clrMapOvr>
+    <a:masterClrMapping/>
+  </p:clrMapOvr>
+</p:notes>
+</file>
+
+<file path=ppt/notesSlides/notesSlide4.xml><?xml version="1.0" encoding="utf-8"?>
+<p:notes xmlns:a="http://schemas.openxmlformats.org/drawingml/2006/main" xmlns:r="http://schemas.openxmlformats.org/officeDocument/2006/relationships" xmlns:p="http://schemas.openxmlformats.org/presentationml/2006/main">
+  <p:cSld>
+    <p:spTree>
+      <p:nvGrpSpPr>
+        <p:cNvPr id="1" name=""/>
+        <p:cNvGrpSpPr/>
+        <p:nvPr/>
+      </p:nvGrpSpPr>
+      <p:grpSpPr>
+        <a:xfrm>
+          <a:off x="0" y="0"/>
+          <a:ext cx="0" cy="0"/>
+          <a:chOff x="0" y="0"/>
+          <a:chExt cx="0" cy="0"/>
+        </a:xfrm>
+      </p:grpSpPr>
+      <p:sp>
+        <p:nvSpPr>
+          <p:cNvPr id="2" name="Slide Image Placeholder 1"/>
+          <p:cNvSpPr>
+            <a:spLocks noGrp="1" noRot="1" noChangeAspect="1"/>
+          </p:cNvSpPr>
+          <p:nvPr>
+            <p:ph type="sldImg"/>
+          </p:nvPr>
+        </p:nvSpPr>
+        <p:spPr/>
+      </p:sp>
+      <p:sp>
+        <p:nvSpPr>
+          <p:cNvPr id="3" name="Notes Placeholder 2"/>
+          <p:cNvSpPr>
+            <a:spLocks noGrp="1"/>
+          </p:cNvSpPr>
+          <p:nvPr>
+            <p:ph type="body" idx="1"/>
+          </p:nvPr>
+        </p:nvSpPr>
+        <p:spPr/>
+        <p:txBody>
+          <a:bodyPr/>
+          <a:lstStyle/>
+          <a:p>
+            <a:r>
+              <a:rPr lang="en-US" dirty="0" smtClean="0"/>
+              <a:t>Over the weekend we studied</a:t>
+            </a:r>
+            <a:r>
+              <a:rPr lang="en-US" baseline="0" dirty="0" smtClean="0"/>
+              <a:t> several articles under which “Differential gene and transcript expression analysis of RNA-</a:t>
+            </a:r>
+            <a:r>
+              <a:rPr lang="en-US" baseline="0" dirty="0" err="1" smtClean="0"/>
+              <a:t>seq</a:t>
+            </a:r>
+            <a:r>
+              <a:rPr lang="en-US" baseline="0" dirty="0" smtClean="0"/>
+              <a:t> experiments with </a:t>
+            </a:r>
+            <a:r>
+              <a:rPr lang="en-US" baseline="0" dirty="0" err="1" smtClean="0"/>
+              <a:t>TopHat</a:t>
+            </a:r>
+            <a:r>
+              <a:rPr lang="en-US" baseline="0" dirty="0" smtClean="0"/>
+              <a:t> and Cufflinks”. In this article the following protocol is proposed. However, when we compare their protocol to our proposed pipeline we found it to be missing a few steps. One such step is the quality control of the input data. After studying their protocol, we constructed our draft backbone for our pipeline, as shown on the right.</a:t>
+            </a:r>
+          </a:p>
+          <a:p>
+            <a:endParaRPr lang="en-US" baseline="0" dirty="0" smtClean="0"/>
+          </a:p>
+          <a:p>
+            <a:r>
+              <a:rPr lang="en-US" baseline="0" dirty="0" smtClean="0"/>
+              <a:t>Firstly we want to illustrate that the control group and test group are processed separately in the first few steps. Moreover, we added the quality control of the input files. The alignment and mapping remains the same. The final part of the pipeline backbone is split up in a list of differentially expressed genes and two optional automated tasks for identifying enriched functions…</a:t>
+            </a:r>
+          </a:p>
+          <a:p>
+            <a:endParaRPr lang="en-US" baseline="0" dirty="0" smtClean="0"/>
+          </a:p>
+          <a:p>
+            <a:r>
+              <a:rPr lang="en-US" baseline="0" dirty="0" smtClean="0"/>
+              <a:t>Now that we have our plan, it’s time to consider ways to keep track of our progress and development </a:t>
+            </a:r>
+            <a:r>
+              <a:rPr lang="en-US" baseline="0" dirty="0" err="1" smtClean="0"/>
+              <a:t>enviroments</a:t>
+            </a:r>
+            <a:r>
+              <a:rPr lang="en-US" baseline="0" dirty="0" smtClean="0"/>
+              <a:t>.</a:t>
+            </a:r>
+          </a:p>
+        </p:txBody>
+      </p:sp>
+      <p:sp>
+        <p:nvSpPr>
+          <p:cNvPr id="4" name="Slide Number Placeholder 3"/>
+          <p:cNvSpPr>
+            <a:spLocks noGrp="1"/>
+          </p:cNvSpPr>
+          <p:nvPr>
+            <p:ph type="sldNum" sz="quarter" idx="10"/>
+          </p:nvPr>
+        </p:nvSpPr>
+        <p:spPr/>
+        <p:txBody>
+          <a:bodyPr/>
+          <a:lstStyle/>
+          <a:p>
+            <a:fld id="{99A3DC0A-0F13-4D73-8F44-7A783FA67ED0}" type="slidenum">
+              <a:rPr lang="en-US" smtClean="0"/>
+              <a:t>5</a:t>
+            </a:fld>
+            <a:endParaRPr lang="en-US"/>
+          </a:p>
+        </p:txBody>
+      </p:sp>
+    </p:spTree>
+    <p:extLst>
+      <p:ext uri="{BB962C8B-B14F-4D97-AF65-F5344CB8AC3E}">
+        <p14:creationId xmlns:p14="http://schemas.microsoft.com/office/powerpoint/2010/main" val="1610183156"/>
+      </p:ext>
+    </p:extLst>
+  </p:cSld>
+  <p:clrMapOvr>
+    <a:masterClrMapping/>
+  </p:clrMapOvr>
+</p:notes>
+</file>
+
+<file path=ppt/notesSlides/notesSlide5.xml><?xml version="1.0" encoding="utf-8"?>
+<p:notes xmlns:a="http://schemas.openxmlformats.org/drawingml/2006/main" xmlns:r="http://schemas.openxmlformats.org/officeDocument/2006/relationships" xmlns:p="http://schemas.openxmlformats.org/presentationml/2006/main">
+  <p:cSld>
+    <p:spTree>
+      <p:nvGrpSpPr>
+        <p:cNvPr id="1" name=""/>
+        <p:cNvGrpSpPr/>
+        <p:nvPr/>
+      </p:nvGrpSpPr>
+      <p:grpSpPr>
+        <a:xfrm>
+          <a:off x="0" y="0"/>
+          <a:ext cx="0" cy="0"/>
+          <a:chOff x="0" y="0"/>
+          <a:chExt cx="0" cy="0"/>
+        </a:xfrm>
+      </p:grpSpPr>
+      <p:sp>
+        <p:nvSpPr>
+          <p:cNvPr id="2" name="Slide Image Placeholder 1"/>
+          <p:cNvSpPr>
+            <a:spLocks noGrp="1" noRot="1" noChangeAspect="1"/>
+          </p:cNvSpPr>
+          <p:nvPr>
+            <p:ph type="sldImg"/>
+          </p:nvPr>
+        </p:nvSpPr>
+        <p:spPr/>
+      </p:sp>
+      <p:sp>
+        <p:nvSpPr>
+          <p:cNvPr id="3" name="Notes Placeholder 2"/>
+          <p:cNvSpPr>
+            <a:spLocks noGrp="1"/>
+          </p:cNvSpPr>
+          <p:nvPr>
+            <p:ph type="body" idx="1"/>
+          </p:nvPr>
+        </p:nvSpPr>
+        <p:spPr/>
+        <p:txBody>
+          <a:bodyPr/>
+          <a:lstStyle/>
+          <a:p>
+            <a:r>
+              <a:rPr lang="en-US" baseline="0" dirty="0" smtClean="0"/>
+              <a:t>In order to share code and being able to review coding history we have decided to use </a:t>
+            </a:r>
+            <a:r>
+              <a:rPr lang="en-US" baseline="0" dirty="0" err="1" smtClean="0"/>
+              <a:t>GitHub</a:t>
+            </a:r>
+            <a:r>
+              <a:rPr lang="en-US" baseline="0" dirty="0" smtClean="0"/>
+              <a:t> as source control. Using </a:t>
+            </a:r>
+            <a:r>
+              <a:rPr lang="en-US" baseline="0" dirty="0" err="1" smtClean="0"/>
+              <a:t>Github</a:t>
+            </a:r>
+            <a:r>
+              <a:rPr lang="en-US" baseline="0" dirty="0" smtClean="0"/>
+              <a:t> we have stored our code in a save location and we can review each others code. This provides us with an insight of in programming </a:t>
+            </a:r>
+            <a:r>
+              <a:rPr lang="en-US" baseline="0" dirty="0" err="1" smtClean="0"/>
+              <a:t>progess</a:t>
+            </a:r>
+            <a:r>
+              <a:rPr lang="en-US" baseline="0" dirty="0" smtClean="0"/>
+              <a:t> and a remote location allowing everyone to work and share important documents without overflowing the mailbox. Which brings us to the planning and time control.</a:t>
+            </a:r>
+          </a:p>
+        </p:txBody>
+      </p:sp>
+      <p:sp>
+        <p:nvSpPr>
+          <p:cNvPr id="4" name="Slide Number Placeholder 3"/>
+          <p:cNvSpPr>
+            <a:spLocks noGrp="1"/>
+          </p:cNvSpPr>
+          <p:nvPr>
+            <p:ph type="sldNum" sz="quarter" idx="10"/>
+          </p:nvPr>
+        </p:nvSpPr>
+        <p:spPr/>
+        <p:txBody>
+          <a:bodyPr/>
+          <a:lstStyle/>
+          <a:p>
+            <a:fld id="{99A3DC0A-0F13-4D73-8F44-7A783FA67ED0}" type="slidenum">
+              <a:rPr lang="en-US" smtClean="0"/>
+              <a:t>6</a:t>
+            </a:fld>
+            <a:endParaRPr lang="en-US"/>
+          </a:p>
+        </p:txBody>
+      </p:sp>
+    </p:spTree>
+    <p:extLst>
+      <p:ext uri="{BB962C8B-B14F-4D97-AF65-F5344CB8AC3E}">
+        <p14:creationId xmlns:p14="http://schemas.microsoft.com/office/powerpoint/2010/main" val="78428398"/>
+      </p:ext>
+    </p:extLst>
+  </p:cSld>
+  <p:clrMapOvr>
+    <a:masterClrMapping/>
+  </p:clrMapOvr>
+</p:notes>
+</file>
+
+<file path=ppt/notesSlides/notesSlide6.xml><?xml version="1.0" encoding="utf-8"?>
+<p:notes xmlns:a="http://schemas.openxmlformats.org/drawingml/2006/main" xmlns:r="http://schemas.openxmlformats.org/officeDocument/2006/relationships" xmlns:p="http://schemas.openxmlformats.org/presentationml/2006/main">
+  <p:cSld>
+    <p:spTree>
+      <p:nvGrpSpPr>
+        <p:cNvPr id="1" name=""/>
+        <p:cNvGrpSpPr/>
+        <p:nvPr/>
+      </p:nvGrpSpPr>
+      <p:grpSpPr>
+        <a:xfrm>
+          <a:off x="0" y="0"/>
+          <a:ext cx="0" cy="0"/>
+          <a:chOff x="0" y="0"/>
+          <a:chExt cx="0" cy="0"/>
+        </a:xfrm>
+      </p:grpSpPr>
+      <p:sp>
+        <p:nvSpPr>
+          <p:cNvPr id="2" name="Slide Image Placeholder 1"/>
+          <p:cNvSpPr>
+            <a:spLocks noGrp="1" noRot="1" noChangeAspect="1"/>
+          </p:cNvSpPr>
+          <p:nvPr>
+            <p:ph type="sldImg"/>
+          </p:nvPr>
+        </p:nvSpPr>
+        <p:spPr/>
+      </p:sp>
+      <p:sp>
+        <p:nvSpPr>
+          <p:cNvPr id="3" name="Notes Placeholder 2"/>
+          <p:cNvSpPr>
+            <a:spLocks noGrp="1"/>
+          </p:cNvSpPr>
+          <p:nvPr>
+            <p:ph type="body" idx="1"/>
+          </p:nvPr>
+        </p:nvSpPr>
+        <p:spPr/>
+        <p:txBody>
+          <a:bodyPr/>
+          <a:lstStyle/>
+          <a:p>
+            <a:r>
+              <a:rPr lang="en-US" dirty="0" smtClean="0"/>
+              <a:t>We took a close look at the deadlines and decided that we only have this week to create all the coding. </a:t>
+            </a:r>
+            <a:r>
+              <a:rPr lang="en-US" dirty="0" err="1" smtClean="0"/>
+              <a:t>Basicly</a:t>
+            </a:r>
+            <a:r>
+              <a:rPr lang="en-US" dirty="0" smtClean="0"/>
+              <a:t> next week is </a:t>
+            </a:r>
+            <a:r>
+              <a:rPr lang="en-US" dirty="0" err="1" smtClean="0"/>
+              <a:t>buggfixing</a:t>
+            </a:r>
+            <a:r>
+              <a:rPr lang="en-US" dirty="0" smtClean="0"/>
+              <a:t>,</a:t>
+            </a:r>
+            <a:r>
+              <a:rPr lang="en-US" baseline="0" dirty="0" smtClean="0"/>
+              <a:t> report and manual writing. After this we could still add some features. Since we have the version control, we will make a </a:t>
+            </a:r>
+            <a:r>
+              <a:rPr lang="en-US" baseline="0" dirty="0" err="1" smtClean="0"/>
+              <a:t>tagg</a:t>
+            </a:r>
+            <a:r>
+              <a:rPr lang="en-US" baseline="0" dirty="0" smtClean="0"/>
+              <a:t> once we are confident with our pipeline. Which means, we create a point in the version control to which we can always return if we make errors. </a:t>
+            </a:r>
+          </a:p>
+          <a:p>
+            <a:endParaRPr lang="en-US" baseline="0" dirty="0" smtClean="0"/>
+          </a:p>
+          <a:p>
+            <a:r>
+              <a:rPr lang="en-US" baseline="0" dirty="0" smtClean="0"/>
+              <a:t>To give you insight how we control our progress we have to take a look in our project time management system.</a:t>
+            </a:r>
+          </a:p>
+        </p:txBody>
+      </p:sp>
+      <p:sp>
+        <p:nvSpPr>
+          <p:cNvPr id="4" name="Slide Number Placeholder 3"/>
+          <p:cNvSpPr>
+            <a:spLocks noGrp="1"/>
+          </p:cNvSpPr>
+          <p:nvPr>
+            <p:ph type="sldNum" sz="quarter" idx="10"/>
+          </p:nvPr>
+        </p:nvSpPr>
+        <p:spPr/>
+        <p:txBody>
+          <a:bodyPr/>
+          <a:lstStyle/>
+          <a:p>
+            <a:fld id="{99A3DC0A-0F13-4D73-8F44-7A783FA67ED0}" type="slidenum">
+              <a:rPr lang="en-US" smtClean="0"/>
+              <a:t>7</a:t>
+            </a:fld>
+            <a:endParaRPr lang="en-US"/>
+          </a:p>
+        </p:txBody>
+      </p:sp>
+    </p:spTree>
+    <p:extLst>
+      <p:ext uri="{BB962C8B-B14F-4D97-AF65-F5344CB8AC3E}">
+        <p14:creationId xmlns:p14="http://schemas.microsoft.com/office/powerpoint/2010/main" val="2687406389"/>
+      </p:ext>
+    </p:extLst>
+  </p:cSld>
+  <p:clrMapOvr>
+    <a:masterClrMapping/>
+  </p:clrMapOvr>
+</p:notes>
+</file>
+
+<file path=ppt/notesSlides/notesSlide7.xml><?xml version="1.0" encoding="utf-8"?>
+<p:notes xmlns:a="http://schemas.openxmlformats.org/drawingml/2006/main" xmlns:r="http://schemas.openxmlformats.org/officeDocument/2006/relationships" xmlns:p="http://schemas.openxmlformats.org/presentationml/2006/main">
+  <p:cSld>
+    <p:spTree>
+      <p:nvGrpSpPr>
+        <p:cNvPr id="1" name=""/>
+        <p:cNvGrpSpPr/>
+        <p:nvPr/>
+      </p:nvGrpSpPr>
+      <p:grpSpPr>
+        <a:xfrm>
+          <a:off x="0" y="0"/>
+          <a:ext cx="0" cy="0"/>
+          <a:chOff x="0" y="0"/>
+          <a:chExt cx="0" cy="0"/>
+        </a:xfrm>
+      </p:grpSpPr>
+      <p:sp>
+        <p:nvSpPr>
+          <p:cNvPr id="2" name="Slide Image Placeholder 1"/>
+          <p:cNvSpPr>
+            <a:spLocks noGrp="1" noRot="1" noChangeAspect="1"/>
+          </p:cNvSpPr>
+          <p:nvPr>
+            <p:ph type="sldImg"/>
+          </p:nvPr>
+        </p:nvSpPr>
+        <p:spPr/>
+      </p:sp>
+      <p:sp>
+        <p:nvSpPr>
+          <p:cNvPr id="3" name="Notes Placeholder 2"/>
+          <p:cNvSpPr>
+            <a:spLocks noGrp="1"/>
+          </p:cNvSpPr>
+          <p:nvPr>
+            <p:ph type="body" idx="1"/>
+          </p:nvPr>
+        </p:nvSpPr>
+        <p:spPr/>
+        <p:txBody>
+          <a:bodyPr/>
+          <a:lstStyle/>
+          <a:p>
+            <a:r>
+              <a:rPr lang="en-US" baseline="0" dirty="0" smtClean="0"/>
+              <a:t>To keep a tight track of our progress and time we created trial accounts at liquidplanner.com. Here everyone can include check lists and estimate how much time they need for their time. This gives grip on managing tasks to reach the deadlines and outline intermediate deploys.</a:t>
+            </a:r>
+          </a:p>
+          <a:p>
+            <a:endParaRPr lang="en-US" baseline="0" dirty="0" smtClean="0"/>
+          </a:p>
+          <a:p>
+            <a:r>
+              <a:rPr lang="en-US" baseline="0" dirty="0" smtClean="0"/>
+              <a:t>So where are we now?</a:t>
+            </a:r>
+            <a:endParaRPr lang="en-US" baseline="0" dirty="0" smtClean="0"/>
+          </a:p>
+        </p:txBody>
+      </p:sp>
+      <p:sp>
+        <p:nvSpPr>
+          <p:cNvPr id="4" name="Slide Number Placeholder 3"/>
+          <p:cNvSpPr>
+            <a:spLocks noGrp="1"/>
+          </p:cNvSpPr>
+          <p:nvPr>
+            <p:ph type="sldNum" sz="quarter" idx="10"/>
+          </p:nvPr>
+        </p:nvSpPr>
+        <p:spPr/>
+        <p:txBody>
+          <a:bodyPr/>
+          <a:lstStyle/>
+          <a:p>
+            <a:fld id="{99A3DC0A-0F13-4D73-8F44-7A783FA67ED0}" type="slidenum">
+              <a:rPr lang="en-US" smtClean="0"/>
+              <a:t>8</a:t>
+            </a:fld>
+            <a:endParaRPr lang="en-US"/>
+          </a:p>
+        </p:txBody>
+      </p:sp>
+    </p:spTree>
+    <p:extLst>
+      <p:ext uri="{BB962C8B-B14F-4D97-AF65-F5344CB8AC3E}">
+        <p14:creationId xmlns:p14="http://schemas.microsoft.com/office/powerpoint/2010/main" val="2687406389"/>
+      </p:ext>
+    </p:extLst>
+  </p:cSld>
+  <p:clrMapOvr>
+    <a:masterClrMapping/>
+  </p:clrMapOvr>
+</p:notes>
+</file>
+
+<file path=ppt/notesSlides/notesSlide8.xml><?xml version="1.0" encoding="utf-8"?>
+<p:notes xmlns:a="http://schemas.openxmlformats.org/drawingml/2006/main" xmlns:r="http://schemas.openxmlformats.org/officeDocument/2006/relationships" xmlns:p="http://schemas.openxmlformats.org/presentationml/2006/main">
+  <p:cSld>
+    <p:spTree>
+      <p:nvGrpSpPr>
+        <p:cNvPr id="1" name=""/>
+        <p:cNvGrpSpPr/>
+        <p:nvPr/>
+      </p:nvGrpSpPr>
+      <p:grpSpPr>
+        <a:xfrm>
+          <a:off x="0" y="0"/>
+          <a:ext cx="0" cy="0"/>
+          <a:chOff x="0" y="0"/>
+          <a:chExt cx="0" cy="0"/>
+        </a:xfrm>
+      </p:grpSpPr>
+      <p:sp>
+        <p:nvSpPr>
+          <p:cNvPr id="2" name="Slide Image Placeholder 1"/>
+          <p:cNvSpPr>
+            <a:spLocks noGrp="1" noRot="1" noChangeAspect="1"/>
+          </p:cNvSpPr>
+          <p:nvPr>
+            <p:ph type="sldImg"/>
+          </p:nvPr>
+        </p:nvSpPr>
+        <p:spPr/>
+      </p:sp>
+      <p:sp>
+        <p:nvSpPr>
+          <p:cNvPr id="3" name="Notes Placeholder 2"/>
+          <p:cNvSpPr>
+            <a:spLocks noGrp="1"/>
+          </p:cNvSpPr>
+          <p:nvPr>
+            <p:ph type="body" idx="1"/>
+          </p:nvPr>
+        </p:nvSpPr>
+        <p:spPr/>
+        <p:txBody>
+          <a:bodyPr/>
+          <a:lstStyle/>
+          <a:p>
+            <a:r>
+              <a:rPr lang="en-US" dirty="0" smtClean="0"/>
+              <a:t>Right now we are running the suggested protocol</a:t>
+            </a:r>
+            <a:r>
+              <a:rPr lang="en-US" baseline="0" dirty="0" smtClean="0"/>
+              <a:t> from “Differential gene and transcript expression analysis of RNA-</a:t>
+            </a:r>
+            <a:r>
+              <a:rPr lang="en-US" baseline="0" dirty="0" err="1" smtClean="0"/>
+              <a:t>seq</a:t>
+            </a:r>
+            <a:r>
+              <a:rPr lang="en-US" baseline="0" dirty="0" smtClean="0"/>
+              <a:t> experiments with </a:t>
+            </a:r>
+            <a:r>
+              <a:rPr lang="en-US" baseline="0" dirty="0" err="1" smtClean="0"/>
+              <a:t>TopHat</a:t>
+            </a:r>
+            <a:r>
+              <a:rPr lang="en-US" baseline="0" dirty="0" smtClean="0"/>
+              <a:t> and Cufflinks”.</a:t>
+            </a:r>
+            <a:endParaRPr lang="en-US" dirty="0"/>
+          </a:p>
+        </p:txBody>
+      </p:sp>
+      <p:sp>
+        <p:nvSpPr>
+          <p:cNvPr id="4" name="Slide Number Placeholder 3"/>
+          <p:cNvSpPr>
+            <a:spLocks noGrp="1"/>
+          </p:cNvSpPr>
+          <p:nvPr>
+            <p:ph type="sldNum" sz="quarter" idx="10"/>
+          </p:nvPr>
+        </p:nvSpPr>
+        <p:spPr/>
+        <p:txBody>
+          <a:bodyPr/>
+          <a:lstStyle/>
+          <a:p>
+            <a:fld id="{99A3DC0A-0F13-4D73-8F44-7A783FA67ED0}" type="slidenum">
+              <a:rPr lang="en-US" smtClean="0"/>
+              <a:t>9</a:t>
+            </a:fld>
+            <a:endParaRPr lang="en-US"/>
+          </a:p>
+        </p:txBody>
+      </p:sp>
+    </p:spTree>
+    <p:extLst>
+      <p:ext uri="{BB962C8B-B14F-4D97-AF65-F5344CB8AC3E}">
+        <p14:creationId xmlns:p14="http://schemas.microsoft.com/office/powerpoint/2010/main" val="2252985758"/>
+      </p:ext>
+    </p:extLst>
+  </p:cSld>
+  <p:clrMapOvr>
+    <a:masterClrMapping/>
+  </p:clrMapOvr>
+</p:notes>
+</file>
+
+<file path=ppt/notesSlides/notesSlide9.xml><?xml version="1.0" encoding="utf-8"?>
+<p:notes xmlns:a="http://schemas.openxmlformats.org/drawingml/2006/main" xmlns:r="http://schemas.openxmlformats.org/officeDocument/2006/relationships" xmlns:p="http://schemas.openxmlformats.org/presentationml/2006/main">
+  <p:cSld>
+    <p:spTree>
+      <p:nvGrpSpPr>
+        <p:cNvPr id="1" name=""/>
+        <p:cNvGrpSpPr/>
+        <p:nvPr/>
+      </p:nvGrpSpPr>
+      <p:grpSpPr>
+        <a:xfrm>
+          <a:off x="0" y="0"/>
+          <a:ext cx="0" cy="0"/>
+          <a:chOff x="0" y="0"/>
+          <a:chExt cx="0" cy="0"/>
+        </a:xfrm>
+      </p:grpSpPr>
+      <p:sp>
+        <p:nvSpPr>
+          <p:cNvPr id="2" name="Slide Image Placeholder 1"/>
+          <p:cNvSpPr>
+            <a:spLocks noGrp="1" noRot="1" noChangeAspect="1"/>
+          </p:cNvSpPr>
+          <p:nvPr>
+            <p:ph type="sldImg"/>
+          </p:nvPr>
+        </p:nvSpPr>
+        <p:spPr/>
+      </p:sp>
+      <p:sp>
+        <p:nvSpPr>
+          <p:cNvPr id="3" name="Notes Placeholder 2"/>
+          <p:cNvSpPr>
+            <a:spLocks noGrp="1"/>
+          </p:cNvSpPr>
+          <p:nvPr>
+            <p:ph type="body" idx="1"/>
+          </p:nvPr>
+        </p:nvSpPr>
+        <p:spPr/>
+        <p:txBody>
+          <a:bodyPr/>
+          <a:lstStyle/>
+          <a:p>
+            <a:endParaRPr lang="en-US" dirty="0"/>
+          </a:p>
+        </p:txBody>
+      </p:sp>
+      <p:sp>
+        <p:nvSpPr>
+          <p:cNvPr id="4" name="Slide Number Placeholder 3"/>
+          <p:cNvSpPr>
+            <a:spLocks noGrp="1"/>
+          </p:cNvSpPr>
+          <p:nvPr>
+            <p:ph type="sldNum" sz="quarter" idx="10"/>
+          </p:nvPr>
+        </p:nvSpPr>
+        <p:spPr/>
+        <p:txBody>
+          <a:bodyPr/>
+          <a:lstStyle/>
+          <a:p>
+            <a:fld id="{99A3DC0A-0F13-4D73-8F44-7A783FA67ED0}" type="slidenum">
+              <a:rPr lang="en-US" smtClean="0"/>
+              <a:t>10</a:t>
+            </a:fld>
+            <a:endParaRPr lang="en-US"/>
+          </a:p>
+        </p:txBody>
+      </p:sp>
+    </p:spTree>
+    <p:extLst>
+      <p:ext uri="{BB962C8B-B14F-4D97-AF65-F5344CB8AC3E}">
+        <p14:creationId xmlns:p14="http://schemas.microsoft.com/office/powerpoint/2010/main" val="2252985758"/>
+      </p:ext>
+    </p:extLst>
+  </p:cSld>
+  <p:clrMapOvr>
+    <a:masterClrMapping/>
+  </p:clrMapOvr>
+</p:notes>
 </file>
 
 <file path=ppt/slideLayouts/slideLayout1.xml><?xml version="1.0" encoding="utf-8"?>
@@ -3373,8 +4775,8 @@
         </p:nvSpPr>
         <p:spPr>
           <a:xfrm>
-            <a:off x="533400" y="1447800"/>
-            <a:ext cx="5867400" cy="2133600"/>
+            <a:off x="533400" y="3048000"/>
+            <a:ext cx="5867400" cy="533400"/>
           </a:xfrm>
         </p:spPr>
         <p:txBody>
@@ -3389,6 +4791,120 @@
           </a:p>
         </p:txBody>
       </p:sp>
+      <p:sp>
+        <p:nvSpPr>
+          <p:cNvPr id="5" name="Title 1"/>
+          <p:cNvSpPr txBox="1">
+            <a:spLocks/>
+          </p:cNvSpPr>
+          <p:nvPr/>
+        </p:nvSpPr>
+        <p:spPr>
+          <a:xfrm>
+            <a:off x="190500" y="908050"/>
+            <a:ext cx="1828800" cy="304800"/>
+          </a:xfrm>
+          <a:prstGeom prst="rect">
+            <a:avLst/>
+          </a:prstGeom>
+        </p:spPr>
+        <p:txBody>
+          <a:bodyPr vert="horz" lIns="91440" tIns="45720" rIns="91440" bIns="45720" rtlCol="0" anchor="b">
+            <a:normAutofit fontScale="55000" lnSpcReduction="20000"/>
+          </a:bodyPr>
+          <a:lstStyle>
+            <a:lvl1pPr algn="r" defTabSz="914400" rtl="0" eaLnBrk="1" latinLnBrk="0" hangingPunct="1">
+              <a:spcBef>
+                <a:spcPct val="0"/>
+              </a:spcBef>
+              <a:buNone/>
+              <a:defRPr sz="2800" kern="1200">
+                <a:gradFill>
+                  <a:gsLst>
+                    <a:gs pos="0">
+                      <a:schemeClr val="tx1">
+                        <a:lumMod val="50000"/>
+                      </a:schemeClr>
+                    </a:gs>
+                    <a:gs pos="61000">
+                      <a:schemeClr val="tx1"/>
+                    </a:gs>
+                  </a:gsLst>
+                  <a:lin ang="5400000" scaled="0"/>
+                </a:gradFill>
+                <a:effectLst/>
+                <a:latin typeface="+mj-lt"/>
+                <a:ea typeface="+mj-ea"/>
+                <a:cs typeface="+mj-cs"/>
+              </a:defRPr>
+            </a:lvl1pPr>
+          </a:lstStyle>
+          <a:p>
+            <a:pPr algn="l"/>
+            <a:r>
+              <a:rPr lang="en-US" dirty="0" smtClean="0">
+                <a:effectLst>
+                  <a:outerShdw blurRad="38100" dist="38100" dir="2700000" algn="tl">
+                    <a:srgbClr val="000000">
+                      <a:alpha val="43137"/>
+                    </a:srgbClr>
+                  </a:outerShdw>
+                </a:effectLst>
+                <a:latin typeface="Aharoni" panose="02010803020104030203" pitchFamily="2" charset="-79"/>
+                <a:cs typeface="Aharoni" panose="02010803020104030203" pitchFamily="2" charset="-79"/>
+              </a:rPr>
+              <a:t>Mango</a:t>
+            </a:r>
+            <a:endParaRPr lang="en-US" dirty="0">
+              <a:effectLst>
+                <a:outerShdw blurRad="38100" dist="38100" dir="2700000" algn="tl">
+                  <a:srgbClr val="000000">
+                    <a:alpha val="43137"/>
+                  </a:srgbClr>
+                </a:outerShdw>
+              </a:effectLst>
+              <a:latin typeface="Aharoni" panose="02010803020104030203" pitchFamily="2" charset="-79"/>
+              <a:cs typeface="Aharoni" panose="02010803020104030203" pitchFamily="2" charset="-79"/>
+            </a:endParaRPr>
+          </a:p>
+        </p:txBody>
+      </p:sp>
+      <p:pic>
+        <p:nvPicPr>
+          <p:cNvPr id="6" name="Picture 3" descr="C:\Users\destreek\Downloads\1-140219130T0.gif"/>
+          <p:cNvPicPr>
+            <a:picLocks noChangeAspect="1" noChangeArrowheads="1" noCrop="1"/>
+          </p:cNvPicPr>
+          <p:nvPr/>
+        </p:nvPicPr>
+        <p:blipFill>
+          <a:blip r:embed="rId2" cstate="print">
+            <a:extLst>
+              <a:ext uri="{28A0092B-C50C-407E-A947-70E740481C1C}">
+                <a14:useLocalDpi xmlns:a14="http://schemas.microsoft.com/office/drawing/2010/main" val="0"/>
+              </a:ext>
+            </a:extLst>
+          </a:blip>
+          <a:srcRect/>
+          <a:stretch>
+            <a:fillRect/>
+          </a:stretch>
+        </p:blipFill>
+        <p:spPr bwMode="auto">
+          <a:xfrm>
+            <a:off x="304800" y="101600"/>
+            <a:ext cx="604837" cy="806450"/>
+          </a:xfrm>
+          <a:prstGeom prst="rect">
+            <a:avLst/>
+          </a:prstGeom>
+          <a:solidFill>
+            <a:schemeClr val="bg2">
+              <a:lumMod val="75000"/>
+            </a:schemeClr>
+          </a:solidFill>
+        </p:spPr>
+      </p:pic>
     </p:spTree>
     <p:extLst>
       <p:ext uri="{BB962C8B-B14F-4D97-AF65-F5344CB8AC3E}">
@@ -3399,6 +4915,266 @@
   <p:clrMapOvr>
     <a:masterClrMapping/>
   </p:clrMapOvr>
+  <p:timing>
+    <p:tnLst>
+      <p:par>
+        <p:cTn id="1" dur="indefinite" restart="never" nodeType="tmRoot"/>
+      </p:par>
+    </p:tnLst>
+  </p:timing>
+</p:sld>
+</file>
+
+<file path=ppt/slides/slide10.xml><?xml version="1.0" encoding="utf-8"?>
+<p:sld xmlns:a="http://schemas.openxmlformats.org/drawingml/2006/main" xmlns:r="http://schemas.openxmlformats.org/officeDocument/2006/relationships" xmlns:p="http://schemas.openxmlformats.org/presentationml/2006/main">
+  <p:cSld>
+    <p:spTree>
+      <p:nvGrpSpPr>
+        <p:cNvPr id="1" name=""/>
+        <p:cNvGrpSpPr/>
+        <p:nvPr/>
+      </p:nvGrpSpPr>
+      <p:grpSpPr>
+        <a:xfrm>
+          <a:off x="0" y="0"/>
+          <a:ext cx="0" cy="0"/>
+          <a:chOff x="0" y="0"/>
+          <a:chExt cx="0" cy="0"/>
+        </a:xfrm>
+      </p:grpSpPr>
+      <p:sp>
+        <p:nvSpPr>
+          <p:cNvPr id="2" name="Content Placeholder 1"/>
+          <p:cNvSpPr>
+            <a:spLocks noGrp="1"/>
+          </p:cNvSpPr>
+          <p:nvPr>
+            <p:ph idx="1"/>
+          </p:nvPr>
+        </p:nvSpPr>
+        <p:spPr>
+          <a:xfrm>
+            <a:off x="457200" y="1219201"/>
+            <a:ext cx="8229600" cy="5181599"/>
+          </a:xfrm>
+        </p:spPr>
+        <p:txBody>
+          <a:bodyPr anchor="t"/>
+          <a:lstStyle/>
+          <a:p>
+            <a:r>
+              <a:rPr lang="en-US" sz="3200" b="1" dirty="0" smtClean="0"/>
+              <a:t>Now let’s go!</a:t>
+            </a:r>
+            <a:endParaRPr lang="en-US" sz="3200" b="1" dirty="0"/>
+          </a:p>
+        </p:txBody>
+      </p:sp>
+      <p:sp>
+        <p:nvSpPr>
+          <p:cNvPr id="3" name="Title 2"/>
+          <p:cNvSpPr>
+            <a:spLocks noGrp="1"/>
+          </p:cNvSpPr>
+          <p:nvPr>
+            <p:ph type="title"/>
+          </p:nvPr>
+        </p:nvSpPr>
+        <p:spPr>
+          <a:xfrm>
+            <a:off x="381000" y="304800"/>
+            <a:ext cx="8305800" cy="533400"/>
+          </a:xfrm>
+        </p:spPr>
+        <p:txBody>
+          <a:bodyPr/>
+          <a:lstStyle/>
+          <a:p>
+            <a:r>
+              <a:rPr lang="en-US" dirty="0" smtClean="0"/>
+              <a:t>End</a:t>
+            </a:r>
+            <a:endParaRPr lang="en-US" dirty="0"/>
+          </a:p>
+        </p:txBody>
+      </p:sp>
+      <p:sp>
+        <p:nvSpPr>
+          <p:cNvPr id="5" name="Title 1"/>
+          <p:cNvSpPr txBox="1">
+            <a:spLocks/>
+          </p:cNvSpPr>
+          <p:nvPr/>
+        </p:nvSpPr>
+        <p:spPr>
+          <a:xfrm>
+            <a:off x="190500" y="908050"/>
+            <a:ext cx="1828800" cy="304800"/>
+          </a:xfrm>
+          <a:prstGeom prst="rect">
+            <a:avLst/>
+          </a:prstGeom>
+        </p:spPr>
+        <p:txBody>
+          <a:bodyPr vert="horz" lIns="91440" tIns="45720" rIns="91440" bIns="45720" rtlCol="0" anchor="b">
+            <a:normAutofit fontScale="55000" lnSpcReduction="20000"/>
+          </a:bodyPr>
+          <a:lstStyle>
+            <a:lvl1pPr algn="r" defTabSz="914400" rtl="0" eaLnBrk="1" latinLnBrk="0" hangingPunct="1">
+              <a:spcBef>
+                <a:spcPct val="0"/>
+              </a:spcBef>
+              <a:buNone/>
+              <a:defRPr sz="2800" kern="1200">
+                <a:gradFill>
+                  <a:gsLst>
+                    <a:gs pos="0">
+                      <a:schemeClr val="tx1">
+                        <a:lumMod val="50000"/>
+                      </a:schemeClr>
+                    </a:gs>
+                    <a:gs pos="61000">
+                      <a:schemeClr val="tx1"/>
+                    </a:gs>
+                  </a:gsLst>
+                  <a:lin ang="5400000" scaled="0"/>
+                </a:gradFill>
+                <a:effectLst/>
+                <a:latin typeface="+mj-lt"/>
+                <a:ea typeface="+mj-ea"/>
+                <a:cs typeface="+mj-cs"/>
+              </a:defRPr>
+            </a:lvl1pPr>
+          </a:lstStyle>
+          <a:p>
+            <a:pPr algn="l"/>
+            <a:r>
+              <a:rPr lang="en-US" dirty="0" smtClean="0">
+                <a:effectLst>
+                  <a:outerShdw blurRad="38100" dist="38100" dir="2700000" algn="tl">
+                    <a:srgbClr val="000000">
+                      <a:alpha val="43137"/>
+                    </a:srgbClr>
+                  </a:outerShdw>
+                </a:effectLst>
+                <a:latin typeface="Aharoni" panose="02010803020104030203" pitchFamily="2" charset="-79"/>
+                <a:cs typeface="Aharoni" panose="02010803020104030203" pitchFamily="2" charset="-79"/>
+              </a:rPr>
+              <a:t>Mango</a:t>
+            </a:r>
+            <a:endParaRPr lang="en-US" dirty="0">
+              <a:effectLst>
+                <a:outerShdw blurRad="38100" dist="38100" dir="2700000" algn="tl">
+                  <a:srgbClr val="000000">
+                    <a:alpha val="43137"/>
+                  </a:srgbClr>
+                </a:outerShdw>
+              </a:effectLst>
+              <a:latin typeface="Aharoni" panose="02010803020104030203" pitchFamily="2" charset="-79"/>
+              <a:cs typeface="Aharoni" panose="02010803020104030203" pitchFamily="2" charset="-79"/>
+            </a:endParaRPr>
+          </a:p>
+        </p:txBody>
+      </p:sp>
+      <p:pic>
+        <p:nvPicPr>
+          <p:cNvPr id="6" name="Picture 3" descr="C:\Users\destreek\Downloads\1-140219130T0.gif"/>
+          <p:cNvPicPr>
+            <a:picLocks noChangeAspect="1" noChangeArrowheads="1" noCrop="1"/>
+          </p:cNvPicPr>
+          <p:nvPr/>
+        </p:nvPicPr>
+        <p:blipFill>
+          <a:blip r:embed="rId3" cstate="print">
+            <a:extLst>
+              <a:ext uri="{28A0092B-C50C-407E-A947-70E740481C1C}">
+                <a14:useLocalDpi xmlns:a14="http://schemas.microsoft.com/office/drawing/2010/main" val="0"/>
+              </a:ext>
+            </a:extLst>
+          </a:blip>
+          <a:srcRect/>
+          <a:stretch>
+            <a:fillRect/>
+          </a:stretch>
+        </p:blipFill>
+        <p:spPr bwMode="auto">
+          <a:xfrm>
+            <a:off x="304800" y="101600"/>
+            <a:ext cx="604837" cy="806450"/>
+          </a:xfrm>
+          <a:prstGeom prst="rect">
+            <a:avLst/>
+          </a:prstGeom>
+          <a:noFill/>
+          <a:extLst>
+            <a:ext uri="{909E8E84-426E-40DD-AFC4-6F175D3DCCD1}">
+              <a14:hiddenFill xmlns:a14="http://schemas.microsoft.com/office/drawing/2010/main">
+                <a:solidFill>
+                  <a:srgbClr val="FFFFFF"/>
+                </a:solidFill>
+              </a14:hiddenFill>
+            </a:ext>
+          </a:extLst>
+        </p:spPr>
+      </p:pic>
+      <p:pic>
+        <p:nvPicPr>
+          <p:cNvPr id="6146" name="Picture 2" descr="C:\Users\destreek\Downloads\1-140219130R9.gif"/>
+          <p:cNvPicPr>
+            <a:picLocks noChangeAspect="1" noChangeArrowheads="1" noCrop="1"/>
+          </p:cNvPicPr>
+          <p:nvPr/>
+        </p:nvPicPr>
+        <p:blipFill>
+          <a:blip r:embed="rId4">
+            <a:extLst>
+              <a:ext uri="{28A0092B-C50C-407E-A947-70E740481C1C}">
+                <a14:useLocalDpi xmlns:a14="http://schemas.microsoft.com/office/drawing/2010/main" val="0"/>
+              </a:ext>
+            </a:extLst>
+          </a:blip>
+          <a:srcRect/>
+          <a:stretch>
+            <a:fillRect/>
+          </a:stretch>
+        </p:blipFill>
+        <p:spPr bwMode="auto">
+          <a:xfrm>
+            <a:off x="4114800" y="1212850"/>
+            <a:ext cx="3810000" cy="5264150"/>
+          </a:xfrm>
+          <a:prstGeom prst="rect">
+            <a:avLst/>
+          </a:prstGeom>
+          <a:noFill/>
+          <a:extLst>
+            <a:ext uri="{909E8E84-426E-40DD-AFC4-6F175D3DCCD1}">
+              <a14:hiddenFill xmlns:a14="http://schemas.microsoft.com/office/drawing/2010/main">
+                <a:solidFill>
+                  <a:srgbClr val="FFFFFF"/>
+                </a:solidFill>
+              </a14:hiddenFill>
+            </a:ext>
+          </a:extLst>
+        </p:spPr>
+      </p:pic>
+    </p:spTree>
+    <p:extLst>
+      <p:ext uri="{BB962C8B-B14F-4D97-AF65-F5344CB8AC3E}">
+        <p14:creationId xmlns:p14="http://schemas.microsoft.com/office/powerpoint/2010/main" val="199004690"/>
+      </p:ext>
+    </p:extLst>
+  </p:cSld>
+  <p:clrMapOvr>
+    <a:masterClrMapping/>
+  </p:clrMapOvr>
+  <p:timing>
+    <p:tnLst>
+      <p:par>
+        <p:cTn id="1" dur="indefinite" restart="never" nodeType="tmRoot"/>
+      </p:par>
+    </p:tnLst>
+  </p:timing>
 </p:sld>
 </file>
 
@@ -3463,6 +5239,12 @@
             </a:r>
           </a:p>
           <a:p>
+            <a:r>
+              <a:rPr lang="en-US" sz="2800" dirty="0" smtClean="0"/>
+              <a:t>Discussion</a:t>
+            </a:r>
+          </a:p>
+          <a:p>
             <a:endParaRPr lang="en-US" dirty="0" smtClean="0"/>
           </a:p>
           <a:p>
@@ -3498,6 +5280,120 @@
           </a:p>
         </p:txBody>
       </p:sp>
+      <p:sp>
+        <p:nvSpPr>
+          <p:cNvPr id="5" name="Title 1"/>
+          <p:cNvSpPr txBox="1">
+            <a:spLocks/>
+          </p:cNvSpPr>
+          <p:nvPr/>
+        </p:nvSpPr>
+        <p:spPr>
+          <a:xfrm>
+            <a:off x="190500" y="908050"/>
+            <a:ext cx="1828800" cy="304800"/>
+          </a:xfrm>
+          <a:prstGeom prst="rect">
+            <a:avLst/>
+          </a:prstGeom>
+        </p:spPr>
+        <p:txBody>
+          <a:bodyPr vert="horz" lIns="91440" tIns="45720" rIns="91440" bIns="45720" rtlCol="0" anchor="b">
+            <a:normAutofit fontScale="55000" lnSpcReduction="20000"/>
+          </a:bodyPr>
+          <a:lstStyle>
+            <a:lvl1pPr algn="r" defTabSz="914400" rtl="0" eaLnBrk="1" latinLnBrk="0" hangingPunct="1">
+              <a:spcBef>
+                <a:spcPct val="0"/>
+              </a:spcBef>
+              <a:buNone/>
+              <a:defRPr sz="2800" kern="1200">
+                <a:gradFill>
+                  <a:gsLst>
+                    <a:gs pos="0">
+                      <a:schemeClr val="tx1">
+                        <a:lumMod val="50000"/>
+                      </a:schemeClr>
+                    </a:gs>
+                    <a:gs pos="61000">
+                      <a:schemeClr val="tx1"/>
+                    </a:gs>
+                  </a:gsLst>
+                  <a:lin ang="5400000" scaled="0"/>
+                </a:gradFill>
+                <a:effectLst/>
+                <a:latin typeface="+mj-lt"/>
+                <a:ea typeface="+mj-ea"/>
+                <a:cs typeface="+mj-cs"/>
+              </a:defRPr>
+            </a:lvl1pPr>
+          </a:lstStyle>
+          <a:p>
+            <a:pPr algn="l"/>
+            <a:r>
+              <a:rPr lang="en-US" dirty="0" smtClean="0">
+                <a:effectLst>
+                  <a:outerShdw blurRad="38100" dist="38100" dir="2700000" algn="tl">
+                    <a:srgbClr val="000000">
+                      <a:alpha val="43137"/>
+                    </a:srgbClr>
+                  </a:outerShdw>
+                </a:effectLst>
+                <a:latin typeface="Aharoni" panose="02010803020104030203" pitchFamily="2" charset="-79"/>
+                <a:cs typeface="Aharoni" panose="02010803020104030203" pitchFamily="2" charset="-79"/>
+              </a:rPr>
+              <a:t>Mango</a:t>
+            </a:r>
+            <a:endParaRPr lang="en-US" dirty="0">
+              <a:effectLst>
+                <a:outerShdw blurRad="38100" dist="38100" dir="2700000" algn="tl">
+                  <a:srgbClr val="000000">
+                    <a:alpha val="43137"/>
+                  </a:srgbClr>
+                </a:outerShdw>
+              </a:effectLst>
+              <a:latin typeface="Aharoni" panose="02010803020104030203" pitchFamily="2" charset="-79"/>
+              <a:cs typeface="Aharoni" panose="02010803020104030203" pitchFamily="2" charset="-79"/>
+            </a:endParaRPr>
+          </a:p>
+        </p:txBody>
+      </p:sp>
+      <p:pic>
+        <p:nvPicPr>
+          <p:cNvPr id="6" name="Picture 3" descr="C:\Users\destreek\Downloads\1-140219130T0.gif"/>
+          <p:cNvPicPr>
+            <a:picLocks noChangeAspect="1" noChangeArrowheads="1" noCrop="1"/>
+          </p:cNvPicPr>
+          <p:nvPr/>
+        </p:nvPicPr>
+        <p:blipFill>
+          <a:blip r:embed="rId3" cstate="print">
+            <a:extLst>
+              <a:ext uri="{28A0092B-C50C-407E-A947-70E740481C1C}">
+                <a14:useLocalDpi xmlns:a14="http://schemas.microsoft.com/office/drawing/2010/main" val="0"/>
+              </a:ext>
+            </a:extLst>
+          </a:blip>
+          <a:srcRect/>
+          <a:stretch>
+            <a:fillRect/>
+          </a:stretch>
+        </p:blipFill>
+        <p:spPr bwMode="auto">
+          <a:xfrm>
+            <a:off x="304800" y="101600"/>
+            <a:ext cx="604837" cy="806450"/>
+          </a:xfrm>
+          <a:prstGeom prst="rect">
+            <a:avLst/>
+          </a:prstGeom>
+          <a:solidFill>
+            <a:schemeClr val="bg2">
+              <a:lumMod val="75000"/>
+            </a:schemeClr>
+          </a:solidFill>
+        </p:spPr>
+      </p:pic>
     </p:spTree>
     <p:extLst>
       <p:ext uri="{BB962C8B-B14F-4D97-AF65-F5344CB8AC3E}">
@@ -3508,6 +5404,13 @@
   <p:clrMapOvr>
     <a:masterClrMapping/>
   </p:clrMapOvr>
+  <p:timing>
+    <p:tnLst>
+      <p:par>
+        <p:cTn id="1" dur="indefinite" restart="never" nodeType="tmRoot"/>
+      </p:par>
+    </p:tnLst>
+  </p:timing>
 </p:sld>
 </file>
 
@@ -3556,7 +5459,42 @@
           <a:p>
             <a:r>
               <a:rPr lang="en-US" sz="2800" dirty="0" smtClean="0"/>
-              <a:t>Project: Differential gene expression</a:t>
+              <a:t>Project: Differential gene expression in yeast</a:t>
+            </a:r>
+          </a:p>
+          <a:p>
+            <a:r>
+              <a:rPr lang="en-US" sz="2800" dirty="0"/>
+              <a:t>Discussed:</a:t>
+            </a:r>
+            <a:endParaRPr lang="en-US" sz="3600" dirty="0"/>
+          </a:p>
+          <a:p>
+            <a:pPr lvl="1"/>
+            <a:r>
+              <a:rPr lang="en-US" sz="2800" dirty="0"/>
+              <a:t>Biological framework of the pipeline</a:t>
+            </a:r>
+          </a:p>
+          <a:p>
+            <a:pPr lvl="1"/>
+            <a:r>
+              <a:rPr lang="en-US" sz="2800" dirty="0"/>
+              <a:t>Assign priorities to the parts of the pipeline</a:t>
+            </a:r>
+          </a:p>
+          <a:p>
+            <a:pPr lvl="1"/>
+            <a:r>
+              <a:rPr lang="en-US" sz="2800" dirty="0"/>
+              <a:t>Draft planning</a:t>
+            </a:r>
+          </a:p>
+          <a:p>
+            <a:pPr lvl="1"/>
+            <a:r>
+              <a:rPr lang="en-US" sz="2800" dirty="0"/>
+              <a:t>Source control and project management</a:t>
             </a:r>
           </a:p>
           <a:p>
@@ -3592,6 +5530,120 @@
           </a:p>
         </p:txBody>
       </p:sp>
+      <p:sp>
+        <p:nvSpPr>
+          <p:cNvPr id="4" name="Title 1"/>
+          <p:cNvSpPr txBox="1">
+            <a:spLocks/>
+          </p:cNvSpPr>
+          <p:nvPr/>
+        </p:nvSpPr>
+        <p:spPr>
+          <a:xfrm>
+            <a:off x="190500" y="908050"/>
+            <a:ext cx="1828800" cy="304800"/>
+          </a:xfrm>
+          <a:prstGeom prst="rect">
+            <a:avLst/>
+          </a:prstGeom>
+        </p:spPr>
+        <p:txBody>
+          <a:bodyPr vert="horz" lIns="91440" tIns="45720" rIns="91440" bIns="45720" rtlCol="0" anchor="b">
+            <a:normAutofit fontScale="55000" lnSpcReduction="20000"/>
+          </a:bodyPr>
+          <a:lstStyle>
+            <a:lvl1pPr algn="r" defTabSz="914400" rtl="0" eaLnBrk="1" latinLnBrk="0" hangingPunct="1">
+              <a:spcBef>
+                <a:spcPct val="0"/>
+              </a:spcBef>
+              <a:buNone/>
+              <a:defRPr sz="2800" kern="1200">
+                <a:gradFill>
+                  <a:gsLst>
+                    <a:gs pos="0">
+                      <a:schemeClr val="tx1">
+                        <a:lumMod val="50000"/>
+                      </a:schemeClr>
+                    </a:gs>
+                    <a:gs pos="61000">
+                      <a:schemeClr val="tx1"/>
+                    </a:gs>
+                  </a:gsLst>
+                  <a:lin ang="5400000" scaled="0"/>
+                </a:gradFill>
+                <a:effectLst/>
+                <a:latin typeface="+mj-lt"/>
+                <a:ea typeface="+mj-ea"/>
+                <a:cs typeface="+mj-cs"/>
+              </a:defRPr>
+            </a:lvl1pPr>
+          </a:lstStyle>
+          <a:p>
+            <a:pPr algn="l"/>
+            <a:r>
+              <a:rPr lang="en-US" dirty="0" smtClean="0">
+                <a:effectLst>
+                  <a:outerShdw blurRad="38100" dist="38100" dir="2700000" algn="tl">
+                    <a:srgbClr val="000000">
+                      <a:alpha val="43137"/>
+                    </a:srgbClr>
+                  </a:outerShdw>
+                </a:effectLst>
+                <a:latin typeface="Aharoni" panose="02010803020104030203" pitchFamily="2" charset="-79"/>
+                <a:cs typeface="Aharoni" panose="02010803020104030203" pitchFamily="2" charset="-79"/>
+              </a:rPr>
+              <a:t>Mango</a:t>
+            </a:r>
+            <a:endParaRPr lang="en-US" dirty="0">
+              <a:effectLst>
+                <a:outerShdw blurRad="38100" dist="38100" dir="2700000" algn="tl">
+                  <a:srgbClr val="000000">
+                    <a:alpha val="43137"/>
+                  </a:srgbClr>
+                </a:outerShdw>
+              </a:effectLst>
+              <a:latin typeface="Aharoni" panose="02010803020104030203" pitchFamily="2" charset="-79"/>
+              <a:cs typeface="Aharoni" panose="02010803020104030203" pitchFamily="2" charset="-79"/>
+            </a:endParaRPr>
+          </a:p>
+        </p:txBody>
+      </p:sp>
+      <p:pic>
+        <p:nvPicPr>
+          <p:cNvPr id="3075" name="Picture 3" descr="C:\Users\destreek\Downloads\1-140219130T0.gif"/>
+          <p:cNvPicPr>
+            <a:picLocks noChangeAspect="1" noChangeArrowheads="1" noCrop="1"/>
+          </p:cNvPicPr>
+          <p:nvPr/>
+        </p:nvPicPr>
+        <p:blipFill>
+          <a:blip r:embed="rId3" cstate="print">
+            <a:extLst>
+              <a:ext uri="{28A0092B-C50C-407E-A947-70E740481C1C}">
+                <a14:useLocalDpi xmlns:a14="http://schemas.microsoft.com/office/drawing/2010/main" val="0"/>
+              </a:ext>
+            </a:extLst>
+          </a:blip>
+          <a:srcRect/>
+          <a:stretch>
+            <a:fillRect/>
+          </a:stretch>
+        </p:blipFill>
+        <p:spPr bwMode="auto">
+          <a:xfrm>
+            <a:off x="304800" y="101600"/>
+            <a:ext cx="604837" cy="806450"/>
+          </a:xfrm>
+          <a:prstGeom prst="rect">
+            <a:avLst/>
+          </a:prstGeom>
+          <a:solidFill>
+            <a:schemeClr val="bg2">
+              <a:lumMod val="75000"/>
+            </a:schemeClr>
+          </a:solidFill>
+        </p:spPr>
+      </p:pic>
     </p:spTree>
     <p:extLst>
       <p:ext uri="{BB962C8B-B14F-4D97-AF65-F5344CB8AC3E}">
@@ -3602,6 +5654,13 @@
   <p:clrMapOvr>
     <a:masterClrMapping/>
   </p:clrMapOvr>
+  <p:timing>
+    <p:tnLst>
+      <p:par>
+        <p:cTn id="1" dur="indefinite" restart="never" nodeType="tmRoot"/>
+      </p:par>
+    </p:tnLst>
+  </p:timing>
 </p:sld>
 </file>
 
@@ -3634,55 +5693,279 @@
         </p:nvSpPr>
         <p:spPr>
           <a:xfrm>
-            <a:off x="457200" y="990600"/>
-            <a:ext cx="8229600" cy="5181599"/>
-          </a:xfrm>
-        </p:spPr>
-        <p:txBody>
-          <a:bodyPr/>
+            <a:off x="228600" y="1066800"/>
+            <a:ext cx="8229600" cy="4419600"/>
+          </a:xfrm>
+        </p:spPr>
+        <p:txBody>
+          <a:bodyPr numCol="3" anchor="t">
+            <a:normAutofit/>
+          </a:bodyPr>
           <a:lstStyle/>
+          <a:p>
+            <a:r>
+              <a:rPr lang="en-US" sz="3600" dirty="0" err="1" smtClean="0"/>
+              <a:t>MoSCoW</a:t>
+            </a:r>
+            <a:r>
+              <a:rPr lang="en-US" sz="3600" dirty="0" smtClean="0"/>
+              <a:t> list</a:t>
+            </a:r>
+          </a:p>
+          <a:p>
+            <a:pPr marL="228600" lvl="1" indent="0">
+              <a:buNone/>
+            </a:pPr>
+            <a:r>
+              <a:rPr lang="en-GB" dirty="0" smtClean="0"/>
+              <a:t>MUST</a:t>
+            </a:r>
+          </a:p>
+          <a:p>
+            <a:pPr lvl="1"/>
+            <a:r>
+              <a:rPr lang="en-GB" dirty="0" smtClean="0"/>
+              <a:t>Data </a:t>
+            </a:r>
+            <a:r>
+              <a:rPr lang="en-GB" dirty="0"/>
+              <a:t>format</a:t>
+            </a:r>
+            <a:endParaRPr lang="en-US" dirty="0"/>
+          </a:p>
+          <a:p>
+            <a:pPr lvl="1"/>
+            <a:r>
+              <a:rPr lang="en-GB" dirty="0"/>
+              <a:t>Quality </a:t>
+            </a:r>
+            <a:r>
+              <a:rPr lang="en-GB" dirty="0" smtClean="0"/>
+              <a:t>control</a:t>
+            </a:r>
+            <a:endParaRPr lang="en-US" dirty="0"/>
+          </a:p>
+          <a:p>
+            <a:pPr lvl="1"/>
+            <a:r>
+              <a:rPr lang="en-GB" dirty="0"/>
+              <a:t>Quality </a:t>
+            </a:r>
+            <a:r>
+              <a:rPr lang="en-GB" dirty="0" smtClean="0"/>
+              <a:t>improvement</a:t>
+            </a:r>
+            <a:endParaRPr lang="en-US" dirty="0"/>
+          </a:p>
+          <a:p>
+            <a:pPr lvl="1"/>
+            <a:r>
+              <a:rPr lang="en-GB" dirty="0" smtClean="0"/>
+              <a:t>Mapping</a:t>
+            </a:r>
+          </a:p>
+          <a:p>
+            <a:pPr lvl="1"/>
+            <a:r>
+              <a:rPr lang="en-GB" dirty="0" smtClean="0"/>
+              <a:t>Count reads</a:t>
+            </a:r>
+          </a:p>
+          <a:p>
+            <a:pPr lvl="1"/>
+            <a:r>
+              <a:rPr lang="en-GB" dirty="0" smtClean="0"/>
+              <a:t>Data normalization</a:t>
+            </a:r>
+          </a:p>
+          <a:p>
+            <a:pPr lvl="1"/>
+            <a:r>
+              <a:rPr lang="en-GB" dirty="0" smtClean="0"/>
+              <a:t>Differential </a:t>
+            </a:r>
+            <a:r>
+              <a:rPr lang="en-GB" dirty="0"/>
+              <a:t>expression  </a:t>
+            </a:r>
+            <a:endParaRPr lang="en-GB" dirty="0" smtClean="0"/>
+          </a:p>
+          <a:p>
+            <a:pPr lvl="1"/>
+            <a:r>
+              <a:rPr lang="en-GB" dirty="0" smtClean="0"/>
+              <a:t>Enrichment</a:t>
+            </a:r>
+            <a:endParaRPr lang="en-US" dirty="0"/>
+          </a:p>
+          <a:p>
+            <a:endParaRPr lang="en-US" sz="3600" dirty="0" smtClean="0"/>
+          </a:p>
+          <a:p>
+            <a:endParaRPr lang="en-US" sz="3600" dirty="0"/>
+          </a:p>
           <a:p>
             <a:pPr marL="0" indent="0">
               <a:buNone/>
             </a:pPr>
-            <a:endParaRPr lang="en-US" dirty="0" smtClean="0"/>
-          </a:p>
-          <a:p>
-            <a:r>
-              <a:rPr lang="en-US" sz="3600" dirty="0" smtClean="0"/>
-              <a:t>Discussed:</a:t>
-            </a:r>
+            <a:r>
+              <a:rPr lang="en-US" sz="3600" dirty="0"/>
+              <a:t>pipeline</a:t>
+            </a:r>
+            <a:endParaRPr lang="en-US" sz="3600" dirty="0" smtClean="0"/>
+          </a:p>
+          <a:p>
+            <a:pPr marL="0" indent="0">
+              <a:buNone/>
+            </a:pPr>
+            <a:r>
+              <a:rPr lang="en-GB" sz="1400" dirty="0" smtClean="0"/>
+              <a:t>SHOULD</a:t>
+            </a:r>
+          </a:p>
+          <a:p>
+            <a:r>
+              <a:rPr lang="en-GB" sz="1400" dirty="0"/>
+              <a:t>Chose appropriate software for:</a:t>
+            </a:r>
+            <a:endParaRPr lang="en-US" sz="1400" dirty="0"/>
           </a:p>
           <a:p>
             <a:pPr lvl="1"/>
             <a:r>
-              <a:rPr lang="en-US" sz="2800" dirty="0" smtClean="0"/>
-              <a:t>Biological framework of the pipeline</a:t>
-            </a:r>
+              <a:rPr lang="en-GB" dirty="0"/>
+              <a:t>Mapping</a:t>
+            </a:r>
+            <a:endParaRPr lang="en-US" dirty="0"/>
           </a:p>
           <a:p>
             <a:pPr lvl="1"/>
             <a:r>
-              <a:rPr lang="en-US" sz="2800" dirty="0" smtClean="0"/>
-              <a:t>Assign priorities to the parts of the pipeline</a:t>
-            </a:r>
+              <a:rPr lang="en-GB" dirty="0"/>
+              <a:t>Count reads</a:t>
+            </a:r>
+            <a:endParaRPr lang="en-US" dirty="0"/>
           </a:p>
           <a:p>
             <a:pPr lvl="1"/>
             <a:r>
-              <a:rPr lang="en-US" sz="2800" dirty="0" smtClean="0"/>
-              <a:t>Draft planning</a:t>
+              <a:rPr lang="en-GB" dirty="0"/>
+              <a:t>Normalization</a:t>
+            </a:r>
+            <a:endParaRPr lang="en-US" dirty="0"/>
+          </a:p>
+          <a:p>
+            <a:r>
+              <a:rPr lang="en-GB" sz="1400" dirty="0"/>
+              <a:t>Mapping quality</a:t>
+            </a:r>
+            <a:endParaRPr lang="en-US" sz="1400" dirty="0"/>
+          </a:p>
+          <a:p>
+            <a:r>
+              <a:rPr lang="en-GB" sz="1400" dirty="0" smtClean="0"/>
+              <a:t>Enrichment</a:t>
+            </a:r>
+            <a:endParaRPr lang="en-US" dirty="0"/>
+          </a:p>
+          <a:p>
+            <a:r>
+              <a:rPr lang="en-GB" sz="1400" dirty="0" err="1" smtClean="0"/>
+              <a:t>Bioconductor</a:t>
+            </a:r>
+            <a:r>
+              <a:rPr lang="en-GB" sz="1400" dirty="0" smtClean="0"/>
+              <a:t>?</a:t>
+            </a:r>
+            <a:endParaRPr lang="en-US" sz="1400" dirty="0" smtClean="0"/>
+          </a:p>
+          <a:p>
+            <a:endParaRPr lang="en-US" sz="3200" dirty="0" smtClean="0"/>
+          </a:p>
+          <a:p>
+            <a:endParaRPr lang="en-US" sz="3200" dirty="0"/>
+          </a:p>
+          <a:p>
+            <a:endParaRPr lang="en-US" sz="3200" dirty="0" smtClean="0"/>
+          </a:p>
+          <a:p>
+            <a:pPr marL="0" lvl="0" indent="0">
+              <a:buNone/>
+            </a:pPr>
+            <a:r>
+              <a:rPr lang="en-GB" sz="1400" dirty="0" smtClean="0"/>
+              <a:t>COULD </a:t>
+            </a:r>
+            <a:r>
+              <a:rPr lang="en-GB" sz="1400" dirty="0"/>
+              <a:t>(future</a:t>
+            </a:r>
+            <a:r>
+              <a:rPr lang="en-GB" sz="1400" dirty="0" smtClean="0"/>
+              <a:t>)</a:t>
+            </a:r>
+          </a:p>
+          <a:p>
+            <a:r>
+              <a:rPr lang="en-GB" sz="1400" dirty="0" smtClean="0"/>
+              <a:t>Output comparison:</a:t>
             </a:r>
           </a:p>
           <a:p>
             <a:pPr lvl="1"/>
             <a:r>
-              <a:rPr lang="en-US" sz="2800" dirty="0" smtClean="0"/>
-              <a:t>Source control and project management</a:t>
-            </a:r>
-          </a:p>
-          <a:p>
-            <a:endParaRPr lang="en-US" dirty="0"/>
+              <a:rPr lang="en-GB" dirty="0" smtClean="0"/>
+              <a:t>Aligner</a:t>
+            </a:r>
+            <a:r>
+              <a:rPr lang="en-GB" dirty="0"/>
+              <a:t>: </a:t>
+            </a:r>
+            <a:r>
+              <a:rPr lang="en-GB" dirty="0" err="1" smtClean="0"/>
+              <a:t>Stampy</a:t>
+            </a:r>
+            <a:endParaRPr lang="en-GB" dirty="0" smtClean="0"/>
+          </a:p>
+          <a:p>
+            <a:pPr lvl="1"/>
+            <a:r>
+              <a:rPr lang="en-GB" dirty="0" smtClean="0"/>
+              <a:t>DE: </a:t>
+            </a:r>
+            <a:r>
+              <a:rPr lang="en-GB" dirty="0" err="1" smtClean="0"/>
+              <a:t>EdgeR</a:t>
+            </a:r>
+            <a:endParaRPr lang="en-GB" dirty="0" smtClean="0"/>
+          </a:p>
+          <a:p>
+            <a:r>
+              <a:rPr lang="en-GB" sz="1400" dirty="0" smtClean="0"/>
+              <a:t>De novo assembly</a:t>
+            </a:r>
+          </a:p>
+          <a:p>
+            <a:r>
+              <a:rPr lang="en-GB" sz="1400" dirty="0" smtClean="0"/>
+              <a:t>Handle missing values</a:t>
+            </a:r>
+          </a:p>
+          <a:p>
+            <a:r>
+              <a:rPr lang="en-GB" sz="1400" dirty="0" smtClean="0"/>
+              <a:t>Networks assembly</a:t>
+            </a:r>
+          </a:p>
+          <a:p>
+            <a:r>
+              <a:rPr lang="en-GB" sz="1400" dirty="0" smtClean="0"/>
+              <a:t>Motif recognition</a:t>
+            </a:r>
+            <a:endParaRPr lang="en-US" sz="1400" dirty="0"/>
+          </a:p>
+          <a:p>
+            <a:endParaRPr lang="en-US" sz="3200" dirty="0"/>
           </a:p>
         </p:txBody>
       </p:sp>
@@ -3708,22 +5991,183 @@
           <a:p>
             <a:r>
               <a:rPr lang="en-US" dirty="0" smtClean="0"/>
-              <a:t>Project-kickoff</a:t>
+              <a:t>Project-progress</a:t>
             </a:r>
             <a:endParaRPr lang="en-US" dirty="0"/>
+          </a:p>
+        </p:txBody>
+      </p:sp>
+      <p:pic>
+        <p:nvPicPr>
+          <p:cNvPr id="4098" name="Picture 2"/>
+          <p:cNvPicPr>
+            <a:picLocks noChangeAspect="1" noChangeArrowheads="1"/>
+          </p:cNvPicPr>
+          <p:nvPr/>
+        </p:nvPicPr>
+        <p:blipFill>
+          <a:blip r:embed="rId3">
+            <a:extLst>
+              <a:ext uri="{28A0092B-C50C-407E-A947-70E740481C1C}">
+                <a14:useLocalDpi xmlns:a14="http://schemas.microsoft.com/office/drawing/2010/main" val="0"/>
+              </a:ext>
+            </a:extLst>
+          </a:blip>
+          <a:srcRect/>
+          <a:stretch>
+            <a:fillRect/>
+          </a:stretch>
+        </p:blipFill>
+        <p:spPr bwMode="auto">
+          <a:xfrm>
+            <a:off x="301752" y="100584"/>
+            <a:ext cx="603504" cy="804672"/>
+          </a:xfrm>
+          <a:prstGeom prst="rect">
+            <a:avLst/>
+          </a:prstGeom>
+          <a:noFill/>
+          <a:ln>
+            <a:noFill/>
+          </a:ln>
+          <a:effectLst/>
+          <a:extLst>
+            <a:ext uri="{909E8E84-426E-40DD-AFC4-6F175D3DCCD1}">
+              <a14:hiddenFill xmlns:a14="http://schemas.microsoft.com/office/drawing/2010/main">
+                <a:solidFill>
+                  <a:schemeClr val="accent1"/>
+                </a:solidFill>
+              </a14:hiddenFill>
+            </a:ext>
+            <a:ext uri="{91240B29-F687-4F45-9708-019B960494DF}">
+              <a14:hiddenLine xmlns:a14="http://schemas.microsoft.com/office/drawing/2010/main" w="9525">
+                <a:solidFill>
+                  <a:schemeClr val="tx1"/>
+                </a:solidFill>
+                <a:miter lim="800000"/>
+                <a:headEnd/>
+                <a:tailEnd/>
+              </a14:hiddenLine>
+            </a:ext>
+            <a:ext uri="{AF507438-7753-43E0-B8FC-AC1667EBCBE1}">
+              <a14:hiddenEffects xmlns:a14="http://schemas.microsoft.com/office/drawing/2010/main">
+                <a:effectLst>
+                  <a:outerShdw dist="35921" dir="2700000" algn="ctr" rotWithShape="0">
+                    <a:schemeClr val="bg2"/>
+                  </a:outerShdw>
+                </a:effectLst>
+              </a14:hiddenEffects>
+            </a:ext>
+          </a:extLst>
+        </p:spPr>
+      </p:pic>
+      <p:sp>
+        <p:nvSpPr>
+          <p:cNvPr id="7" name="Title 1"/>
+          <p:cNvSpPr txBox="1">
+            <a:spLocks/>
+          </p:cNvSpPr>
+          <p:nvPr/>
+        </p:nvSpPr>
+        <p:spPr>
+          <a:xfrm>
+            <a:off x="190500" y="908050"/>
+            <a:ext cx="1828800" cy="304800"/>
+          </a:xfrm>
+          <a:prstGeom prst="rect">
+            <a:avLst/>
+          </a:prstGeom>
+        </p:spPr>
+        <p:txBody>
+          <a:bodyPr vert="horz" lIns="91440" tIns="45720" rIns="91440" bIns="45720" rtlCol="0" anchor="b">
+            <a:normAutofit fontScale="55000" lnSpcReduction="20000"/>
+          </a:bodyPr>
+          <a:lstStyle>
+            <a:lvl1pPr algn="r" defTabSz="914400" rtl="0" eaLnBrk="1" latinLnBrk="0" hangingPunct="1">
+              <a:spcBef>
+                <a:spcPct val="0"/>
+              </a:spcBef>
+              <a:buNone/>
+              <a:defRPr sz="2800" kern="1200">
+                <a:gradFill>
+                  <a:gsLst>
+                    <a:gs pos="0">
+                      <a:schemeClr val="tx1">
+                        <a:lumMod val="50000"/>
+                      </a:schemeClr>
+                    </a:gs>
+                    <a:gs pos="61000">
+                      <a:schemeClr val="tx1"/>
+                    </a:gs>
+                  </a:gsLst>
+                  <a:lin ang="5400000" scaled="0"/>
+                </a:gradFill>
+                <a:effectLst/>
+                <a:latin typeface="+mj-lt"/>
+                <a:ea typeface="+mj-ea"/>
+                <a:cs typeface="+mj-cs"/>
+              </a:defRPr>
+            </a:lvl1pPr>
+          </a:lstStyle>
+          <a:p>
+            <a:pPr algn="l"/>
+            <a:r>
+              <a:rPr lang="en-US" dirty="0" smtClean="0">
+                <a:effectLst>
+                  <a:outerShdw blurRad="38100" dist="38100" dir="2700000" algn="tl">
+                    <a:srgbClr val="000000">
+                      <a:alpha val="43137"/>
+                    </a:srgbClr>
+                  </a:outerShdw>
+                </a:effectLst>
+                <a:latin typeface="Aharoni" panose="02010803020104030203" pitchFamily="2" charset="-79"/>
+                <a:cs typeface="Aharoni" panose="02010803020104030203" pitchFamily="2" charset="-79"/>
+              </a:rPr>
+              <a:t>Mango</a:t>
+            </a:r>
+            <a:endParaRPr lang="en-US" dirty="0">
+              <a:effectLst>
+                <a:outerShdw blurRad="38100" dist="38100" dir="2700000" algn="tl">
+                  <a:srgbClr val="000000">
+                    <a:alpha val="43137"/>
+                  </a:srgbClr>
+                </a:outerShdw>
+              </a:effectLst>
+              <a:latin typeface="Aharoni" panose="02010803020104030203" pitchFamily="2" charset="-79"/>
+              <a:cs typeface="Aharoni" panose="02010803020104030203" pitchFamily="2" charset="-79"/>
+            </a:endParaRPr>
           </a:p>
         </p:txBody>
       </p:sp>
     </p:spTree>
     <p:extLst>
       <p:ext uri="{BB962C8B-B14F-4D97-AF65-F5344CB8AC3E}">
-        <p14:creationId xmlns:p14="http://schemas.microsoft.com/office/powerpoint/2010/main" val="1503096179"/>
+        <p14:creationId xmlns:p14="http://schemas.microsoft.com/office/powerpoint/2010/main" val="624634856"/>
       </p:ext>
     </p:extLst>
   </p:cSld>
   <p:clrMapOvr>
     <a:masterClrMapping/>
   </p:clrMapOvr>
+  <mc:AlternateContent xmlns:mc="http://schemas.openxmlformats.org/markup-compatibility/2006">
+    <mc:Choice xmlns:p14="http://schemas.microsoft.com/office/powerpoint/2010/main" Requires="p14">
+      <p:transition spd="slow" p14:dur="2500">
+        <p:checker/>
+      </p:transition>
+    </mc:Choice>
+    <mc:Fallback>
+      <p:transition spd="slow">
+        <p:checker/>
+      </p:transition>
+    </mc:Fallback>
+  </mc:AlternateContent>
+  <p:timing>
+    <p:tnLst>
+      <p:par>
+        <p:cTn id="1" dur="indefinite" restart="never" nodeType="tmRoot"/>
+      </p:par>
+    </p:tnLst>
+  </p:timing>
 </p:sld>
 </file>
 
@@ -3746,98 +6190,6 @@
       </p:grpSpPr>
       <p:sp>
         <p:nvSpPr>
-          <p:cNvPr id="2" name="Content Placeholder 1"/>
-          <p:cNvSpPr>
-            <a:spLocks noGrp="1"/>
-          </p:cNvSpPr>
-          <p:nvPr>
-            <p:ph idx="1"/>
-          </p:nvPr>
-        </p:nvSpPr>
-        <p:spPr>
-          <a:xfrm>
-            <a:off x="457200" y="990600"/>
-            <a:ext cx="8229600" cy="5181599"/>
-          </a:xfrm>
-        </p:spPr>
-        <p:txBody>
-          <a:bodyPr/>
-          <a:lstStyle/>
-          <a:p>
-            <a:r>
-              <a:rPr lang="en-US" sz="3600" dirty="0" err="1" smtClean="0"/>
-              <a:t>MoSCoW</a:t>
-            </a:r>
-            <a:r>
-              <a:rPr lang="en-US" sz="3600" dirty="0" smtClean="0"/>
-              <a:t> list</a:t>
-            </a:r>
-          </a:p>
-          <a:p>
-            <a:endParaRPr lang="en-US" sz="3200" dirty="0"/>
-          </a:p>
-        </p:txBody>
-      </p:sp>
-      <p:sp>
-        <p:nvSpPr>
-          <p:cNvPr id="3" name="Title 2"/>
-          <p:cNvSpPr>
-            <a:spLocks noGrp="1"/>
-          </p:cNvSpPr>
-          <p:nvPr>
-            <p:ph type="title"/>
-          </p:nvPr>
-        </p:nvSpPr>
-        <p:spPr>
-          <a:xfrm>
-            <a:off x="381000" y="304800"/>
-            <a:ext cx="8305800" cy="533400"/>
-          </a:xfrm>
-        </p:spPr>
-        <p:txBody>
-          <a:bodyPr/>
-          <a:lstStyle/>
-          <a:p>
-            <a:r>
-              <a:rPr lang="en-US" dirty="0" smtClean="0"/>
-              <a:t>Project-progress</a:t>
-            </a:r>
-            <a:endParaRPr lang="en-US" dirty="0"/>
-          </a:p>
-        </p:txBody>
-      </p:sp>
-    </p:spTree>
-    <p:extLst>
-      <p:ext uri="{BB962C8B-B14F-4D97-AF65-F5344CB8AC3E}">
-        <p14:creationId xmlns:p14="http://schemas.microsoft.com/office/powerpoint/2010/main" val="624634856"/>
-      </p:ext>
-    </p:extLst>
-  </p:cSld>
-  <p:clrMapOvr>
-    <a:masterClrMapping/>
-  </p:clrMapOvr>
-</p:sld>
-</file>
-
-<file path=ppt/slides/slide6.xml><?xml version="1.0" encoding="utf-8"?>
-<p:sld xmlns:a="http://schemas.openxmlformats.org/drawingml/2006/main" xmlns:r="http://schemas.openxmlformats.org/officeDocument/2006/relationships" xmlns:p="http://schemas.openxmlformats.org/presentationml/2006/main">
-  <p:cSld>
-    <p:spTree>
-      <p:nvGrpSpPr>
-        <p:cNvPr id="1" name=""/>
-        <p:cNvGrpSpPr/>
-        <p:nvPr/>
-      </p:nvGrpSpPr>
-      <p:grpSpPr>
-        <a:xfrm>
-          <a:off x="0" y="0"/>
-          <a:ext cx="0" cy="0"/>
-          <a:chOff x="0" y="0"/>
-          <a:chExt cx="0" cy="0"/>
-        </a:xfrm>
-      </p:grpSpPr>
-      <p:sp>
-        <p:nvSpPr>
           <p:cNvPr id="3" name="Title 2"/>
           <p:cNvSpPr>
             <a:spLocks noGrp="1"/>
@@ -3873,7 +6225,7 @@
           <p:nvPr/>
         </p:nvPicPr>
         <p:blipFill>
-          <a:blip r:embed="rId2">
+          <a:blip r:embed="rId3">
             <a:extLst>
               <a:ext uri="{28A0092B-C50C-407E-A947-70E740481C1C}">
                 <a14:useLocalDpi xmlns:a14="http://schemas.microsoft.com/office/drawing/2010/main" val="0"/>
@@ -3942,8 +6294,16 @@
               <a:buNone/>
             </a:pPr>
             <a:r>
+              <a:rPr lang="en-US" dirty="0"/>
+              <a:t>Cole </a:t>
+            </a:r>
+            <a:r>
+              <a:rPr lang="en-US" dirty="0" err="1" smtClean="0"/>
+              <a:t>Trapnell</a:t>
+            </a:r>
+            <a:r>
               <a:rPr lang="en-US" dirty="0" smtClean="0"/>
-              <a:t>Reference to paper</a:t>
+              <a:t>(et al., 2013 )</a:t>
             </a:r>
             <a:endParaRPr lang="en-US" dirty="0"/>
           </a:p>
@@ -3958,7 +6318,7 @@
           <p:nvPr/>
         </p:nvPicPr>
         <p:blipFill>
-          <a:blip r:embed="rId3">
+          <a:blip r:embed="rId4">
             <a:extLst>
               <a:ext uri="{28A0092B-C50C-407E-A947-70E740481C1C}">
                 <a14:useLocalDpi xmlns:a14="http://schemas.microsoft.com/office/drawing/2010/main" val="0"/>
@@ -4238,232 +6598,94 @@
           </a:p>
         </p:txBody>
       </p:sp>
-    </p:spTree>
-    <p:extLst>
-      <p:ext uri="{BB962C8B-B14F-4D97-AF65-F5344CB8AC3E}">
-        <p14:creationId xmlns:p14="http://schemas.microsoft.com/office/powerpoint/2010/main" val="4215319436"/>
-      </p:ext>
-    </p:extLst>
-  </p:cSld>
-  <p:clrMapOvr>
-    <a:masterClrMapping/>
-  </p:clrMapOvr>
-</p:sld>
-</file>
-
-<file path=ppt/slides/slide7.xml><?xml version="1.0" encoding="utf-8"?>
-<p:sld xmlns:a="http://schemas.openxmlformats.org/drawingml/2006/main" xmlns:r="http://schemas.openxmlformats.org/officeDocument/2006/relationships" xmlns:p="http://schemas.openxmlformats.org/presentationml/2006/main">
-  <p:cSld>
-    <p:spTree>
-      <p:nvGrpSpPr>
-        <p:cNvPr id="1" name=""/>
-        <p:cNvGrpSpPr/>
-        <p:nvPr/>
-      </p:nvGrpSpPr>
-      <p:grpSpPr>
-        <a:xfrm>
-          <a:off x="0" y="0"/>
-          <a:ext cx="0" cy="0"/>
-          <a:chOff x="0" y="0"/>
-          <a:chExt cx="0" cy="0"/>
-        </a:xfrm>
-      </p:grpSpPr>
-      <p:sp>
-        <p:nvSpPr>
-          <p:cNvPr id="2" name="Content Placeholder 1"/>
-          <p:cNvSpPr>
-            <a:spLocks noGrp="1"/>
-          </p:cNvSpPr>
-          <p:nvPr>
-            <p:ph idx="1"/>
-          </p:nvPr>
+      <p:sp>
+        <p:nvSpPr>
+          <p:cNvPr id="9" name="Title 1"/>
+          <p:cNvSpPr txBox="1">
+            <a:spLocks/>
+          </p:cNvSpPr>
+          <p:nvPr/>
         </p:nvSpPr>
         <p:spPr>
           <a:xfrm>
-            <a:off x="457200" y="990600"/>
-            <a:ext cx="8229600" cy="5181599"/>
-          </a:xfrm>
-        </p:spPr>
-        <p:txBody>
-          <a:bodyPr/>
-          <a:lstStyle/>
-          <a:p>
-            <a:r>
-              <a:rPr lang="en-US" sz="3600" dirty="0"/>
-              <a:t>Run suggested protocol on server 15</a:t>
-            </a:r>
-          </a:p>
-          <a:p>
-            <a:pPr lvl="1"/>
-            <a:r>
-              <a:rPr lang="en-US" sz="3200" dirty="0"/>
-              <a:t>Become familiar with the </a:t>
-            </a:r>
-            <a:r>
-              <a:rPr lang="en-US" sz="3200" dirty="0" smtClean="0"/>
-              <a:t>different components of the pipeline and the pipeline as a whole</a:t>
-            </a:r>
-            <a:endParaRPr lang="en-US" sz="3200" dirty="0"/>
-          </a:p>
-          <a:p>
-            <a:pPr lvl="1"/>
-            <a:r>
-              <a:rPr lang="en-US" sz="3200" dirty="0"/>
-              <a:t>Evaluate it for backbone usage</a:t>
-            </a:r>
-          </a:p>
-          <a:p>
-            <a:pPr lvl="1"/>
-            <a:r>
-              <a:rPr lang="en-US" sz="3200" dirty="0"/>
-              <a:t>Creating a set of training files we can use to program each individual step</a:t>
-            </a:r>
-          </a:p>
-          <a:p>
-            <a:pPr lvl="1"/>
-            <a:r>
-              <a:rPr lang="en-US" sz="3200" dirty="0" smtClean="0"/>
-              <a:t>Compare the </a:t>
-            </a:r>
-            <a:r>
-              <a:rPr lang="en-US" sz="3200" dirty="0"/>
-              <a:t>scientific results from the paper</a:t>
-            </a:r>
-          </a:p>
-        </p:txBody>
-      </p:sp>
-      <p:sp>
-        <p:nvSpPr>
-          <p:cNvPr id="3" name="Title 2"/>
-          <p:cNvSpPr>
-            <a:spLocks noGrp="1"/>
-          </p:cNvSpPr>
-          <p:nvPr>
-            <p:ph type="title"/>
-          </p:nvPr>
-        </p:nvSpPr>
-        <p:spPr>
-          <a:xfrm>
-            <a:off x="381000" y="304800"/>
-            <a:ext cx="8305800" cy="533400"/>
-          </a:xfrm>
-        </p:spPr>
-        <p:txBody>
-          <a:bodyPr/>
-          <a:lstStyle/>
-          <a:p>
-            <a:r>
-              <a:rPr lang="en-US" dirty="0" smtClean="0"/>
-              <a:t>Project-progress</a:t>
-            </a:r>
-            <a:endParaRPr lang="en-US" dirty="0"/>
-          </a:p>
-        </p:txBody>
-      </p:sp>
-    </p:spTree>
-    <p:extLst>
-      <p:ext uri="{BB962C8B-B14F-4D97-AF65-F5344CB8AC3E}">
-        <p14:creationId xmlns:p14="http://schemas.microsoft.com/office/powerpoint/2010/main" val="897774434"/>
-      </p:ext>
-    </p:extLst>
-  </p:cSld>
-  <p:clrMapOvr>
-    <a:masterClrMapping/>
-  </p:clrMapOvr>
-</p:sld>
-</file>
-
-<file path=ppt/slides/slide8.xml><?xml version="1.0" encoding="utf-8"?>
-<p:sld xmlns:a="http://schemas.openxmlformats.org/drawingml/2006/main" xmlns:r="http://schemas.openxmlformats.org/officeDocument/2006/relationships" xmlns:p="http://schemas.openxmlformats.org/presentationml/2006/main">
-  <p:cSld>
-    <p:spTree>
-      <p:nvGrpSpPr>
-        <p:cNvPr id="1" name=""/>
-        <p:cNvGrpSpPr/>
-        <p:nvPr/>
-      </p:nvGrpSpPr>
-      <p:grpSpPr>
-        <a:xfrm>
-          <a:off x="0" y="0"/>
-          <a:ext cx="0" cy="0"/>
-          <a:chOff x="0" y="0"/>
-          <a:chExt cx="0" cy="0"/>
-        </a:xfrm>
-      </p:grpSpPr>
-      <p:sp>
-        <p:nvSpPr>
-          <p:cNvPr id="2" name="Content Placeholder 1"/>
-          <p:cNvSpPr>
-            <a:spLocks noGrp="1"/>
-          </p:cNvSpPr>
-          <p:nvPr>
-            <p:ph idx="1"/>
-          </p:nvPr>
-        </p:nvSpPr>
-        <p:spPr>
-          <a:xfrm>
-            <a:off x="462815" y="762000"/>
-            <a:ext cx="8229600" cy="1600199"/>
-          </a:xfrm>
-        </p:spPr>
-        <p:txBody>
-          <a:bodyPr/>
-          <a:lstStyle/>
-          <a:p>
-            <a:r>
-              <a:rPr lang="en-US" sz="3600" dirty="0" err="1" smtClean="0"/>
-              <a:t>Liquidplanner</a:t>
-            </a:r>
-            <a:r>
-              <a:rPr lang="en-US" sz="3600" dirty="0" smtClean="0"/>
-              <a:t> needs to be updated for this I suppose. Will work at this later.</a:t>
-            </a:r>
-            <a:endParaRPr lang="en-US" sz="3200" dirty="0" smtClean="0"/>
-          </a:p>
-          <a:p>
-            <a:pPr lvl="2"/>
-            <a:endParaRPr lang="en-US" sz="2800" dirty="0"/>
-          </a:p>
-        </p:txBody>
-      </p:sp>
-      <p:sp>
-        <p:nvSpPr>
-          <p:cNvPr id="3" name="Title 2"/>
-          <p:cNvSpPr>
-            <a:spLocks noGrp="1"/>
-          </p:cNvSpPr>
-          <p:nvPr>
-            <p:ph type="title"/>
-          </p:nvPr>
-        </p:nvSpPr>
-        <p:spPr>
-          <a:xfrm>
-            <a:off x="381000" y="304800"/>
-            <a:ext cx="8305800" cy="533400"/>
-          </a:xfrm>
-        </p:spPr>
-        <p:txBody>
-          <a:bodyPr/>
-          <a:lstStyle/>
-          <a:p>
-            <a:r>
-              <a:rPr lang="en-US" dirty="0" smtClean="0"/>
-              <a:t>Project-planning</a:t>
-            </a:r>
-            <a:endParaRPr lang="en-US" dirty="0"/>
+            <a:off x="190500" y="908050"/>
+            <a:ext cx="1828800" cy="304800"/>
+          </a:xfrm>
+          <a:prstGeom prst="rect">
+            <a:avLst/>
+          </a:prstGeom>
+        </p:spPr>
+        <p:txBody>
+          <a:bodyPr vert="horz" lIns="91440" tIns="45720" rIns="91440" bIns="45720" rtlCol="0" anchor="b">
+            <a:normAutofit fontScale="55000" lnSpcReduction="20000"/>
+          </a:bodyPr>
+          <a:lstStyle>
+            <a:lvl1pPr algn="r" defTabSz="914400" rtl="0" eaLnBrk="1" latinLnBrk="0" hangingPunct="1">
+              <a:spcBef>
+                <a:spcPct val="0"/>
+              </a:spcBef>
+              <a:buNone/>
+              <a:defRPr sz="2800" kern="1200">
+                <a:gradFill>
+                  <a:gsLst>
+                    <a:gs pos="0">
+                      <a:schemeClr val="tx1">
+                        <a:lumMod val="50000"/>
+                      </a:schemeClr>
+                    </a:gs>
+                    <a:gs pos="61000">
+                      <a:schemeClr val="tx1"/>
+                    </a:gs>
+                  </a:gsLst>
+                  <a:lin ang="5400000" scaled="0"/>
+                </a:gradFill>
+                <a:effectLst/>
+                <a:latin typeface="+mj-lt"/>
+                <a:ea typeface="+mj-ea"/>
+                <a:cs typeface="+mj-cs"/>
+              </a:defRPr>
+            </a:lvl1pPr>
+          </a:lstStyle>
+          <a:p>
+            <a:pPr algn="l"/>
+            <a:r>
+              <a:rPr lang="en-US" dirty="0" smtClean="0">
+                <a:effectLst>
+                  <a:outerShdw blurRad="38100" dist="38100" dir="2700000" algn="tl">
+                    <a:srgbClr val="000000">
+                      <a:alpha val="43137"/>
+                    </a:srgbClr>
+                  </a:outerShdw>
+                </a:effectLst>
+                <a:latin typeface="Aharoni" panose="02010803020104030203" pitchFamily="2" charset="-79"/>
+                <a:cs typeface="Aharoni" panose="02010803020104030203" pitchFamily="2" charset="-79"/>
+              </a:rPr>
+              <a:t>Mango</a:t>
+            </a:r>
+            <a:endParaRPr lang="en-US" dirty="0">
+              <a:effectLst>
+                <a:outerShdw blurRad="38100" dist="38100" dir="2700000" algn="tl">
+                  <a:srgbClr val="000000">
+                    <a:alpha val="43137"/>
+                  </a:srgbClr>
+                </a:outerShdw>
+              </a:effectLst>
+              <a:latin typeface="Aharoni" panose="02010803020104030203" pitchFamily="2" charset="-79"/>
+              <a:cs typeface="Aharoni" panose="02010803020104030203" pitchFamily="2" charset="-79"/>
+            </a:endParaRPr>
           </a:p>
         </p:txBody>
       </p:sp>
       <p:pic>
         <p:nvPicPr>
-          <p:cNvPr id="1025" name="Picture 1"/>
+          <p:cNvPr id="10" name="Picture 2"/>
           <p:cNvPicPr>
             <a:picLocks noChangeAspect="1" noChangeArrowheads="1"/>
           </p:cNvPicPr>
           <p:nvPr/>
         </p:nvPicPr>
         <p:blipFill>
-          <a:blip r:embed="rId2" cstate="print">
+          <a:blip r:embed="rId5">
             <a:extLst>
               <a:ext uri="{28A0092B-C50C-407E-A947-70E740481C1C}">
                 <a14:useLocalDpi xmlns:a14="http://schemas.microsoft.com/office/drawing/2010/main" val="0"/>
@@ -4477,8 +6699,8 @@
         </p:blipFill>
         <p:spPr bwMode="auto">
           <a:xfrm>
-            <a:off x="1627247" y="1905000"/>
-            <a:ext cx="5900737" cy="4691063"/>
+            <a:off x="301752" y="100584"/>
+            <a:ext cx="603504" cy="804672"/>
           </a:xfrm>
           <a:prstGeom prst="rect">
             <a:avLst/>
@@ -4521,6 +6743,650 @@
     </p:spTree>
     <p:extLst>
       <p:ext uri="{BB962C8B-B14F-4D97-AF65-F5344CB8AC3E}">
+        <p14:creationId xmlns:p14="http://schemas.microsoft.com/office/powerpoint/2010/main" val="4215319436"/>
+      </p:ext>
+    </p:extLst>
+  </p:cSld>
+  <p:clrMapOvr>
+    <a:masterClrMapping/>
+  </p:clrMapOvr>
+  <p:timing>
+    <p:tnLst>
+      <p:par>
+        <p:cTn id="1" dur="indefinite" restart="never" nodeType="tmRoot">
+          <p:childTnLst>
+            <p:seq concurrent="1" nextAc="seek">
+              <p:cTn id="2" dur="indefinite" nodeType="mainSeq">
+                <p:childTnLst>
+                  <p:par>
+                    <p:cTn id="3" fill="hold">
+                      <p:stCondLst>
+                        <p:cond delay="indefinite"/>
+                      </p:stCondLst>
+                      <p:childTnLst>
+                        <p:par>
+                          <p:cTn id="4" fill="hold">
+                            <p:stCondLst>
+                              <p:cond delay="0"/>
+                            </p:stCondLst>
+                            <p:childTnLst>
+                              <p:par>
+                                <p:cTn id="5" presetID="1" presetClass="entr" presetSubtype="0" fill="hold" nodeType="clickEffect">
+                                  <p:stCondLst>
+                                    <p:cond delay="0"/>
+                                  </p:stCondLst>
+                                  <p:childTnLst>
+                                    <p:set>
+                                      <p:cBhvr>
+                                        <p:cTn id="6" dur="1" fill="hold">
+                                          <p:stCondLst>
+                                            <p:cond delay="9"/>
+                                          </p:stCondLst>
+                                        </p:cTn>
+                                        <p:tgtEl>
+                                          <p:spTgt spid="2050"/>
+                                        </p:tgtEl>
+                                        <p:attrNameLst>
+                                          <p:attrName>style.visibility</p:attrName>
+                                        </p:attrNameLst>
+                                      </p:cBhvr>
+                                      <p:to>
+                                        <p:strVal val="visible"/>
+                                      </p:to>
+                                    </p:set>
+                                  </p:childTnLst>
+                                </p:cTn>
+                              </p:par>
+                              <p:par>
+                                <p:cTn id="7" presetID="1" presetClass="entr" presetSubtype="0" fill="hold" grpId="0" nodeType="withEffect">
+                                  <p:stCondLst>
+                                    <p:cond delay="0"/>
+                                  </p:stCondLst>
+                                  <p:childTnLst>
+                                    <p:set>
+                                      <p:cBhvr>
+                                        <p:cTn id="8" dur="1" fill="hold">
+                                          <p:stCondLst>
+                                            <p:cond delay="9"/>
+                                          </p:stCondLst>
+                                        </p:cTn>
+                                        <p:tgtEl>
+                                          <p:spTgt spid="7"/>
+                                        </p:tgtEl>
+                                        <p:attrNameLst>
+                                          <p:attrName>style.visibility</p:attrName>
+                                        </p:attrNameLst>
+                                      </p:cBhvr>
+                                      <p:to>
+                                        <p:strVal val="visible"/>
+                                      </p:to>
+                                    </p:set>
+                                  </p:childTnLst>
+                                </p:cTn>
+                              </p:par>
+                            </p:childTnLst>
+                          </p:cTn>
+                        </p:par>
+                      </p:childTnLst>
+                    </p:cTn>
+                  </p:par>
+                </p:childTnLst>
+              </p:cTn>
+              <p:prevCondLst>
+                <p:cond evt="onPrev" delay="0">
+                  <p:tgtEl>
+                    <p:sldTgt/>
+                  </p:tgtEl>
+                </p:cond>
+              </p:prevCondLst>
+              <p:nextCondLst>
+                <p:cond evt="onNext" delay="0">
+                  <p:tgtEl>
+                    <p:sldTgt/>
+                  </p:tgtEl>
+                </p:cond>
+              </p:nextCondLst>
+            </p:seq>
+          </p:childTnLst>
+        </p:cTn>
+      </p:par>
+    </p:tnLst>
+    <p:bldLst>
+      <p:bldP spid="7" grpId="0"/>
+    </p:bldLst>
+  </p:timing>
+</p:sld>
+</file>
+
+<file path=ppt/slides/slide6.xml><?xml version="1.0" encoding="utf-8"?>
+<p:sld xmlns:a="http://schemas.openxmlformats.org/drawingml/2006/main" xmlns:r="http://schemas.openxmlformats.org/officeDocument/2006/relationships" xmlns:p="http://schemas.openxmlformats.org/presentationml/2006/main">
+  <p:cSld>
+    <p:spTree>
+      <p:nvGrpSpPr>
+        <p:cNvPr id="1" name=""/>
+        <p:cNvGrpSpPr/>
+        <p:nvPr/>
+      </p:nvGrpSpPr>
+      <p:grpSpPr>
+        <a:xfrm>
+          <a:off x="0" y="0"/>
+          <a:ext cx="0" cy="0"/>
+          <a:chOff x="0" y="0"/>
+          <a:chExt cx="0" cy="0"/>
+        </a:xfrm>
+      </p:grpSpPr>
+      <p:sp>
+        <p:nvSpPr>
+          <p:cNvPr id="2" name="Content Placeholder 1"/>
+          <p:cNvSpPr>
+            <a:spLocks noGrp="1"/>
+          </p:cNvSpPr>
+          <p:nvPr>
+            <p:ph idx="1"/>
+          </p:nvPr>
+        </p:nvSpPr>
+        <p:spPr>
+          <a:xfrm>
+            <a:off x="457200" y="990600"/>
+            <a:ext cx="8229600" cy="5181599"/>
+          </a:xfrm>
+        </p:spPr>
+        <p:txBody>
+          <a:bodyPr/>
+          <a:lstStyle/>
+          <a:p>
+            <a:pPr marL="0" indent="0">
+              <a:buNone/>
+            </a:pPr>
+            <a:endParaRPr lang="en-US" sz="2800" dirty="0" smtClean="0"/>
+          </a:p>
+          <a:p>
+            <a:r>
+              <a:rPr lang="en-US" sz="2800" dirty="0" smtClean="0"/>
+              <a:t>Project: Differential gene expression in yeast</a:t>
+            </a:r>
+          </a:p>
+          <a:p>
+            <a:r>
+              <a:rPr lang="en-US" sz="2800" dirty="0"/>
+              <a:t>Discussed:</a:t>
+            </a:r>
+            <a:endParaRPr lang="en-US" sz="3600" dirty="0"/>
+          </a:p>
+          <a:p>
+            <a:pPr lvl="1"/>
+            <a:r>
+              <a:rPr lang="en-US" sz="2800" dirty="0"/>
+              <a:t>Biological framework of the pipeline</a:t>
+            </a:r>
+          </a:p>
+          <a:p>
+            <a:pPr lvl="1"/>
+            <a:r>
+              <a:rPr lang="en-US" sz="2800" dirty="0"/>
+              <a:t>Assign priorities to the parts of the pipeline</a:t>
+            </a:r>
+          </a:p>
+          <a:p>
+            <a:pPr lvl="1"/>
+            <a:r>
+              <a:rPr lang="en-US" sz="2800" dirty="0" smtClean="0"/>
+              <a:t>Version </a:t>
+            </a:r>
+            <a:r>
+              <a:rPr lang="en-US" sz="2800" dirty="0"/>
+              <a:t>control and project </a:t>
+            </a:r>
+            <a:r>
+              <a:rPr lang="en-US" sz="2800" dirty="0" smtClean="0"/>
+              <a:t>management</a:t>
+            </a:r>
+          </a:p>
+          <a:p>
+            <a:pPr lvl="1"/>
+            <a:r>
+              <a:rPr lang="en-US" sz="2800" dirty="0"/>
+              <a:t>Draft planning</a:t>
+            </a:r>
+          </a:p>
+          <a:p>
+            <a:pPr marL="228600" lvl="1" indent="0">
+              <a:buNone/>
+            </a:pPr>
+            <a:endParaRPr lang="en-US" sz="2800" dirty="0"/>
+          </a:p>
+          <a:p>
+            <a:endParaRPr lang="en-US" dirty="0"/>
+          </a:p>
+        </p:txBody>
+      </p:sp>
+      <p:sp>
+        <p:nvSpPr>
+          <p:cNvPr id="3" name="Title 2"/>
+          <p:cNvSpPr>
+            <a:spLocks noGrp="1"/>
+          </p:cNvSpPr>
+          <p:nvPr>
+            <p:ph type="title"/>
+          </p:nvPr>
+        </p:nvSpPr>
+        <p:spPr>
+          <a:xfrm>
+            <a:off x="381000" y="304800"/>
+            <a:ext cx="8305800" cy="533400"/>
+          </a:xfrm>
+        </p:spPr>
+        <p:txBody>
+          <a:bodyPr/>
+          <a:lstStyle/>
+          <a:p>
+            <a:r>
+              <a:rPr lang="en-US" dirty="0" smtClean="0"/>
+              <a:t>Background</a:t>
+            </a:r>
+            <a:endParaRPr lang="en-US" dirty="0"/>
+          </a:p>
+        </p:txBody>
+      </p:sp>
+      <p:sp>
+        <p:nvSpPr>
+          <p:cNvPr id="4" name="Title 1"/>
+          <p:cNvSpPr txBox="1">
+            <a:spLocks/>
+          </p:cNvSpPr>
+          <p:nvPr/>
+        </p:nvSpPr>
+        <p:spPr>
+          <a:xfrm>
+            <a:off x="190500" y="908050"/>
+            <a:ext cx="1828800" cy="304800"/>
+          </a:xfrm>
+          <a:prstGeom prst="rect">
+            <a:avLst/>
+          </a:prstGeom>
+        </p:spPr>
+        <p:txBody>
+          <a:bodyPr vert="horz" lIns="91440" tIns="45720" rIns="91440" bIns="45720" rtlCol="0" anchor="b">
+            <a:normAutofit fontScale="55000" lnSpcReduction="20000"/>
+          </a:bodyPr>
+          <a:lstStyle>
+            <a:lvl1pPr algn="r" defTabSz="914400" rtl="0" eaLnBrk="1" latinLnBrk="0" hangingPunct="1">
+              <a:spcBef>
+                <a:spcPct val="0"/>
+              </a:spcBef>
+              <a:buNone/>
+              <a:defRPr sz="2800" kern="1200">
+                <a:gradFill>
+                  <a:gsLst>
+                    <a:gs pos="0">
+                      <a:schemeClr val="tx1">
+                        <a:lumMod val="50000"/>
+                      </a:schemeClr>
+                    </a:gs>
+                    <a:gs pos="61000">
+                      <a:schemeClr val="tx1"/>
+                    </a:gs>
+                  </a:gsLst>
+                  <a:lin ang="5400000" scaled="0"/>
+                </a:gradFill>
+                <a:effectLst/>
+                <a:latin typeface="+mj-lt"/>
+                <a:ea typeface="+mj-ea"/>
+                <a:cs typeface="+mj-cs"/>
+              </a:defRPr>
+            </a:lvl1pPr>
+          </a:lstStyle>
+          <a:p>
+            <a:pPr algn="l"/>
+            <a:r>
+              <a:rPr lang="en-US" dirty="0" smtClean="0">
+                <a:effectLst>
+                  <a:outerShdw blurRad="38100" dist="38100" dir="2700000" algn="tl">
+                    <a:srgbClr val="000000">
+                      <a:alpha val="43137"/>
+                    </a:srgbClr>
+                  </a:outerShdw>
+                </a:effectLst>
+                <a:latin typeface="Aharoni" panose="02010803020104030203" pitchFamily="2" charset="-79"/>
+                <a:cs typeface="Aharoni" panose="02010803020104030203" pitchFamily="2" charset="-79"/>
+              </a:rPr>
+              <a:t>Mango</a:t>
+            </a:r>
+            <a:endParaRPr lang="en-US" dirty="0">
+              <a:effectLst>
+                <a:outerShdw blurRad="38100" dist="38100" dir="2700000" algn="tl">
+                  <a:srgbClr val="000000">
+                    <a:alpha val="43137"/>
+                  </a:srgbClr>
+                </a:outerShdw>
+              </a:effectLst>
+              <a:latin typeface="Aharoni" panose="02010803020104030203" pitchFamily="2" charset="-79"/>
+              <a:cs typeface="Aharoni" panose="02010803020104030203" pitchFamily="2" charset="-79"/>
+            </a:endParaRPr>
+          </a:p>
+        </p:txBody>
+      </p:sp>
+      <p:pic>
+        <p:nvPicPr>
+          <p:cNvPr id="3075" name="Picture 3" descr="C:\Users\destreek\Downloads\1-140219130T0.gif"/>
+          <p:cNvPicPr>
+            <a:picLocks noChangeAspect="1" noChangeArrowheads="1" noCrop="1"/>
+          </p:cNvPicPr>
+          <p:nvPr/>
+        </p:nvPicPr>
+        <p:blipFill>
+          <a:blip r:embed="rId3" cstate="print">
+            <a:extLst>
+              <a:ext uri="{28A0092B-C50C-407E-A947-70E740481C1C}">
+                <a14:useLocalDpi xmlns:a14="http://schemas.microsoft.com/office/drawing/2010/main" val="0"/>
+              </a:ext>
+            </a:extLst>
+          </a:blip>
+          <a:srcRect/>
+          <a:stretch>
+            <a:fillRect/>
+          </a:stretch>
+        </p:blipFill>
+        <p:spPr bwMode="auto">
+          <a:xfrm>
+            <a:off x="304800" y="101600"/>
+            <a:ext cx="604837" cy="806450"/>
+          </a:xfrm>
+          <a:prstGeom prst="rect">
+            <a:avLst/>
+          </a:prstGeom>
+          <a:noFill/>
+          <a:extLst>
+            <a:ext uri="{909E8E84-426E-40DD-AFC4-6F175D3DCCD1}">
+              <a14:hiddenFill xmlns:a14="http://schemas.microsoft.com/office/drawing/2010/main">
+                <a:solidFill>
+                  <a:srgbClr val="FFFFFF"/>
+                </a:solidFill>
+              </a14:hiddenFill>
+            </a:ext>
+          </a:extLst>
+        </p:spPr>
+      </p:pic>
+    </p:spTree>
+    <p:extLst>
+      <p:ext uri="{BB962C8B-B14F-4D97-AF65-F5344CB8AC3E}">
+        <p14:creationId xmlns:p14="http://schemas.microsoft.com/office/powerpoint/2010/main" val="1422724304"/>
+      </p:ext>
+    </p:extLst>
+  </p:cSld>
+  <p:clrMapOvr>
+    <a:masterClrMapping/>
+  </p:clrMapOvr>
+  <p:timing>
+    <p:tnLst>
+      <p:par>
+        <p:cTn id="1" dur="indefinite" restart="never" nodeType="tmRoot"/>
+      </p:par>
+    </p:tnLst>
+  </p:timing>
+</p:sld>
+</file>
+
+<file path=ppt/slides/slide7.xml><?xml version="1.0" encoding="utf-8"?>
+<p:sld xmlns:a="http://schemas.openxmlformats.org/drawingml/2006/main" xmlns:r="http://schemas.openxmlformats.org/officeDocument/2006/relationships" xmlns:p="http://schemas.openxmlformats.org/presentationml/2006/main">
+  <p:cSld>
+    <p:spTree>
+      <p:nvGrpSpPr>
+        <p:cNvPr id="1" name=""/>
+        <p:cNvGrpSpPr/>
+        <p:nvPr/>
+      </p:nvGrpSpPr>
+      <p:grpSpPr>
+        <a:xfrm>
+          <a:off x="0" y="0"/>
+          <a:ext cx="0" cy="0"/>
+          <a:chOff x="0" y="0"/>
+          <a:chExt cx="0" cy="0"/>
+        </a:xfrm>
+      </p:grpSpPr>
+      <p:sp>
+        <p:nvSpPr>
+          <p:cNvPr id="3" name="Title 2"/>
+          <p:cNvSpPr>
+            <a:spLocks noGrp="1"/>
+          </p:cNvSpPr>
+          <p:nvPr>
+            <p:ph type="title"/>
+          </p:nvPr>
+        </p:nvSpPr>
+        <p:spPr>
+          <a:xfrm>
+            <a:off x="381000" y="304800"/>
+            <a:ext cx="8305800" cy="533400"/>
+          </a:xfrm>
+        </p:spPr>
+        <p:txBody>
+          <a:bodyPr/>
+          <a:lstStyle/>
+          <a:p>
+            <a:r>
+              <a:rPr lang="en-US" dirty="0" smtClean="0"/>
+              <a:t>Project-planning</a:t>
+            </a:r>
+            <a:endParaRPr lang="en-US" dirty="0"/>
+          </a:p>
+        </p:txBody>
+      </p:sp>
+      <p:pic>
+        <p:nvPicPr>
+          <p:cNvPr id="1025" name="Picture 1"/>
+          <p:cNvPicPr>
+            <a:picLocks noChangeAspect="1" noChangeArrowheads="1"/>
+          </p:cNvPicPr>
+          <p:nvPr/>
+        </p:nvPicPr>
+        <p:blipFill>
+          <a:blip r:embed="rId3" cstate="print">
+            <a:extLst>
+              <a:ext uri="{28A0092B-C50C-407E-A947-70E740481C1C}">
+                <a14:useLocalDpi xmlns:a14="http://schemas.microsoft.com/office/drawing/2010/main" val="0"/>
+              </a:ext>
+            </a:extLst>
+          </a:blip>
+          <a:srcRect/>
+          <a:stretch>
+            <a:fillRect/>
+          </a:stretch>
+        </p:blipFill>
+        <p:spPr bwMode="auto">
+          <a:xfrm>
+            <a:off x="1627247" y="1905000"/>
+            <a:ext cx="5900737" cy="4691063"/>
+          </a:xfrm>
+          <a:prstGeom prst="rect">
+            <a:avLst/>
+          </a:prstGeom>
+          <a:noFill/>
+          <a:ln>
+            <a:noFill/>
+          </a:ln>
+          <a:effectLst/>
+          <a:extLst>
+            <a:ext uri="{909E8E84-426E-40DD-AFC4-6F175D3DCCD1}">
+              <a14:hiddenFill xmlns:a14="http://schemas.microsoft.com/office/drawing/2010/main">
+                <a:solidFill>
+                  <a:schemeClr val="accent1"/>
+                </a:solidFill>
+              </a14:hiddenFill>
+            </a:ext>
+            <a:ext uri="{91240B29-F687-4F45-9708-019B960494DF}">
+              <a14:hiddenLine xmlns:a14="http://schemas.microsoft.com/office/drawing/2010/main" w="9525">
+                <a:solidFill>
+                  <a:schemeClr val="tx1"/>
+                </a:solidFill>
+                <a:miter lim="800000"/>
+                <a:headEnd/>
+                <a:tailEnd/>
+              </a14:hiddenLine>
+            </a:ext>
+            <a:ext uri="{AF507438-7753-43E0-B8FC-AC1667EBCBE1}">
+              <a14:hiddenEffects xmlns:a14="http://schemas.microsoft.com/office/drawing/2010/main">
+                <a:effectLst>
+                  <a:outerShdw dist="35921" dir="2700000" algn="ctr" rotWithShape="0">
+                    <a:schemeClr val="bg2"/>
+                  </a:outerShdw>
+                </a:effectLst>
+              </a14:hiddenEffects>
+            </a:ext>
+          </a:extLst>
+        </p:spPr>
+      </p:pic>
+      <p:sp>
+        <p:nvSpPr>
+          <p:cNvPr id="8" name="Title 1"/>
+          <p:cNvSpPr txBox="1">
+            <a:spLocks/>
+          </p:cNvSpPr>
+          <p:nvPr/>
+        </p:nvSpPr>
+        <p:spPr>
+          <a:xfrm>
+            <a:off x="190500" y="908050"/>
+            <a:ext cx="1828800" cy="304800"/>
+          </a:xfrm>
+          <a:prstGeom prst="rect">
+            <a:avLst/>
+          </a:prstGeom>
+        </p:spPr>
+        <p:txBody>
+          <a:bodyPr vert="horz" lIns="91440" tIns="45720" rIns="91440" bIns="45720" rtlCol="0" anchor="b">
+            <a:normAutofit fontScale="55000" lnSpcReduction="20000"/>
+          </a:bodyPr>
+          <a:lstStyle>
+            <a:lvl1pPr algn="r" defTabSz="914400" rtl="0" eaLnBrk="1" latinLnBrk="0" hangingPunct="1">
+              <a:spcBef>
+                <a:spcPct val="0"/>
+              </a:spcBef>
+              <a:buNone/>
+              <a:defRPr sz="2800" kern="1200">
+                <a:gradFill>
+                  <a:gsLst>
+                    <a:gs pos="0">
+                      <a:schemeClr val="tx1">
+                        <a:lumMod val="50000"/>
+                      </a:schemeClr>
+                    </a:gs>
+                    <a:gs pos="61000">
+                      <a:schemeClr val="tx1"/>
+                    </a:gs>
+                  </a:gsLst>
+                  <a:lin ang="5400000" scaled="0"/>
+                </a:gradFill>
+                <a:effectLst/>
+                <a:latin typeface="+mj-lt"/>
+                <a:ea typeface="+mj-ea"/>
+                <a:cs typeface="+mj-cs"/>
+              </a:defRPr>
+            </a:lvl1pPr>
+          </a:lstStyle>
+          <a:p>
+            <a:pPr algn="l"/>
+            <a:r>
+              <a:rPr lang="en-US" dirty="0" smtClean="0">
+                <a:effectLst>
+                  <a:outerShdw blurRad="38100" dist="38100" dir="2700000" algn="tl">
+                    <a:srgbClr val="000000">
+                      <a:alpha val="43137"/>
+                    </a:srgbClr>
+                  </a:outerShdw>
+                </a:effectLst>
+                <a:latin typeface="Aharoni" panose="02010803020104030203" pitchFamily="2" charset="-79"/>
+                <a:cs typeface="Aharoni" panose="02010803020104030203" pitchFamily="2" charset="-79"/>
+              </a:rPr>
+              <a:t>Mango</a:t>
+            </a:r>
+            <a:endParaRPr lang="en-US" dirty="0">
+              <a:effectLst>
+                <a:outerShdw blurRad="38100" dist="38100" dir="2700000" algn="tl">
+                  <a:srgbClr val="000000">
+                    <a:alpha val="43137"/>
+                  </a:srgbClr>
+                </a:outerShdw>
+              </a:effectLst>
+              <a:latin typeface="Aharoni" panose="02010803020104030203" pitchFamily="2" charset="-79"/>
+              <a:cs typeface="Aharoni" panose="02010803020104030203" pitchFamily="2" charset="-79"/>
+            </a:endParaRPr>
+          </a:p>
+        </p:txBody>
+      </p:sp>
+      <p:sp>
+        <p:nvSpPr>
+          <p:cNvPr id="10" name="Content Placeholder 1"/>
+          <p:cNvSpPr>
+            <a:spLocks noGrp="1"/>
+          </p:cNvSpPr>
+          <p:nvPr>
+            <p:ph idx="1"/>
+          </p:nvPr>
+        </p:nvSpPr>
+        <p:spPr>
+          <a:xfrm>
+            <a:off x="228600" y="1066800"/>
+            <a:ext cx="8229600" cy="4419600"/>
+          </a:xfrm>
+        </p:spPr>
+        <p:txBody>
+          <a:bodyPr numCol="1" anchor="t">
+            <a:normAutofit/>
+          </a:bodyPr>
+          <a:lstStyle/>
+          <a:p>
+            <a:r>
+              <a:rPr lang="en-US" sz="3600" dirty="0" smtClean="0"/>
+              <a:t>Draft planning</a:t>
+            </a:r>
+          </a:p>
+        </p:txBody>
+      </p:sp>
+      <p:pic>
+        <p:nvPicPr>
+          <p:cNvPr id="11" name="Picture 3" descr="C:\Users\destreek\Downloads\1-140219130T0.gif"/>
+          <p:cNvPicPr>
+            <a:picLocks noChangeAspect="1" noChangeArrowheads="1" noCrop="1"/>
+          </p:cNvPicPr>
+          <p:nvPr/>
+        </p:nvPicPr>
+        <p:blipFill>
+          <a:blip r:embed="rId4" cstate="print">
+            <a:extLst>
+              <a:ext uri="{28A0092B-C50C-407E-A947-70E740481C1C}">
+                <a14:useLocalDpi xmlns:a14="http://schemas.microsoft.com/office/drawing/2010/main" val="0"/>
+              </a:ext>
+            </a:extLst>
+          </a:blip>
+          <a:srcRect/>
+          <a:stretch>
+            <a:fillRect/>
+          </a:stretch>
+        </p:blipFill>
+        <p:spPr bwMode="auto">
+          <a:xfrm>
+            <a:off x="304800" y="101600"/>
+            <a:ext cx="604837" cy="806450"/>
+          </a:xfrm>
+          <a:prstGeom prst="rect">
+            <a:avLst/>
+          </a:prstGeom>
+          <a:noFill/>
+          <a:extLst>
+            <a:ext uri="{909E8E84-426E-40DD-AFC4-6F175D3DCCD1}">
+              <a14:hiddenFill xmlns:a14="http://schemas.microsoft.com/office/drawing/2010/main">
+                <a:solidFill>
+                  <a:srgbClr val="FFFFFF"/>
+                </a:solidFill>
+              </a14:hiddenFill>
+            </a:ext>
+          </a:extLst>
+        </p:spPr>
+      </p:pic>
+    </p:spTree>
+    <p:extLst>
+      <p:ext uri="{BB962C8B-B14F-4D97-AF65-F5344CB8AC3E}">
         <p14:creationId xmlns:p14="http://schemas.microsoft.com/office/powerpoint/2010/main" val="3734154215"/>
       </p:ext>
     </p:extLst>
@@ -4528,13 +7394,523 @@
   <p:clrMapOvr>
     <a:masterClrMapping/>
   </p:clrMapOvr>
+  <p:timing>
+    <p:tnLst>
+      <p:par>
+        <p:cTn id="1" dur="indefinite" restart="never" nodeType="tmRoot"/>
+      </p:par>
+    </p:tnLst>
+  </p:timing>
+</p:sld>
+</file>
+
+<file path=ppt/slides/slide8.xml><?xml version="1.0" encoding="utf-8"?>
+<p:sld xmlns:a="http://schemas.openxmlformats.org/drawingml/2006/main" xmlns:r="http://schemas.openxmlformats.org/officeDocument/2006/relationships" xmlns:p="http://schemas.openxmlformats.org/presentationml/2006/main">
+  <p:cSld>
+    <p:spTree>
+      <p:nvGrpSpPr>
+        <p:cNvPr id="1" name=""/>
+        <p:cNvGrpSpPr/>
+        <p:nvPr/>
+      </p:nvGrpSpPr>
+      <p:grpSpPr>
+        <a:xfrm>
+          <a:off x="0" y="0"/>
+          <a:ext cx="0" cy="0"/>
+          <a:chOff x="0" y="0"/>
+          <a:chExt cx="0" cy="0"/>
+        </a:xfrm>
+      </p:grpSpPr>
+      <p:sp>
+        <p:nvSpPr>
+          <p:cNvPr id="3" name="Title 2"/>
+          <p:cNvSpPr>
+            <a:spLocks noGrp="1"/>
+          </p:cNvSpPr>
+          <p:nvPr>
+            <p:ph type="title"/>
+          </p:nvPr>
+        </p:nvSpPr>
+        <p:spPr>
+          <a:xfrm>
+            <a:off x="381000" y="304800"/>
+            <a:ext cx="8305800" cy="533400"/>
+          </a:xfrm>
+        </p:spPr>
+        <p:txBody>
+          <a:bodyPr/>
+          <a:lstStyle/>
+          <a:p>
+            <a:r>
+              <a:rPr lang="en-US" dirty="0" smtClean="0"/>
+              <a:t>Time control</a:t>
+            </a:r>
+            <a:endParaRPr lang="en-US" dirty="0"/>
+          </a:p>
+        </p:txBody>
+      </p:sp>
+      <p:sp>
+        <p:nvSpPr>
+          <p:cNvPr id="8" name="Title 1"/>
+          <p:cNvSpPr txBox="1">
+            <a:spLocks/>
+          </p:cNvSpPr>
+          <p:nvPr/>
+        </p:nvSpPr>
+        <p:spPr>
+          <a:xfrm>
+            <a:off x="190500" y="908050"/>
+            <a:ext cx="1828800" cy="304800"/>
+          </a:xfrm>
+          <a:prstGeom prst="rect">
+            <a:avLst/>
+          </a:prstGeom>
+        </p:spPr>
+        <p:txBody>
+          <a:bodyPr vert="horz" lIns="91440" tIns="45720" rIns="91440" bIns="45720" rtlCol="0" anchor="b">
+            <a:normAutofit fontScale="55000" lnSpcReduction="20000"/>
+          </a:bodyPr>
+          <a:lstStyle>
+            <a:lvl1pPr algn="r" defTabSz="914400" rtl="0" eaLnBrk="1" latinLnBrk="0" hangingPunct="1">
+              <a:spcBef>
+                <a:spcPct val="0"/>
+              </a:spcBef>
+              <a:buNone/>
+              <a:defRPr sz="2800" kern="1200">
+                <a:gradFill>
+                  <a:gsLst>
+                    <a:gs pos="0">
+                      <a:schemeClr val="tx1">
+                        <a:lumMod val="50000"/>
+                      </a:schemeClr>
+                    </a:gs>
+                    <a:gs pos="61000">
+                      <a:schemeClr val="tx1"/>
+                    </a:gs>
+                  </a:gsLst>
+                  <a:lin ang="5400000" scaled="0"/>
+                </a:gradFill>
+                <a:effectLst/>
+                <a:latin typeface="+mj-lt"/>
+                <a:ea typeface="+mj-ea"/>
+                <a:cs typeface="+mj-cs"/>
+              </a:defRPr>
+            </a:lvl1pPr>
+          </a:lstStyle>
+          <a:p>
+            <a:pPr algn="l"/>
+            <a:r>
+              <a:rPr lang="en-US" dirty="0" smtClean="0">
+                <a:effectLst>
+                  <a:outerShdw blurRad="38100" dist="38100" dir="2700000" algn="tl">
+                    <a:srgbClr val="000000">
+                      <a:alpha val="43137"/>
+                    </a:srgbClr>
+                  </a:outerShdw>
+                </a:effectLst>
+                <a:latin typeface="Aharoni" panose="02010803020104030203" pitchFamily="2" charset="-79"/>
+                <a:cs typeface="Aharoni" panose="02010803020104030203" pitchFamily="2" charset="-79"/>
+              </a:rPr>
+              <a:t>Mango</a:t>
+            </a:r>
+            <a:endParaRPr lang="en-US" dirty="0">
+              <a:effectLst>
+                <a:outerShdw blurRad="38100" dist="38100" dir="2700000" algn="tl">
+                  <a:srgbClr val="000000">
+                    <a:alpha val="43137"/>
+                  </a:srgbClr>
+                </a:outerShdw>
+              </a:effectLst>
+              <a:latin typeface="Aharoni" panose="02010803020104030203" pitchFamily="2" charset="-79"/>
+              <a:cs typeface="Aharoni" panose="02010803020104030203" pitchFamily="2" charset="-79"/>
+            </a:endParaRPr>
+          </a:p>
+        </p:txBody>
+      </p:sp>
+      <p:sp>
+        <p:nvSpPr>
+          <p:cNvPr id="2" name="Content Placeholder 1"/>
+          <p:cNvSpPr>
+            <a:spLocks noGrp="1"/>
+          </p:cNvSpPr>
+          <p:nvPr>
+            <p:ph idx="1"/>
+          </p:nvPr>
+        </p:nvSpPr>
+        <p:spPr/>
+        <p:txBody>
+          <a:bodyPr/>
+          <a:lstStyle/>
+          <a:p>
+            <a:endParaRPr lang="en-US"/>
+          </a:p>
+        </p:txBody>
+      </p:sp>
+      <p:pic>
+        <p:nvPicPr>
+          <p:cNvPr id="9" name="Picture 3" descr="C:\Users\destreek\Downloads\1-140219130T0.gif"/>
+          <p:cNvPicPr>
+            <a:picLocks noChangeAspect="1" noChangeArrowheads="1" noCrop="1"/>
+          </p:cNvPicPr>
+          <p:nvPr/>
+        </p:nvPicPr>
+        <p:blipFill>
+          <a:blip r:embed="rId3" cstate="print">
+            <a:extLst>
+              <a:ext uri="{28A0092B-C50C-407E-A947-70E740481C1C}">
+                <a14:useLocalDpi xmlns:a14="http://schemas.microsoft.com/office/drawing/2010/main" val="0"/>
+              </a:ext>
+            </a:extLst>
+          </a:blip>
+          <a:srcRect/>
+          <a:stretch>
+            <a:fillRect/>
+          </a:stretch>
+        </p:blipFill>
+        <p:spPr bwMode="auto">
+          <a:xfrm>
+            <a:off x="304800" y="101600"/>
+            <a:ext cx="604837" cy="806450"/>
+          </a:xfrm>
+          <a:prstGeom prst="rect">
+            <a:avLst/>
+          </a:prstGeom>
+          <a:noFill/>
+          <a:extLst>
+            <a:ext uri="{909E8E84-426E-40DD-AFC4-6F175D3DCCD1}">
+              <a14:hiddenFill xmlns:a14="http://schemas.microsoft.com/office/drawing/2010/main">
+                <a:solidFill>
+                  <a:srgbClr val="FFFFFF"/>
+                </a:solidFill>
+              </a14:hiddenFill>
+            </a:ext>
+          </a:extLst>
+        </p:spPr>
+      </p:pic>
+      <p:pic>
+        <p:nvPicPr>
+          <p:cNvPr id="5124" name="Picture 4"/>
+          <p:cNvPicPr>
+            <a:picLocks noChangeAspect="1" noChangeArrowheads="1"/>
+          </p:cNvPicPr>
+          <p:nvPr/>
+        </p:nvPicPr>
+        <p:blipFill rotWithShape="1">
+          <a:blip r:embed="rId4">
+            <a:extLst>
+              <a:ext uri="{28A0092B-C50C-407E-A947-70E740481C1C}">
+                <a14:useLocalDpi xmlns:a14="http://schemas.microsoft.com/office/drawing/2010/main" val="0"/>
+              </a:ext>
+            </a:extLst>
+          </a:blip>
+          <a:srcRect t="1" b="44749"/>
+          <a:stretch/>
+        </p:blipFill>
+        <p:spPr bwMode="auto">
+          <a:xfrm>
+            <a:off x="1219200" y="1041400"/>
+            <a:ext cx="5943600" cy="4410075"/>
+          </a:xfrm>
+          <a:prstGeom prst="rect">
+            <a:avLst/>
+          </a:prstGeom>
+          <a:noFill/>
+          <a:ln>
+            <a:noFill/>
+          </a:ln>
+          <a:extLst>
+            <a:ext uri="{909E8E84-426E-40DD-AFC4-6F175D3DCCD1}">
+              <a14:hiddenFill xmlns:a14="http://schemas.microsoft.com/office/drawing/2010/main">
+                <a:solidFill>
+                  <a:schemeClr val="accent1"/>
+                </a:solidFill>
+              </a14:hiddenFill>
+            </a:ext>
+            <a:ext uri="{91240B29-F687-4F45-9708-019B960494DF}">
+              <a14:hiddenLine xmlns:a14="http://schemas.microsoft.com/office/drawing/2010/main" w="9525">
+                <a:solidFill>
+                  <a:schemeClr val="tx1"/>
+                </a:solidFill>
+                <a:miter lim="800000"/>
+                <a:headEnd/>
+                <a:tailEnd/>
+              </a14:hiddenLine>
+            </a:ext>
+          </a:extLst>
+        </p:spPr>
+      </p:pic>
+    </p:spTree>
+    <p:extLst>
+      <p:ext uri="{BB962C8B-B14F-4D97-AF65-F5344CB8AC3E}">
+        <p14:creationId xmlns:p14="http://schemas.microsoft.com/office/powerpoint/2010/main" val="4108902384"/>
+      </p:ext>
+    </p:extLst>
+  </p:cSld>
+  <p:clrMapOvr>
+    <a:masterClrMapping/>
+  </p:clrMapOvr>
+  <p:timing>
+    <p:tnLst>
+      <p:par>
+        <p:cTn id="1" dur="indefinite" restart="never" nodeType="tmRoot"/>
+      </p:par>
+    </p:tnLst>
+  </p:timing>
+</p:sld>
+</file>
+
+<file path=ppt/slides/slide9.xml><?xml version="1.0" encoding="utf-8"?>
+<p:sld xmlns:a="http://schemas.openxmlformats.org/drawingml/2006/main" xmlns:r="http://schemas.openxmlformats.org/officeDocument/2006/relationships" xmlns:p="http://schemas.openxmlformats.org/presentationml/2006/main">
+  <p:cSld>
+    <p:spTree>
+      <p:nvGrpSpPr>
+        <p:cNvPr id="1" name=""/>
+        <p:cNvGrpSpPr/>
+        <p:nvPr/>
+      </p:nvGrpSpPr>
+      <p:grpSpPr>
+        <a:xfrm>
+          <a:off x="0" y="0"/>
+          <a:ext cx="0" cy="0"/>
+          <a:chOff x="0" y="0"/>
+          <a:chExt cx="0" cy="0"/>
+        </a:xfrm>
+      </p:grpSpPr>
+      <p:sp>
+        <p:nvSpPr>
+          <p:cNvPr id="2" name="Content Placeholder 1"/>
+          <p:cNvSpPr>
+            <a:spLocks noGrp="1"/>
+          </p:cNvSpPr>
+          <p:nvPr>
+            <p:ph idx="1"/>
+          </p:nvPr>
+        </p:nvSpPr>
+        <p:spPr>
+          <a:xfrm>
+            <a:off x="457200" y="990600"/>
+            <a:ext cx="8229600" cy="5181599"/>
+          </a:xfrm>
+        </p:spPr>
+        <p:txBody>
+          <a:bodyPr/>
+          <a:lstStyle/>
+          <a:p>
+            <a:r>
+              <a:rPr lang="en-US" sz="3600" dirty="0"/>
+              <a:t>Run suggested protocol on server 15</a:t>
+            </a:r>
+          </a:p>
+          <a:p>
+            <a:pPr lvl="1"/>
+            <a:r>
+              <a:rPr lang="en-US" sz="3200" dirty="0"/>
+              <a:t>Become familiar with the </a:t>
+            </a:r>
+            <a:r>
+              <a:rPr lang="en-US" sz="3200" dirty="0" smtClean="0"/>
+              <a:t>different components of the pipeline and the pipeline as a whole</a:t>
+            </a:r>
+            <a:endParaRPr lang="en-US" sz="3200" dirty="0"/>
+          </a:p>
+          <a:p>
+            <a:pPr lvl="1"/>
+            <a:r>
+              <a:rPr lang="en-US" sz="3200" dirty="0"/>
+              <a:t>Evaluate it for backbone usage</a:t>
+            </a:r>
+          </a:p>
+          <a:p>
+            <a:pPr lvl="1"/>
+            <a:r>
+              <a:rPr lang="en-US" sz="3200" dirty="0"/>
+              <a:t>Creating a set of training files we can use to program each individual step</a:t>
+            </a:r>
+          </a:p>
+          <a:p>
+            <a:pPr lvl="1"/>
+            <a:r>
+              <a:rPr lang="en-US" sz="3200" dirty="0" smtClean="0"/>
+              <a:t>Compare the </a:t>
+            </a:r>
+            <a:r>
+              <a:rPr lang="en-US" sz="3200" dirty="0"/>
+              <a:t>scientific results from the paper</a:t>
+            </a:r>
+          </a:p>
+        </p:txBody>
+      </p:sp>
+      <p:sp>
+        <p:nvSpPr>
+          <p:cNvPr id="3" name="Title 2"/>
+          <p:cNvSpPr>
+            <a:spLocks noGrp="1"/>
+          </p:cNvSpPr>
+          <p:nvPr>
+            <p:ph type="title"/>
+          </p:nvPr>
+        </p:nvSpPr>
+        <p:spPr>
+          <a:xfrm>
+            <a:off x="381000" y="304800"/>
+            <a:ext cx="8305800" cy="533400"/>
+          </a:xfrm>
+        </p:spPr>
+        <p:txBody>
+          <a:bodyPr/>
+          <a:lstStyle/>
+          <a:p>
+            <a:r>
+              <a:rPr lang="en-US" dirty="0" smtClean="0"/>
+              <a:t>Project-progress</a:t>
+            </a:r>
+            <a:endParaRPr lang="en-US" dirty="0"/>
+          </a:p>
+        </p:txBody>
+      </p:sp>
+      <p:sp>
+        <p:nvSpPr>
+          <p:cNvPr id="5" name="Title 1"/>
+          <p:cNvSpPr txBox="1">
+            <a:spLocks/>
+          </p:cNvSpPr>
+          <p:nvPr/>
+        </p:nvSpPr>
+        <p:spPr>
+          <a:xfrm>
+            <a:off x="190500" y="908050"/>
+            <a:ext cx="1828800" cy="304800"/>
+          </a:xfrm>
+          <a:prstGeom prst="rect">
+            <a:avLst/>
+          </a:prstGeom>
+        </p:spPr>
+        <p:txBody>
+          <a:bodyPr vert="horz" lIns="91440" tIns="45720" rIns="91440" bIns="45720" rtlCol="0" anchor="b">
+            <a:normAutofit fontScale="55000" lnSpcReduction="20000"/>
+          </a:bodyPr>
+          <a:lstStyle>
+            <a:lvl1pPr algn="r" defTabSz="914400" rtl="0" eaLnBrk="1" latinLnBrk="0" hangingPunct="1">
+              <a:spcBef>
+                <a:spcPct val="0"/>
+              </a:spcBef>
+              <a:buNone/>
+              <a:defRPr sz="2800" kern="1200">
+                <a:gradFill>
+                  <a:gsLst>
+                    <a:gs pos="0">
+                      <a:schemeClr val="tx1">
+                        <a:lumMod val="50000"/>
+                      </a:schemeClr>
+                    </a:gs>
+                    <a:gs pos="61000">
+                      <a:schemeClr val="tx1"/>
+                    </a:gs>
+                  </a:gsLst>
+                  <a:lin ang="5400000" scaled="0"/>
+                </a:gradFill>
+                <a:effectLst/>
+                <a:latin typeface="+mj-lt"/>
+                <a:ea typeface="+mj-ea"/>
+                <a:cs typeface="+mj-cs"/>
+              </a:defRPr>
+            </a:lvl1pPr>
+          </a:lstStyle>
+          <a:p>
+            <a:pPr algn="l"/>
+            <a:r>
+              <a:rPr lang="en-US" dirty="0" smtClean="0">
+                <a:effectLst>
+                  <a:outerShdw blurRad="38100" dist="38100" dir="2700000" algn="tl">
+                    <a:srgbClr val="000000">
+                      <a:alpha val="43137"/>
+                    </a:srgbClr>
+                  </a:outerShdw>
+                </a:effectLst>
+                <a:latin typeface="Aharoni" panose="02010803020104030203" pitchFamily="2" charset="-79"/>
+                <a:cs typeface="Aharoni" panose="02010803020104030203" pitchFamily="2" charset="-79"/>
+              </a:rPr>
+              <a:t>Mango</a:t>
+            </a:r>
+            <a:endParaRPr lang="en-US" dirty="0">
+              <a:effectLst>
+                <a:outerShdw blurRad="38100" dist="38100" dir="2700000" algn="tl">
+                  <a:srgbClr val="000000">
+                    <a:alpha val="43137"/>
+                  </a:srgbClr>
+                </a:outerShdw>
+              </a:effectLst>
+              <a:latin typeface="Aharoni" panose="02010803020104030203" pitchFamily="2" charset="-79"/>
+              <a:cs typeface="Aharoni" panose="02010803020104030203" pitchFamily="2" charset="-79"/>
+            </a:endParaRPr>
+          </a:p>
+        </p:txBody>
+      </p:sp>
+      <p:pic>
+        <p:nvPicPr>
+          <p:cNvPr id="6" name="Picture 3" descr="C:\Users\destreek\Downloads\1-140219130T0.gif"/>
+          <p:cNvPicPr>
+            <a:picLocks noChangeAspect="1" noChangeArrowheads="1" noCrop="1"/>
+          </p:cNvPicPr>
+          <p:nvPr/>
+        </p:nvPicPr>
+        <p:blipFill>
+          <a:blip r:embed="rId3" cstate="print">
+            <a:extLst>
+              <a:ext uri="{28A0092B-C50C-407E-A947-70E740481C1C}">
+                <a14:useLocalDpi xmlns:a14="http://schemas.microsoft.com/office/drawing/2010/main" val="0"/>
+              </a:ext>
+            </a:extLst>
+          </a:blip>
+          <a:srcRect/>
+          <a:stretch>
+            <a:fillRect/>
+          </a:stretch>
+        </p:blipFill>
+        <p:spPr bwMode="auto">
+          <a:xfrm>
+            <a:off x="304800" y="101600"/>
+            <a:ext cx="604837" cy="806450"/>
+          </a:xfrm>
+          <a:prstGeom prst="rect">
+            <a:avLst/>
+          </a:prstGeom>
+          <a:noFill/>
+          <a:extLst>
+            <a:ext uri="{909E8E84-426E-40DD-AFC4-6F175D3DCCD1}">
+              <a14:hiddenFill xmlns:a14="http://schemas.microsoft.com/office/drawing/2010/main">
+                <a:solidFill>
+                  <a:srgbClr val="FFFFFF"/>
+                </a:solidFill>
+              </a14:hiddenFill>
+            </a:ext>
+          </a:extLst>
+        </p:spPr>
+      </p:pic>
+    </p:spTree>
+    <p:extLst>
+      <p:ext uri="{BB962C8B-B14F-4D97-AF65-F5344CB8AC3E}">
+        <p14:creationId xmlns:p14="http://schemas.microsoft.com/office/powerpoint/2010/main" val="897774434"/>
+      </p:ext>
+    </p:extLst>
+  </p:cSld>
+  <p:clrMapOvr>
+    <a:masterClrMapping/>
+  </p:clrMapOvr>
+  <p:timing>
+    <p:tnLst>
+      <p:par>
+        <p:cTn id="1" dur="indefinite" restart="never" nodeType="tmRoot"/>
+      </p:par>
+    </p:tnLst>
+  </p:timing>
 </p:sld>
 </file>
 
 <file path=ppt/theme/theme1.xml><?xml version="1.0" encoding="utf-8"?>
 <a:theme xmlns:a="http://schemas.openxmlformats.org/drawingml/2006/main" name="Composite">
   <a:themeElements>
-    <a:clrScheme name="Composite">
+    <a:clrScheme name="Couture">
       <a:dk1>
         <a:sysClr val="windowText" lastClr="000000"/>
       </a:dk1>
@@ -4542,34 +7918,34 @@
         <a:sysClr val="window" lastClr="FFFFFF"/>
       </a:lt1>
       <a:dk2>
-        <a:srgbClr val="5B6973"/>
+        <a:srgbClr val="37302A"/>
       </a:dk2>
       <a:lt2>
-        <a:srgbClr val="E7ECED"/>
+        <a:srgbClr val="D0CCB9"/>
       </a:lt2>
       <a:accent1>
-        <a:srgbClr val="98C723"/>
+        <a:srgbClr val="9E8E5C"/>
       </a:accent1>
       <a:accent2>
-        <a:srgbClr val="59B0B9"/>
+        <a:srgbClr val="A09781"/>
       </a:accent2>
       <a:accent3>
-        <a:srgbClr val="DEAE00"/>
+        <a:srgbClr val="85776D"/>
       </a:accent3>
       <a:accent4>
-        <a:srgbClr val="B77BB4"/>
+        <a:srgbClr val="AEAFA9"/>
       </a:accent4>
       <a:accent5>
-        <a:srgbClr val="E0773C"/>
+        <a:srgbClr val="8D878B"/>
       </a:accent5>
       <a:accent6>
-        <a:srgbClr val="A98D63"/>
+        <a:srgbClr val="6B6149"/>
       </a:accent6>
       <a:hlink>
-        <a:srgbClr val="26CBEC"/>
+        <a:srgbClr val="B6A272"/>
       </a:hlink>
       <a:folHlink>
-        <a:srgbClr val="598C8C"/>
+        <a:srgbClr val="8A784F"/>
       </a:folHlink>
     </a:clrScheme>
     <a:fontScheme name="Composite">
@@ -4830,4 +8206,289 @@
   <a:objectDefaults/>
   <a:extraClrSchemeLst/>
 </a:theme>
+</file>
+
+<file path=ppt/theme/theme2.xml><?xml version="1.0" encoding="utf-8"?>
+<a:theme xmlns:a="http://schemas.openxmlformats.org/drawingml/2006/main" name="Office Theme">
+  <a:themeElements>
+    <a:clrScheme name="Office">
+      <a:dk1>
+        <a:sysClr val="windowText" lastClr="000000"/>
+      </a:dk1>
+      <a:lt1>
+        <a:sysClr val="window" lastClr="FFFFFF"/>
+      </a:lt1>
+      <a:dk2>
+        <a:srgbClr val="1F497D"/>
+      </a:dk2>
+      <a:lt2>
+        <a:srgbClr val="EEECE1"/>
+      </a:lt2>
+      <a:accent1>
+        <a:srgbClr val="4F81BD"/>
+      </a:accent1>
+      <a:accent2>
+        <a:srgbClr val="C0504D"/>
+      </a:accent2>
+      <a:accent3>
+        <a:srgbClr val="9BBB59"/>
+      </a:accent3>
+      <a:accent4>
+        <a:srgbClr val="8064A2"/>
+      </a:accent4>
+      <a:accent5>
+        <a:srgbClr val="4BACC6"/>
+      </a:accent5>
+      <a:accent6>
+        <a:srgbClr val="F79646"/>
+      </a:accent6>
+      <a:hlink>
+        <a:srgbClr val="0000FF"/>
+      </a:hlink>
+      <a:folHlink>
+        <a:srgbClr val="800080"/>
+      </a:folHlink>
+    </a:clrScheme>
+    <a:fontScheme name="Office">
+      <a:majorFont>
+        <a:latin typeface="Calibri"/>
+        <a:ea typeface=""/>
+        <a:cs typeface=""/>
+        <a:font script="Jpan" typeface="ＭＳ Ｐゴシック"/>
+        <a:font script="Hang" typeface="맑은 고딕"/>
+        <a:font script="Hans" typeface="宋体"/>
+        <a:font script="Hant" typeface="新細明體"/>
+        <a:font script="Arab" typeface="Times New Roman"/>
+        <a:font script="Hebr" typeface="Times New Roman"/>
+        <a:font script="Thai" typeface="Angsana New"/>
+        <a:font script="Ethi" typeface="Nyala"/>
+        <a:font script="Beng" typeface="Vrinda"/>
+        <a:font script="Gujr" typeface="Shruti"/>
+        <a:font script="Khmr" typeface="MoolBoran"/>
+        <a:font script="Knda" typeface="Tunga"/>
+        <a:font script="Guru" typeface="Raavi"/>
+        <a:font script="Cans" typeface="Euphemia"/>
+        <a:font script="Cher" typeface="Plantagenet Cherokee"/>
+        <a:font script="Yiii" typeface="Microsoft Yi Baiti"/>
+        <a:font script="Tibt" typeface="Microsoft Himalaya"/>
+        <a:font script="Thaa" typeface="MV Boli"/>
+        <a:font script="Deva" typeface="Mangal"/>
+        <a:font script="Telu" typeface="Gautami"/>
+        <a:font script="Taml" typeface="Latha"/>
+        <a:font script="Syrc" typeface="Estrangelo Edessa"/>
+        <a:font script="Orya" typeface="Kalinga"/>
+        <a:font script="Mlym" typeface="Kartika"/>
+        <a:font script="Laoo" typeface="DokChampa"/>
+        <a:font script="Sinh" typeface="Iskoola Pota"/>
+        <a:font script="Mong" typeface="Mongolian Baiti"/>
+        <a:font script="Viet" typeface="Times New Roman"/>
+        <a:font script="Uigh" typeface="Microsoft Uighur"/>
+        <a:font script="Geor" typeface="Sylfaen"/>
+      </a:majorFont>
+      <a:minorFont>
+        <a:latin typeface="Calibri"/>
+        <a:ea typeface=""/>
+        <a:cs typeface=""/>
+        <a:font script="Jpan" typeface="ＭＳ Ｐゴシック"/>
+        <a:font script="Hang" typeface="맑은 고딕"/>
+        <a:font script="Hans" typeface="宋体"/>
+        <a:font script="Hant" typeface="新細明體"/>
+        <a:font script="Arab" typeface="Arial"/>
+        <a:font script="Hebr" typeface="Arial"/>
+        <a:font script="Thai" typeface="Cordia New"/>
+        <a:font script="Ethi" typeface="Nyala"/>
+        <a:font script="Beng" typeface="Vrinda"/>
+        <a:font script="Gujr" typeface="Shruti"/>
+        <a:font script="Khmr" typeface="DaunPenh"/>
+        <a:font script="Knda" typeface="Tunga"/>
+        <a:font script="Guru" typeface="Raavi"/>
+        <a:font script="Cans" typeface="Euphemia"/>
+        <a:font script="Cher" typeface="Plantagenet Cherokee"/>
+        <a:font script="Yiii" typeface="Microsoft Yi Baiti"/>
+        <a:font script="Tibt" typeface="Microsoft Himalaya"/>
+        <a:font script="Thaa" typeface="MV Boli"/>
+        <a:font script="Deva" typeface="Mangal"/>
+        <a:font script="Telu" typeface="Gautami"/>
+        <a:font script="Taml" typeface="Latha"/>
+        <a:font script="Syrc" typeface="Estrangelo Edessa"/>
+        <a:font script="Orya" typeface="Kalinga"/>
+        <a:font script="Mlym" typeface="Kartika"/>
+        <a:font script="Laoo" typeface="DokChampa"/>
+        <a:font script="Sinh" typeface="Iskoola Pota"/>
+        <a:font script="Mong" typeface="Mongolian Baiti"/>
+        <a:font script="Viet" typeface="Arial"/>
+        <a:font script="Uigh" typeface="Microsoft Uighur"/>
+        <a:font script="Geor" typeface="Sylfaen"/>
+      </a:minorFont>
+    </a:fontScheme>
+    <a:fmtScheme name="Office">
+      <a:fillStyleLst>
+        <a:solidFill>
+          <a:schemeClr val="phClr"/>
+        </a:solidFill>
+        <a:gradFill rotWithShape="1">
+          <a:gsLst>
+            <a:gs pos="0">
+              <a:schemeClr val="phClr">
+                <a:tint val="50000"/>
+                <a:satMod val="300000"/>
+              </a:schemeClr>
+            </a:gs>
+            <a:gs pos="35000">
+              <a:schemeClr val="phClr">
+                <a:tint val="37000"/>
+                <a:satMod val="300000"/>
+              </a:schemeClr>
+            </a:gs>
+            <a:gs pos="100000">
+              <a:schemeClr val="phClr">
+                <a:tint val="15000"/>
+                <a:satMod val="350000"/>
+              </a:schemeClr>
+            </a:gs>
+          </a:gsLst>
+          <a:lin ang="16200000" scaled="1"/>
+        </a:gradFill>
+        <a:gradFill rotWithShape="1">
+          <a:gsLst>
+            <a:gs pos="0">
+              <a:schemeClr val="phClr">
+                <a:shade val="51000"/>
+                <a:satMod val="130000"/>
+              </a:schemeClr>
+            </a:gs>
+            <a:gs pos="80000">
+              <a:schemeClr val="phClr">
+                <a:shade val="93000"/>
+                <a:satMod val="130000"/>
+              </a:schemeClr>
+            </a:gs>
+            <a:gs pos="100000">
+              <a:schemeClr val="phClr">
+                <a:shade val="94000"/>
+                <a:satMod val="135000"/>
+              </a:schemeClr>
+            </a:gs>
+          </a:gsLst>
+          <a:lin ang="16200000" scaled="0"/>
+        </a:gradFill>
+      </a:fillStyleLst>
+      <a:lnStyleLst>
+        <a:ln w="9525" cap="flat" cmpd="sng" algn="ctr">
+          <a:solidFill>
+            <a:schemeClr val="phClr">
+              <a:shade val="95000"/>
+              <a:satMod val="105000"/>
+            </a:schemeClr>
+          </a:solidFill>
+          <a:prstDash val="solid"/>
+        </a:ln>
+        <a:ln w="25400" cap="flat" cmpd="sng" algn="ctr">
+          <a:solidFill>
+            <a:schemeClr val="phClr"/>
+          </a:solidFill>
+          <a:prstDash val="solid"/>
+        </a:ln>
+        <a:ln w="38100" cap="flat" cmpd="sng" algn="ctr">
+          <a:solidFill>
+            <a:schemeClr val="phClr"/>
+          </a:solidFill>
+          <a:prstDash val="solid"/>
+        </a:ln>
+      </a:lnStyleLst>
+      <a:effectStyleLst>
+        <a:effectStyle>
+          <a:effectLst>
+            <a:outerShdw blurRad="40000" dist="20000" dir="5400000" rotWithShape="0">
+              <a:srgbClr val="000000">
+                <a:alpha val="38000"/>
+              </a:srgbClr>
+            </a:outerShdw>
+          </a:effectLst>
+        </a:effectStyle>
+        <a:effectStyle>
+          <a:effectLst>
+            <a:outerShdw blurRad="40000" dist="23000" dir="5400000" rotWithShape="0">
+              <a:srgbClr val="000000">
+                <a:alpha val="35000"/>
+              </a:srgbClr>
+            </a:outerShdw>
+          </a:effectLst>
+        </a:effectStyle>
+        <a:effectStyle>
+          <a:effectLst>
+            <a:outerShdw blurRad="40000" dist="23000" dir="5400000" rotWithShape="0">
+              <a:srgbClr val="000000">
+                <a:alpha val="35000"/>
+              </a:srgbClr>
+            </a:outerShdw>
+          </a:effectLst>
+          <a:scene3d>
+            <a:camera prst="orthographicFront">
+              <a:rot lat="0" lon="0" rev="0"/>
+            </a:camera>
+            <a:lightRig rig="threePt" dir="t">
+              <a:rot lat="0" lon="0" rev="1200000"/>
+            </a:lightRig>
+          </a:scene3d>
+          <a:sp3d>
+            <a:bevelT w="63500" h="25400"/>
+          </a:sp3d>
+        </a:effectStyle>
+      </a:effectStyleLst>
+      <a:bgFillStyleLst>
+        <a:solidFill>
+          <a:schemeClr val="phClr"/>
+        </a:solidFill>
+        <a:gradFill rotWithShape="1">
+          <a:gsLst>
+            <a:gs pos="0">
+              <a:schemeClr val="phClr">
+                <a:tint val="40000"/>
+                <a:satMod val="350000"/>
+              </a:schemeClr>
+            </a:gs>
+            <a:gs pos="40000">
+              <a:schemeClr val="phClr">
+                <a:tint val="45000"/>
+                <a:shade val="99000"/>
+                <a:satMod val="350000"/>
+              </a:schemeClr>
+            </a:gs>
+            <a:gs pos="100000">
+              <a:schemeClr val="phClr">
+                <a:shade val="20000"/>
+                <a:satMod val="255000"/>
+              </a:schemeClr>
+            </a:gs>
+          </a:gsLst>
+          <a:path path="circle">
+            <a:fillToRect l="50000" t="-80000" r="50000" b="180000"/>
+          </a:path>
+        </a:gradFill>
+        <a:gradFill rotWithShape="1">
+          <a:gsLst>
+            <a:gs pos="0">
+              <a:schemeClr val="phClr">
+                <a:tint val="80000"/>
+                <a:satMod val="300000"/>
+              </a:schemeClr>
+            </a:gs>
+            <a:gs pos="100000">
+              <a:schemeClr val="phClr">
+                <a:shade val="30000"/>
+                <a:satMod val="200000"/>
+              </a:schemeClr>
+            </a:gs>
+          </a:gsLst>
+          <a:path path="circle">
+            <a:fillToRect l="50000" t="50000" r="50000" b="50000"/>
+          </a:path>
+        </a:gradFill>
+      </a:bgFillStyleLst>
+    </a:fmtScheme>
+  </a:themeElements>
+  <a:objectDefaults/>
+  <a:extraClrSchemeLst/>
+</a:theme>
 </file>
</xml_diff>

<commit_message>
Final version used during presentation
</commit_message>
<xml_diff>
--- a/Presentations/Projectplan - planning and progress.pptx
+++ b/Presentations/Projectplan - planning and progress.pptx
@@ -5,19 +5,20 @@
     <p:sldMasterId id="2147483732" r:id="rId1"/>
   </p:sldMasterIdLst>
   <p:notesMasterIdLst>
-    <p:notesMasterId r:id="rId12"/>
+    <p:notesMasterId r:id="rId13"/>
   </p:notesMasterIdLst>
   <p:sldIdLst>
     <p:sldId id="256" r:id="rId2"/>
     <p:sldId id="258" r:id="rId3"/>
     <p:sldId id="259" r:id="rId4"/>
-    <p:sldId id="264" r:id="rId5"/>
-    <p:sldId id="263" r:id="rId6"/>
-    <p:sldId id="265" r:id="rId7"/>
-    <p:sldId id="262" r:id="rId8"/>
-    <p:sldId id="266" r:id="rId9"/>
-    <p:sldId id="260" r:id="rId10"/>
-    <p:sldId id="267" r:id="rId11"/>
+    <p:sldId id="268" r:id="rId5"/>
+    <p:sldId id="264" r:id="rId6"/>
+    <p:sldId id="263" r:id="rId7"/>
+    <p:sldId id="269" r:id="rId8"/>
+    <p:sldId id="262" r:id="rId9"/>
+    <p:sldId id="266" r:id="rId10"/>
+    <p:sldId id="260" r:id="rId11"/>
+    <p:sldId id="267" r:id="rId12"/>
   </p:sldIdLst>
   <p:sldSz cx="9144000" cy="6858000" type="screen4x3"/>
   <p:notesSz cx="6858000" cy="9144000"/>
@@ -201,7 +202,7 @@
           <a:p>
             <a:fld id="{7D543C8F-D305-452D-B313-E2E0AE732763}" type="datetimeFigureOut">
               <a:rPr lang="en-US" smtClean="0"/>
-              <a:t>3/3/2014</a:t>
+              <a:t>3/4/2014</a:t>
             </a:fld>
             <a:endParaRPr lang="en-US"/>
           </a:p>
@@ -515,15 +516,15 @@
           <a:p>
             <a:r>
               <a:rPr lang="en-US" baseline="0" dirty="0" smtClean="0"/>
-              <a:t>Hello everyone, I am Marcel van de </a:t>
-            </a:r>
-            <a:r>
-              <a:rPr lang="en-US" baseline="0" dirty="0" err="1" smtClean="0"/>
-              <a:t>Streek</a:t>
+              <a:t>Hello everyone, I am </a:t>
             </a:r>
             <a:r>
               <a:rPr lang="en-US" baseline="0" dirty="0" smtClean="0"/>
-              <a:t>. I am the speaker for the Mango group.</a:t>
+              <a:t>Marcel. </a:t>
+            </a:r>
+            <a:r>
+              <a:rPr lang="en-US" baseline="0" dirty="0" smtClean="0"/>
+              <a:t>I am the speaker for the Mango group.</a:t>
             </a:r>
           </a:p>
           <a:p>
@@ -535,8 +536,19 @@
           <a:p>
             <a:r>
               <a:rPr lang="en-US" baseline="0" dirty="0" smtClean="0"/>
-              <a:t>After the project kick-off, we will move on to the pipeline and our planning for the next two weeks.</a:t>
-            </a:r>
+              <a:t>After the project kick-off, we will move on to the pipeline and our planning for the next two weeks</a:t>
+            </a:r>
+            <a:r>
+              <a:rPr lang="en-US" baseline="0" dirty="0" smtClean="0"/>
+              <a:t>. </a:t>
+            </a:r>
+          </a:p>
+          <a:p>
+            <a:r>
+              <a:rPr lang="en-US" baseline="0" dirty="0" smtClean="0"/>
+              <a:t>At the end of the presentation there is a moment to ask questions and discuss our approach.</a:t>
+            </a:r>
+            <a:endParaRPr lang="en-US" baseline="0" dirty="0" smtClean="0"/>
           </a:p>
           <a:p>
             <a:r>
@@ -574,6 +586,90 @@
     <p:extLst>
       <p:ext uri="{BB962C8B-B14F-4D97-AF65-F5344CB8AC3E}">
         <p14:creationId xmlns:p14="http://schemas.microsoft.com/office/powerpoint/2010/main" val="1712229339"/>
+      </p:ext>
+    </p:extLst>
+  </p:cSld>
+  <p:clrMapOvr>
+    <a:masterClrMapping/>
+  </p:clrMapOvr>
+</p:notes>
+</file>
+
+<file path=ppt/notesSlides/notesSlide10.xml><?xml version="1.0" encoding="utf-8"?>
+<p:notes xmlns:a="http://schemas.openxmlformats.org/drawingml/2006/main" xmlns:r="http://schemas.openxmlformats.org/officeDocument/2006/relationships" xmlns:p="http://schemas.openxmlformats.org/presentationml/2006/main">
+  <p:cSld>
+    <p:spTree>
+      <p:nvGrpSpPr>
+        <p:cNvPr id="1" name=""/>
+        <p:cNvGrpSpPr/>
+        <p:nvPr/>
+      </p:nvGrpSpPr>
+      <p:grpSpPr>
+        <a:xfrm>
+          <a:off x="0" y="0"/>
+          <a:ext cx="0" cy="0"/>
+          <a:chOff x="0" y="0"/>
+          <a:chExt cx="0" cy="0"/>
+        </a:xfrm>
+      </p:grpSpPr>
+      <p:sp>
+        <p:nvSpPr>
+          <p:cNvPr id="2" name="Slide Image Placeholder 1"/>
+          <p:cNvSpPr>
+            <a:spLocks noGrp="1" noRot="1" noChangeAspect="1"/>
+          </p:cNvSpPr>
+          <p:nvPr>
+            <p:ph type="sldImg"/>
+          </p:nvPr>
+        </p:nvSpPr>
+        <p:spPr/>
+      </p:sp>
+      <p:sp>
+        <p:nvSpPr>
+          <p:cNvPr id="3" name="Notes Placeholder 2"/>
+          <p:cNvSpPr>
+            <a:spLocks noGrp="1"/>
+          </p:cNvSpPr>
+          <p:nvPr>
+            <p:ph type="body" idx="1"/>
+          </p:nvPr>
+        </p:nvSpPr>
+        <p:spPr/>
+        <p:txBody>
+          <a:bodyPr/>
+          <a:lstStyle/>
+          <a:p>
+            <a:endParaRPr lang="en-US" dirty="0"/>
+          </a:p>
+        </p:txBody>
+      </p:sp>
+      <p:sp>
+        <p:nvSpPr>
+          <p:cNvPr id="4" name="Slide Number Placeholder 3"/>
+          <p:cNvSpPr>
+            <a:spLocks noGrp="1"/>
+          </p:cNvSpPr>
+          <p:nvPr>
+            <p:ph type="sldNum" sz="quarter" idx="10"/>
+          </p:nvPr>
+        </p:nvSpPr>
+        <p:spPr/>
+        <p:txBody>
+          <a:bodyPr/>
+          <a:lstStyle/>
+          <a:p>
+            <a:fld id="{99A3DC0A-0F13-4D73-8F44-7A783FA67ED0}" type="slidenum">
+              <a:rPr lang="en-US" smtClean="0"/>
+              <a:t>11</a:t>
+            </a:fld>
+            <a:endParaRPr lang="en-US"/>
+          </a:p>
+        </p:txBody>
+      </p:sp>
+    </p:spTree>
+    <p:extLst>
+      <p:ext uri="{BB962C8B-B14F-4D97-AF65-F5344CB8AC3E}">
+        <p14:creationId xmlns:p14="http://schemas.microsoft.com/office/powerpoint/2010/main" val="2252985758"/>
       </p:ext>
     </p:extLst>
   </p:cSld>
@@ -641,7 +737,31 @@
             </a:r>
             <a:r>
               <a:rPr lang="en-US" baseline="0" dirty="0" smtClean="0"/>
-              <a:t> though it was suggested that we find datasets from published papers, we selected the provided dataset of yeast. We selected this dataset because we are convinced the coaches have validate the provided datasets, we will use these to test our final pipeline.</a:t>
+              <a:t> though it was suggested that we find datasets from published papers, we selected the provided dataset of yeast. We selected this dataset because we are convinced </a:t>
+            </a:r>
+            <a:r>
+              <a:rPr lang="en-US" baseline="0" dirty="0" smtClean="0"/>
+              <a:t>our coaches validated </a:t>
+            </a:r>
+            <a:r>
+              <a:rPr lang="en-US" baseline="0" dirty="0" smtClean="0"/>
+              <a:t>the provided </a:t>
+            </a:r>
+            <a:r>
+              <a:rPr lang="en-US" baseline="0" dirty="0" smtClean="0"/>
+              <a:t>datasets. Therefore, </a:t>
+            </a:r>
+            <a:r>
+              <a:rPr lang="en-US" baseline="0" dirty="0" smtClean="0"/>
+              <a:t>we will use </a:t>
+            </a:r>
+            <a:r>
+              <a:rPr lang="en-US" baseline="0" dirty="0" smtClean="0"/>
+              <a:t>these datasets </a:t>
+            </a:r>
+            <a:r>
+              <a:rPr lang="en-US" baseline="0" dirty="0" smtClean="0"/>
+              <a:t>to test our final pipeline.</a:t>
             </a:r>
           </a:p>
           <a:p>
@@ -656,11 +776,59 @@
           <a:p>
             <a:r>
               <a:rPr lang="en-US" dirty="0" smtClean="0"/>
-              <a:t>We started Friday by looking at the</a:t>
+              <a:t>We started </a:t>
+            </a:r>
+            <a:r>
+              <a:rPr lang="en-US" dirty="0" smtClean="0"/>
+              <a:t>on Friday </a:t>
+            </a:r>
+            <a:r>
+              <a:rPr lang="en-US" dirty="0" smtClean="0"/>
+              <a:t>by looking at the</a:t>
             </a:r>
             <a:r>
               <a:rPr lang="en-US" baseline="0" dirty="0" smtClean="0"/>
-              <a:t> biological aspects of the pipeline. At this point we only prior knowledge from the previous classes. Therefore, we could still think broadly about the pipeline’s requirements. The final product of this discussion will be discussed later. After constructing our secret pipeline, we assigned priorities to each part of the pipeline using the </a:t>
+              <a:t> biological aspects of the pipeline</a:t>
+            </a:r>
+            <a:r>
+              <a:rPr lang="en-US" baseline="0" dirty="0" smtClean="0"/>
+              <a:t>. </a:t>
+            </a:r>
+            <a:r>
+              <a:rPr lang="en-US" baseline="0" dirty="0" smtClean="0"/>
+              <a:t>At this point we only prior knowledge from the previous </a:t>
+            </a:r>
+            <a:r>
+              <a:rPr lang="en-US" baseline="0" dirty="0" smtClean="0"/>
+              <a:t>courses. </a:t>
+            </a:r>
+            <a:r>
+              <a:rPr lang="en-US" baseline="0" dirty="0" smtClean="0"/>
+              <a:t>Therefore, we could </a:t>
+            </a:r>
+            <a:r>
+              <a:rPr lang="en-US" baseline="0" dirty="0" smtClean="0"/>
+              <a:t>think </a:t>
+            </a:r>
+            <a:r>
+              <a:rPr lang="en-US" baseline="0" dirty="0" smtClean="0"/>
+              <a:t>broadly about the pipeline’s requirements. </a:t>
+            </a:r>
+            <a:r>
+              <a:rPr lang="en-US" baseline="0" dirty="0" smtClean="0"/>
+              <a:t>The </a:t>
+            </a:r>
+            <a:r>
+              <a:rPr lang="en-US" baseline="0" dirty="0" smtClean="0"/>
+              <a:t>final product of this discussion will be discussed later. After constructing our </a:t>
+            </a:r>
+            <a:r>
+              <a:rPr lang="en-US" baseline="0" dirty="0" smtClean="0"/>
+              <a:t>pipeline</a:t>
+            </a:r>
+            <a:r>
+              <a:rPr lang="en-US" baseline="0" dirty="0" smtClean="0"/>
+              <a:t>, we assigned priorities to each part of the pipeline using the </a:t>
             </a:r>
             <a:r>
               <a:rPr lang="en-US" baseline="0" dirty="0" err="1" smtClean="0"/>
@@ -759,67 +927,123 @@
           <a:p>
             <a:r>
               <a:rPr lang="en-US" dirty="0" smtClean="0"/>
-              <a:t>Since we expect to have a tight schedule, we tried to strip-off</a:t>
+              <a:t>We could select from two projects, differential expression and co-expression. Since</a:t>
             </a:r>
             <a:r>
               <a:rPr lang="en-US" baseline="0" dirty="0" smtClean="0"/>
-              <a:t> all the unnecessary features leading to the MUST list as shown on the slide. Essential requirements of the pipeline remains. The initial </a:t>
+              <a:t> we thought differential expression was interesting, we selected this project.</a:t>
+            </a:r>
+            <a:r>
+              <a:rPr lang="en-US" dirty="0" smtClean="0"/>
+              <a:t> Even</a:t>
+            </a:r>
+            <a:r>
+              <a:rPr lang="en-US" baseline="0" dirty="0" smtClean="0"/>
+              <a:t> though it was suggested that we find datasets from published papers, we selected the provided dataset of yeast. We selected this dataset because we are convinced </a:t>
+            </a:r>
+            <a:r>
+              <a:rPr lang="en-US" baseline="0" dirty="0" smtClean="0"/>
+              <a:t>our coaches validated </a:t>
+            </a:r>
+            <a:r>
+              <a:rPr lang="en-US" baseline="0" dirty="0" smtClean="0"/>
+              <a:t>the provided </a:t>
+            </a:r>
+            <a:r>
+              <a:rPr lang="en-US" baseline="0" dirty="0" smtClean="0"/>
+              <a:t>datasets. Therefore, </a:t>
+            </a:r>
+            <a:r>
+              <a:rPr lang="en-US" baseline="0" dirty="0" smtClean="0"/>
+              <a:t>we will use </a:t>
+            </a:r>
+            <a:r>
+              <a:rPr lang="en-US" baseline="0" dirty="0" smtClean="0"/>
+              <a:t>these datasets </a:t>
+            </a:r>
+            <a:r>
+              <a:rPr lang="en-US" baseline="0" dirty="0" smtClean="0"/>
+              <a:t>to test our final pipeline.</a:t>
+            </a:r>
+          </a:p>
+          <a:p>
+            <a:endParaRPr lang="en-US" baseline="0" dirty="0" smtClean="0"/>
+          </a:p>
+          <a:p>
+            <a:r>
+              <a:rPr lang="en-US" dirty="0" smtClean="0"/>
+              <a:t>So what did we do in the first few days?</a:t>
+            </a:r>
+          </a:p>
+          <a:p>
+            <a:r>
+              <a:rPr lang="en-US" dirty="0" smtClean="0"/>
+              <a:t>We started </a:t>
+            </a:r>
+            <a:r>
+              <a:rPr lang="en-US" dirty="0" smtClean="0"/>
+              <a:t>on Friday </a:t>
+            </a:r>
+            <a:r>
+              <a:rPr lang="en-US" dirty="0" smtClean="0"/>
+              <a:t>by looking at the</a:t>
+            </a:r>
+            <a:r>
+              <a:rPr lang="en-US" baseline="0" dirty="0" smtClean="0"/>
+              <a:t> biological aspects of the pipeline</a:t>
+            </a:r>
+            <a:r>
+              <a:rPr lang="en-US" baseline="0" dirty="0" smtClean="0"/>
+              <a:t>. </a:t>
+            </a:r>
+            <a:r>
+              <a:rPr lang="en-US" baseline="0" dirty="0" smtClean="0"/>
+              <a:t>At this point we only prior knowledge from the previous </a:t>
+            </a:r>
+            <a:r>
+              <a:rPr lang="en-US" baseline="0" dirty="0" smtClean="0"/>
+              <a:t>courses. </a:t>
+            </a:r>
+            <a:r>
+              <a:rPr lang="en-US" baseline="0" dirty="0" smtClean="0"/>
+              <a:t>Therefore, we could </a:t>
+            </a:r>
+            <a:r>
+              <a:rPr lang="en-US" baseline="0" dirty="0" smtClean="0"/>
+              <a:t>think </a:t>
+            </a:r>
+            <a:r>
+              <a:rPr lang="en-US" baseline="0" dirty="0" smtClean="0"/>
+              <a:t>broadly about the pipeline’s requirements. </a:t>
+            </a:r>
+            <a:r>
+              <a:rPr lang="en-US" baseline="0" dirty="0" smtClean="0"/>
+              <a:t>The </a:t>
+            </a:r>
+            <a:r>
+              <a:rPr lang="en-US" baseline="0" dirty="0" smtClean="0"/>
+              <a:t>final product of this discussion will be discussed later. After constructing our </a:t>
+            </a:r>
+            <a:r>
+              <a:rPr lang="en-US" baseline="0" dirty="0" smtClean="0"/>
+              <a:t>pipeline</a:t>
+            </a:r>
+            <a:r>
+              <a:rPr lang="en-US" baseline="0" dirty="0" smtClean="0"/>
+              <a:t>, we assigned priorities to each part of the pipeline using the </a:t>
             </a:r>
             <a:r>
               <a:rPr lang="en-US" baseline="0" dirty="0" err="1" smtClean="0"/>
-              <a:t>dataformating</a:t>
+              <a:t>MoSCoW</a:t>
             </a:r>
             <a:r>
               <a:rPr lang="en-US" baseline="0" dirty="0" smtClean="0"/>
-              <a:t>, quality control, quality improvement, mapping, read counting, data normalization, DE and enrichment. In which enrichment is providing an output consisting of a basic list with genes which are enriched.</a:t>
-            </a:r>
+              <a:t> approach as discussed by Harm and shown on the slide.</a:t>
+            </a:r>
+            <a:endParaRPr lang="en-US" dirty="0" smtClean="0"/>
           </a:p>
           <a:p>
             <a:endParaRPr lang="en-US" baseline="0" dirty="0" smtClean="0"/>
-          </a:p>
-          <a:p>
-            <a:r>
-              <a:rPr lang="en-US" baseline="0" dirty="0" smtClean="0"/>
-              <a:t>Because we want to create a feasible pipeline we should chose appropriate software, however this is not a MUST since we most likely create a pipeline using less efficient software. Moreover, you can spend a lot of time discussion which software is the best for each step. Making it a thesis project while your add it. Therefore, this is moved to the should list.</a:t>
-            </a:r>
-          </a:p>
-          <a:p>
-            <a:r>
-              <a:rPr lang="en-US" baseline="0" dirty="0" smtClean="0"/>
-              <a:t>Then we have checking the quality of the mapping. Since we wish to improve the output, we included enrichment again to include GO terms and functions of the enriched genes.</a:t>
-            </a:r>
-          </a:p>
-          <a:p>
-            <a:r>
-              <a:rPr lang="en-US" baseline="0" dirty="0" smtClean="0"/>
-              <a:t>Possibly add output functions for the R package </a:t>
-            </a:r>
-            <a:r>
-              <a:rPr lang="en-US" baseline="0" dirty="0" err="1" smtClean="0"/>
-              <a:t>bioconductor</a:t>
-            </a:r>
-            <a:r>
-              <a:rPr lang="en-US" baseline="0" dirty="0" smtClean="0"/>
-              <a:t>.</a:t>
-            </a:r>
-          </a:p>
-          <a:p>
-            <a:endParaRPr lang="en-US" baseline="0" dirty="0" smtClean="0"/>
-          </a:p>
-          <a:p>
-            <a:r>
-              <a:rPr lang="en-US" baseline="0" dirty="0" smtClean="0"/>
-              <a:t>Then we are left with a COULD list we could make if we have time left. Due to the time pressure, we haven’t spend time on the WOULD list.</a:t>
-            </a:r>
-          </a:p>
-          <a:p>
-            <a:endParaRPr lang="en-US" baseline="0" dirty="0" smtClean="0"/>
-          </a:p>
-          <a:p>
-            <a:r>
-              <a:rPr lang="en-US" baseline="0" dirty="0" smtClean="0"/>
-              <a:t>We will now continue to our proposed pipeline</a:t>
-            </a:r>
           </a:p>
         </p:txBody>
       </p:sp>
@@ -849,7 +1073,7 @@
     </p:spTree>
     <p:extLst>
       <p:ext uri="{BB962C8B-B14F-4D97-AF65-F5344CB8AC3E}">
-        <p14:creationId xmlns:p14="http://schemas.microsoft.com/office/powerpoint/2010/main" val="2122666967"/>
+        <p14:creationId xmlns:p14="http://schemas.microsoft.com/office/powerpoint/2010/main" val="78428398"/>
       </p:ext>
     </p:extLst>
   </p:cSld>
@@ -905,53 +1129,66 @@
           <a:p>
             <a:r>
               <a:rPr lang="en-US" dirty="0" smtClean="0"/>
-              <a:t>Over the weekend we studied</a:t>
+              <a:t>Since we expect to have a tight schedule, we tried to strip-off</a:t>
             </a:r>
             <a:r>
               <a:rPr lang="en-US" baseline="0" dirty="0" smtClean="0"/>
-              <a:t> several articles under which “Differential gene and transcript expression analysis of RNA-</a:t>
+              <a:t> all the unnecessary features leading to the MUST list as shown on the slide. Essential requirements of the pipeline remains. The initial </a:t>
             </a:r>
             <a:r>
               <a:rPr lang="en-US" baseline="0" dirty="0" err="1" smtClean="0"/>
-              <a:t>seq</a:t>
+              <a:t>dataformating</a:t>
             </a:r>
             <a:r>
               <a:rPr lang="en-US" baseline="0" dirty="0" smtClean="0"/>
-              <a:t> experiments with </a:t>
+              <a:t>, quality control, quality improvement, mapping, read counting, data normalization, DE and enrichment. In which enrichment is providing an output consisting of a basic list with genes which are enriched.</a:t>
+            </a:r>
+          </a:p>
+          <a:p>
+            <a:endParaRPr lang="en-US" baseline="0" dirty="0" smtClean="0"/>
+          </a:p>
+          <a:p>
+            <a:r>
+              <a:rPr lang="en-US" baseline="0" dirty="0" smtClean="0"/>
+              <a:t>Because we want to create a feasible pipeline we should chose appropriate software, however this is not a MUST since we most likely create a pipeline using less efficient software. Moreover, you can spend a lot of time discussion which software is the best for each step. Making it a thesis project while your add it. Therefore, this is moved to the should list.</a:t>
+            </a:r>
+          </a:p>
+          <a:p>
+            <a:r>
+              <a:rPr lang="en-US" baseline="0" dirty="0" smtClean="0"/>
+              <a:t>Then we have checking the quality of the mapping. Since we wish to improve the output, we included enrichment again to include GO terms and functions of the enriched genes.</a:t>
+            </a:r>
+          </a:p>
+          <a:p>
+            <a:r>
+              <a:rPr lang="en-US" baseline="0" dirty="0" smtClean="0"/>
+              <a:t>Possibly add output functions for the R package </a:t>
             </a:r>
             <a:r>
               <a:rPr lang="en-US" baseline="0" dirty="0" err="1" smtClean="0"/>
-              <a:t>TopHat</a:t>
-            </a:r>
-            <a:r>
-              <a:rPr lang="en-US" baseline="0" dirty="0" smtClean="0"/>
-              <a:t> and Cufflinks”. In this article the following protocol is proposed. However, when we compare their protocol to our proposed pipeline we found it to be missing a few steps. One such step is the quality control of the input data. After studying their protocol, we constructed our draft backbone for our pipeline, as shown on the right.</a:t>
-            </a:r>
-          </a:p>
-          <a:p>
-            <a:endParaRPr lang="en-US" baseline="0" dirty="0" smtClean="0"/>
-          </a:p>
-          <a:p>
-            <a:r>
-              <a:rPr lang="en-US" baseline="0" dirty="0" smtClean="0"/>
-              <a:t>Firstly we want to illustrate that the control group and test group are processed separately in the first few steps. Moreover, we added the quality control of the input files. The alignment and mapping remains the same. The final part of the pipeline backbone is split up in a list of differentially expressed genes and two optional automated tasks for identifying enriched functions…</a:t>
-            </a:r>
-          </a:p>
-          <a:p>
-            <a:endParaRPr lang="en-US" baseline="0" dirty="0" smtClean="0"/>
-          </a:p>
-          <a:p>
-            <a:r>
-              <a:rPr lang="en-US" baseline="0" dirty="0" smtClean="0"/>
-              <a:t>Now that we have our plan, it’s time to consider ways to keep track of our progress and development </a:t>
-            </a:r>
-            <a:r>
-              <a:rPr lang="en-US" baseline="0" dirty="0" err="1" smtClean="0"/>
-              <a:t>enviroments</a:t>
+              <a:t>bioconductor</a:t>
             </a:r>
             <a:r>
               <a:rPr lang="en-US" baseline="0" dirty="0" smtClean="0"/>
               <a:t>.</a:t>
+            </a:r>
+          </a:p>
+          <a:p>
+            <a:endParaRPr lang="en-US" baseline="0" dirty="0" smtClean="0"/>
+          </a:p>
+          <a:p>
+            <a:r>
+              <a:rPr lang="en-US" baseline="0" dirty="0" smtClean="0"/>
+              <a:t>Then we are left with a COULD list we could make if we have time left. Due to the time pressure, we haven’t spend time on the WOULD list.</a:t>
+            </a:r>
+          </a:p>
+          <a:p>
+            <a:endParaRPr lang="en-US" baseline="0" dirty="0" smtClean="0"/>
+          </a:p>
+          <a:p>
+            <a:r>
+              <a:rPr lang="en-US" baseline="0" dirty="0" smtClean="0"/>
+              <a:t>We will now continue to our proposed pipeline</a:t>
             </a:r>
           </a:p>
         </p:txBody>
@@ -982,7 +1219,7 @@
     </p:spTree>
     <p:extLst>
       <p:ext uri="{BB962C8B-B14F-4D97-AF65-F5344CB8AC3E}">
-        <p14:creationId xmlns:p14="http://schemas.microsoft.com/office/powerpoint/2010/main" val="1610183156"/>
+        <p14:creationId xmlns:p14="http://schemas.microsoft.com/office/powerpoint/2010/main" val="2122666967"/>
       </p:ext>
     </p:extLst>
   </p:cSld>
@@ -1037,33 +1274,60 @@
           <a:lstStyle/>
           <a:p>
             <a:r>
+              <a:rPr lang="en-US" dirty="0" smtClean="0"/>
+              <a:t>Over the weekend we studied</a:t>
+            </a:r>
+            <a:r>
               <a:rPr lang="en-US" baseline="0" dirty="0" smtClean="0"/>
-              <a:t>In order to share code and being able to review coding history we have decided to use </a:t>
+              <a:t> several articles under which “Differential gene and transcript expression analysis of RNA-</a:t>
             </a:r>
             <a:r>
               <a:rPr lang="en-US" baseline="0" dirty="0" err="1" smtClean="0"/>
-              <a:t>GitHub</a:t>
+              <a:t>seq</a:t>
             </a:r>
             <a:r>
               <a:rPr lang="en-US" baseline="0" dirty="0" smtClean="0"/>
-              <a:t> as source control. Using </a:t>
+              <a:t> experiments with </a:t>
             </a:r>
             <a:r>
               <a:rPr lang="en-US" baseline="0" dirty="0" err="1" smtClean="0"/>
-              <a:t>Github</a:t>
+              <a:t>TopHat</a:t>
             </a:r>
             <a:r>
               <a:rPr lang="en-US" baseline="0" dirty="0" smtClean="0"/>
-              <a:t> we have stored our code in a save location and we can review each others code. This provides us with an insight of in programming </a:t>
-            </a:r>
-            <a:r>
-              <a:rPr lang="en-US" baseline="0" dirty="0" err="1" smtClean="0"/>
-              <a:t>progess</a:t>
+              <a:t> and Cufflinks”. In this article the following protocol is proposed. However, when we compare their protocol to our proposed pipeline we found it to be missing a few steps. One such step is the quality control of the input data. After studying their protocol, we constructed </a:t>
             </a:r>
             <a:r>
               <a:rPr lang="en-US" baseline="0" dirty="0" smtClean="0"/>
-              <a:t> and a remote location allowing everyone to work and share important documents without overflowing the mailbox. Which brings us to the planning and time control.</a:t>
-            </a:r>
+              <a:t>the draft </a:t>
+            </a:r>
+            <a:r>
+              <a:rPr lang="en-US" baseline="0" dirty="0" smtClean="0"/>
+              <a:t>backbone for our pipeline, as shown on the right.</a:t>
+            </a:r>
+          </a:p>
+          <a:p>
+            <a:endParaRPr lang="en-US" baseline="0" dirty="0" smtClean="0"/>
+          </a:p>
+          <a:p>
+            <a:r>
+              <a:rPr lang="en-US" baseline="0" dirty="0" smtClean="0"/>
+              <a:t>Firstly we want to illustrate that the control group and test group are processed separately in the first few steps. Moreover, we added the quality control of the input files. The alignment and mapping remains the same. The final part of the pipeline backbone is split up in a list of differentially expressed genes and two optional automated tasks for identifying enriched functions…</a:t>
+            </a:r>
+          </a:p>
+          <a:p>
+            <a:endParaRPr lang="en-US" baseline="0" dirty="0" smtClean="0"/>
+          </a:p>
+          <a:p>
+            <a:r>
+              <a:rPr lang="en-US" baseline="0" dirty="0" smtClean="0"/>
+              <a:t>Now that we have our plan, it’s time to consider ways to keep track of our progress and development </a:t>
+            </a:r>
+            <a:r>
+              <a:rPr lang="en-US" baseline="0" dirty="0" smtClean="0"/>
+              <a:t>environments.</a:t>
+            </a:r>
+            <a:endParaRPr lang="en-US" baseline="0" dirty="0" smtClean="0"/>
           </a:p>
         </p:txBody>
       </p:sp>
@@ -1093,7 +1357,7 @@
     </p:spTree>
     <p:extLst>
       <p:ext uri="{BB962C8B-B14F-4D97-AF65-F5344CB8AC3E}">
-        <p14:creationId xmlns:p14="http://schemas.microsoft.com/office/powerpoint/2010/main" val="78428398"/>
+        <p14:creationId xmlns:p14="http://schemas.microsoft.com/office/powerpoint/2010/main" val="1610183156"/>
       </p:ext>
     </p:extLst>
   </p:cSld>
@@ -1147,47 +1411,7 @@
           <a:bodyPr/>
           <a:lstStyle/>
           <a:p>
-            <a:r>
-              <a:rPr lang="en-US" dirty="0" smtClean="0"/>
-              <a:t>We took a close look at the deadlines and decided that we only have this week to create all the coding. </a:t>
-            </a:r>
-            <a:r>
-              <a:rPr lang="en-US" dirty="0" err="1" smtClean="0"/>
-              <a:t>Basicly</a:t>
-            </a:r>
-            <a:r>
-              <a:rPr lang="en-US" dirty="0" smtClean="0"/>
-              <a:t> next week is </a:t>
-            </a:r>
-            <a:r>
-              <a:rPr lang="en-US" dirty="0" err="1" smtClean="0"/>
-              <a:t>buggfixing</a:t>
-            </a:r>
-            <a:r>
-              <a:rPr lang="en-US" dirty="0" smtClean="0"/>
-              <a:t>,</a:t>
-            </a:r>
-            <a:r>
-              <a:rPr lang="en-US" baseline="0" dirty="0" smtClean="0"/>
-              <a:t> report and manual writing. After this we could still add some features. Since we have the version control, we will make a </a:t>
-            </a:r>
-            <a:r>
-              <a:rPr lang="en-US" baseline="0" dirty="0" err="1" smtClean="0"/>
-              <a:t>tagg</a:t>
-            </a:r>
-            <a:r>
-              <a:rPr lang="en-US" baseline="0" dirty="0" smtClean="0"/>
-              <a:t> once we are confident with our pipeline. Which means, we create a point in the version control to which we can always return if we make errors. </a:t>
-            </a:r>
-          </a:p>
-          <a:p>
             <a:endParaRPr lang="en-US" baseline="0" dirty="0" smtClean="0"/>
-          </a:p>
-          <a:p>
-            <a:r>
-              <a:rPr lang="en-US" baseline="0" dirty="0" smtClean="0"/>
-              <a:t>To give you insight how we control our progress we have to take a look in our project time management system.</a:t>
-            </a:r>
           </a:p>
         </p:txBody>
       </p:sp>
@@ -1217,7 +1441,7 @@
     </p:spTree>
     <p:extLst>
       <p:ext uri="{BB962C8B-B14F-4D97-AF65-F5344CB8AC3E}">
-        <p14:creationId xmlns:p14="http://schemas.microsoft.com/office/powerpoint/2010/main" val="2687406389"/>
+        <p14:creationId xmlns:p14="http://schemas.microsoft.com/office/powerpoint/2010/main" val="78428398"/>
       </p:ext>
     </p:extLst>
   </p:cSld>
@@ -1272,8 +1496,40 @@
           <a:lstStyle/>
           <a:p>
             <a:r>
+              <a:rPr lang="en-US" dirty="0" smtClean="0"/>
+              <a:t>We took a close look at the deadlines and decided that we only have this week to create all the coding. </a:t>
+            </a:r>
+            <a:r>
+              <a:rPr lang="en-US" dirty="0" err="1" smtClean="0"/>
+              <a:t>Bassicly</a:t>
+            </a:r>
+            <a:r>
+              <a:rPr lang="en-US" dirty="0" smtClean="0"/>
+              <a:t> </a:t>
+            </a:r>
+            <a:r>
+              <a:rPr lang="en-US" dirty="0" smtClean="0"/>
+              <a:t>next week is </a:t>
+            </a:r>
+            <a:r>
+              <a:rPr lang="en-US" dirty="0" err="1" smtClean="0"/>
+              <a:t>buggfixing</a:t>
+            </a:r>
+            <a:r>
+              <a:rPr lang="en-US" dirty="0" smtClean="0"/>
+              <a:t>,</a:t>
+            </a:r>
+            <a:r>
               <a:rPr lang="en-US" baseline="0" dirty="0" smtClean="0"/>
-              <a:t>To keep a tight track of our progress and time we created trial accounts at liquidplanner.com. Here everyone can include check lists and estimate how much time they need for their time. This gives grip on managing tasks to reach the deadlines and outline intermediate deploys.</a:t>
+              <a:t> report and manual writing. After this we could still add some features. Since we have the version control, we will make a </a:t>
+            </a:r>
+            <a:r>
+              <a:rPr lang="en-US" baseline="0" dirty="0" err="1" smtClean="0"/>
+              <a:t>tagg</a:t>
+            </a:r>
+            <a:r>
+              <a:rPr lang="en-US" baseline="0" dirty="0" smtClean="0"/>
+              <a:t> once we are confident with our pipeline. Which means, we create a point in the version control to which we can always return if we make errors. </a:t>
             </a:r>
           </a:p>
           <a:p>
@@ -1282,9 +1538,8 @@
           <a:p>
             <a:r>
               <a:rPr lang="en-US" baseline="0" dirty="0" smtClean="0"/>
-              <a:t>So where are we now?</a:t>
-            </a:r>
-            <a:endParaRPr lang="en-US" baseline="0" dirty="0" smtClean="0"/>
+              <a:t>To give you insight how we control our progress we have to take a look in our project time management system.</a:t>
+            </a:r>
           </a:p>
         </p:txBody>
       </p:sp>
@@ -1369,30 +1624,18 @@
           <a:lstStyle/>
           <a:p>
             <a:r>
-              <a:rPr lang="en-US" dirty="0" smtClean="0"/>
-              <a:t>Right now we are running the suggested protocol</a:t>
-            </a:r>
-            <a:r>
               <a:rPr lang="en-US" baseline="0" dirty="0" smtClean="0"/>
-              <a:t> from “Differential gene and transcript expression analysis of RNA-</a:t>
-            </a:r>
-            <a:r>
-              <a:rPr lang="en-US" baseline="0" dirty="0" err="1" smtClean="0"/>
-              <a:t>seq</a:t>
-            </a:r>
+              <a:t>To keep a tight track of our progress and time we created trial accounts at liquidplanner.com. Here everyone can include check lists and estimate how much time they need for their time. This gives grip on managing tasks to reach the deadlines and outline intermediate deploys.</a:t>
+            </a:r>
+          </a:p>
+          <a:p>
+            <a:endParaRPr lang="en-US" baseline="0" dirty="0" smtClean="0"/>
+          </a:p>
+          <a:p>
             <a:r>
               <a:rPr lang="en-US" baseline="0" dirty="0" smtClean="0"/>
-              <a:t> experiments with </a:t>
-            </a:r>
-            <a:r>
-              <a:rPr lang="en-US" baseline="0" dirty="0" err="1" smtClean="0"/>
-              <a:t>TopHat</a:t>
-            </a:r>
-            <a:r>
-              <a:rPr lang="en-US" baseline="0" dirty="0" smtClean="0"/>
-              <a:t> and Cufflinks”.</a:t>
-            </a:r>
-            <a:endParaRPr lang="en-US" dirty="0"/>
+              <a:t>So where are we now?</a:t>
+            </a:r>
           </a:p>
         </p:txBody>
       </p:sp>
@@ -1422,7 +1665,7 @@
     </p:spTree>
     <p:extLst>
       <p:ext uri="{BB962C8B-B14F-4D97-AF65-F5344CB8AC3E}">
-        <p14:creationId xmlns:p14="http://schemas.microsoft.com/office/powerpoint/2010/main" val="2252985758"/>
+        <p14:creationId xmlns:p14="http://schemas.microsoft.com/office/powerpoint/2010/main" val="2687406389"/>
       </p:ext>
     </p:extLst>
   </p:cSld>
@@ -1476,6 +1719,30 @@
           <a:bodyPr/>
           <a:lstStyle/>
           <a:p>
+            <a:r>
+              <a:rPr lang="en-US" dirty="0" smtClean="0"/>
+              <a:t>Right now we are running the suggested protocol</a:t>
+            </a:r>
+            <a:r>
+              <a:rPr lang="en-US" baseline="0" dirty="0" smtClean="0"/>
+              <a:t> from “Differential gene and transcript expression analysis of RNA-</a:t>
+            </a:r>
+            <a:r>
+              <a:rPr lang="en-US" baseline="0" dirty="0" err="1" smtClean="0"/>
+              <a:t>seq</a:t>
+            </a:r>
+            <a:r>
+              <a:rPr lang="en-US" baseline="0" dirty="0" smtClean="0"/>
+              <a:t> experiments with </a:t>
+            </a:r>
+            <a:r>
+              <a:rPr lang="en-US" baseline="0" dirty="0" err="1" smtClean="0"/>
+              <a:t>TopHat</a:t>
+            </a:r>
+            <a:r>
+              <a:rPr lang="en-US" baseline="0" dirty="0" smtClean="0"/>
+              <a:t> and Cufflinks”.</a:t>
+            </a:r>
             <a:endParaRPr lang="en-US" dirty="0"/>
           </a:p>
         </p:txBody>
@@ -1698,7 +1965,7 @@
             <a:fld id="{1D8BD707-D9CF-40AE-B4C6-C98DA3205C09}" type="datetimeFigureOut">
               <a:rPr lang="en-US" smtClean="0"/>
               <a:pPr/>
-              <a:t>3/3/2014</a:t>
+              <a:t>3/4/2014</a:t>
             </a:fld>
             <a:endParaRPr lang="en-US"/>
           </a:p>
@@ -1870,7 +2137,7 @@
             <a:fld id="{1D8BD707-D9CF-40AE-B4C6-C98DA3205C09}" type="datetimeFigureOut">
               <a:rPr lang="en-US" smtClean="0"/>
               <a:pPr/>
-              <a:t>3/3/2014</a:t>
+              <a:t>3/4/2014</a:t>
             </a:fld>
             <a:endParaRPr lang="en-US"/>
           </a:p>
@@ -2052,7 +2319,7 @@
             <a:fld id="{1D8BD707-D9CF-40AE-B4C6-C98DA3205C09}" type="datetimeFigureOut">
               <a:rPr lang="en-US" smtClean="0"/>
               <a:pPr/>
-              <a:t>3/3/2014</a:t>
+              <a:t>3/4/2014</a:t>
             </a:fld>
             <a:endParaRPr lang="en-US"/>
           </a:p>
@@ -2224,7 +2491,7 @@
             <a:fld id="{1D8BD707-D9CF-40AE-B4C6-C98DA3205C09}" type="datetimeFigureOut">
               <a:rPr lang="en-US" smtClean="0"/>
               <a:pPr/>
-              <a:t>3/3/2014</a:t>
+              <a:t>3/4/2014</a:t>
             </a:fld>
             <a:endParaRPr lang="en-US"/>
           </a:p>
@@ -2472,7 +2739,7 @@
             <a:fld id="{1D8BD707-D9CF-40AE-B4C6-C98DA3205C09}" type="datetimeFigureOut">
               <a:rPr lang="en-US" smtClean="0"/>
               <a:pPr/>
-              <a:t>3/3/2014</a:t>
+              <a:t>3/4/2014</a:t>
             </a:fld>
             <a:endParaRPr lang="en-US"/>
           </a:p>
@@ -2762,7 +3029,7 @@
             <a:fld id="{1D8BD707-D9CF-40AE-B4C6-C98DA3205C09}" type="datetimeFigureOut">
               <a:rPr lang="en-US" smtClean="0"/>
               <a:pPr/>
-              <a:t>3/3/2014</a:t>
+              <a:t>3/4/2014</a:t>
             </a:fld>
             <a:endParaRPr lang="en-US"/>
           </a:p>
@@ -3186,7 +3453,7 @@
             <a:fld id="{1D8BD707-D9CF-40AE-B4C6-C98DA3205C09}" type="datetimeFigureOut">
               <a:rPr lang="en-US" smtClean="0"/>
               <a:pPr/>
-              <a:t>3/3/2014</a:t>
+              <a:t>3/4/2014</a:t>
             </a:fld>
             <a:endParaRPr lang="en-US"/>
           </a:p>
@@ -3306,7 +3573,7 @@
             <a:fld id="{1D8BD707-D9CF-40AE-B4C6-C98DA3205C09}" type="datetimeFigureOut">
               <a:rPr lang="en-US" smtClean="0"/>
               <a:pPr/>
-              <a:t>3/3/2014</a:t>
+              <a:t>3/4/2014</a:t>
             </a:fld>
             <a:endParaRPr lang="en-US"/>
           </a:p>
@@ -3403,7 +3670,7 @@
             <a:fld id="{1D8BD707-D9CF-40AE-B4C6-C98DA3205C09}" type="datetimeFigureOut">
               <a:rPr lang="en-US" smtClean="0"/>
               <a:pPr/>
-              <a:t>3/3/2014</a:t>
+              <a:t>3/4/2014</a:t>
             </a:fld>
             <a:endParaRPr lang="en-US"/>
           </a:p>
@@ -3682,7 +3949,7 @@
             <a:fld id="{1D8BD707-D9CF-40AE-B4C6-C98DA3205C09}" type="datetimeFigureOut">
               <a:rPr lang="en-US" smtClean="0"/>
               <a:pPr/>
-              <a:t>3/3/2014</a:t>
+              <a:t>3/4/2014</a:t>
             </a:fld>
             <a:endParaRPr lang="en-US"/>
           </a:p>
@@ -3937,7 +4204,7 @@
             <a:fld id="{1D8BD707-D9CF-40AE-B4C6-C98DA3205C09}" type="datetimeFigureOut">
               <a:rPr lang="en-US" smtClean="0"/>
               <a:pPr/>
-              <a:t>3/3/2014</a:t>
+              <a:t>3/4/2014</a:t>
             </a:fld>
             <a:endParaRPr lang="en-US"/>
           </a:p>
@@ -4152,7 +4419,7 @@
             <a:fld id="{1D8BD707-D9CF-40AE-B4C6-C98DA3205C09}" type="datetimeFigureOut">
               <a:rPr lang="en-US" smtClean="0"/>
               <a:pPr/>
-              <a:t>3/3/2014</a:t>
+              <a:t>3/4/2014</a:t>
             </a:fld>
             <a:endParaRPr lang="en-US"/>
           </a:p>
@@ -4867,6 +5134,278 @@
                 <a:latin typeface="Aharoni" panose="02010803020104030203" pitchFamily="2" charset="-79"/>
                 <a:cs typeface="Aharoni" panose="02010803020104030203" pitchFamily="2" charset="-79"/>
               </a:rPr>
+              <a:t>Project-progress</a:t>
+            </a:r>
+            <a:endParaRPr lang="en-US" b="1" dirty="0">
+              <a:effectLst>
+                <a:outerShdw blurRad="38100" dist="38100" dir="2700000" algn="tl">
+                  <a:srgbClr val="000000">
+                    <a:alpha val="43137"/>
+                  </a:srgbClr>
+                </a:outerShdw>
+              </a:effectLst>
+              <a:latin typeface="Aharoni" panose="02010803020104030203" pitchFamily="2" charset="-79"/>
+              <a:cs typeface="Aharoni" panose="02010803020104030203" pitchFamily="2" charset="-79"/>
+            </a:endParaRPr>
+          </a:p>
+        </p:txBody>
+      </p:sp>
+      <p:sp>
+        <p:nvSpPr>
+          <p:cNvPr id="2" name="Content Placeholder 1"/>
+          <p:cNvSpPr>
+            <a:spLocks noGrp="1"/>
+          </p:cNvSpPr>
+          <p:nvPr>
+            <p:ph idx="1"/>
+          </p:nvPr>
+        </p:nvSpPr>
+        <p:spPr>
+          <a:xfrm>
+            <a:off x="457200" y="1447800"/>
+            <a:ext cx="8229600" cy="5181599"/>
+          </a:xfrm>
+        </p:spPr>
+        <p:txBody>
+          <a:bodyPr>
+            <a:normAutofit/>
+          </a:bodyPr>
+          <a:lstStyle/>
+          <a:p>
+            <a:r>
+              <a:rPr lang="en-US" sz="3600" b="1" dirty="0"/>
+              <a:t>Run suggested protocol on server 15</a:t>
+            </a:r>
+          </a:p>
+          <a:p>
+            <a:pPr lvl="1"/>
+            <a:r>
+              <a:rPr lang="en-US" sz="3200" dirty="0"/>
+              <a:t>Become familiar with the </a:t>
+            </a:r>
+            <a:r>
+              <a:rPr lang="en-US" sz="3200" dirty="0" smtClean="0"/>
+              <a:t>different components of the pipeline and the pipeline as a whole</a:t>
+            </a:r>
+            <a:endParaRPr lang="en-US" sz="3200" dirty="0"/>
+          </a:p>
+          <a:p>
+            <a:pPr lvl="1"/>
+            <a:r>
+              <a:rPr lang="en-US" sz="3200" dirty="0"/>
+              <a:t>Evaluate it for backbone usage</a:t>
+            </a:r>
+          </a:p>
+          <a:p>
+            <a:pPr lvl="1"/>
+            <a:r>
+              <a:rPr lang="en-US" sz="3200" dirty="0"/>
+              <a:t>Creating a set of training files we can use to program each individual step</a:t>
+            </a:r>
+          </a:p>
+          <a:p>
+            <a:pPr lvl="1"/>
+            <a:r>
+              <a:rPr lang="en-US" sz="3200" dirty="0" smtClean="0"/>
+              <a:t>Compare the </a:t>
+            </a:r>
+            <a:r>
+              <a:rPr lang="en-US" sz="3200" dirty="0"/>
+              <a:t>scientific results from the paper</a:t>
+            </a:r>
+          </a:p>
+        </p:txBody>
+      </p:sp>
+      <p:sp>
+        <p:nvSpPr>
+          <p:cNvPr id="5" name="Title 1"/>
+          <p:cNvSpPr txBox="1">
+            <a:spLocks/>
+          </p:cNvSpPr>
+          <p:nvPr/>
+        </p:nvSpPr>
+        <p:spPr>
+          <a:xfrm>
+            <a:off x="190500" y="908050"/>
+            <a:ext cx="1828800" cy="304800"/>
+          </a:xfrm>
+          <a:prstGeom prst="rect">
+            <a:avLst/>
+          </a:prstGeom>
+        </p:spPr>
+        <p:txBody>
+          <a:bodyPr vert="horz" lIns="91440" tIns="45720" rIns="91440" bIns="45720" rtlCol="0" anchor="b">
+            <a:normAutofit fontScale="55000" lnSpcReduction="20000"/>
+          </a:bodyPr>
+          <a:lstStyle>
+            <a:lvl1pPr algn="r" defTabSz="914400" rtl="0" eaLnBrk="1" latinLnBrk="0" hangingPunct="1">
+              <a:spcBef>
+                <a:spcPct val="0"/>
+              </a:spcBef>
+              <a:buNone/>
+              <a:defRPr sz="2800" kern="1200">
+                <a:gradFill>
+                  <a:gsLst>
+                    <a:gs pos="0">
+                      <a:schemeClr val="tx1">
+                        <a:lumMod val="50000"/>
+                      </a:schemeClr>
+                    </a:gs>
+                    <a:gs pos="61000">
+                      <a:schemeClr val="tx1"/>
+                    </a:gs>
+                  </a:gsLst>
+                  <a:lin ang="5400000" scaled="0"/>
+                </a:gradFill>
+                <a:effectLst/>
+                <a:latin typeface="+mj-lt"/>
+                <a:ea typeface="+mj-ea"/>
+                <a:cs typeface="+mj-cs"/>
+              </a:defRPr>
+            </a:lvl1pPr>
+          </a:lstStyle>
+          <a:p>
+            <a:pPr algn="l"/>
+            <a:r>
+              <a:rPr lang="en-US" dirty="0" smtClean="0">
+                <a:effectLst>
+                  <a:outerShdw blurRad="38100" dist="38100" dir="2700000" algn="tl">
+                    <a:srgbClr val="000000">
+                      <a:alpha val="43137"/>
+                    </a:srgbClr>
+                  </a:outerShdw>
+                </a:effectLst>
+                <a:latin typeface="Aharoni" panose="02010803020104030203" pitchFamily="2" charset="-79"/>
+                <a:cs typeface="Aharoni" panose="02010803020104030203" pitchFamily="2" charset="-79"/>
+              </a:rPr>
+              <a:t>Mango</a:t>
+            </a:r>
+            <a:endParaRPr lang="en-US" dirty="0">
+              <a:effectLst>
+                <a:outerShdw blurRad="38100" dist="38100" dir="2700000" algn="tl">
+                  <a:srgbClr val="000000">
+                    <a:alpha val="43137"/>
+                  </a:srgbClr>
+                </a:outerShdw>
+              </a:effectLst>
+              <a:latin typeface="Aharoni" panose="02010803020104030203" pitchFamily="2" charset="-79"/>
+              <a:cs typeface="Aharoni" panose="02010803020104030203" pitchFamily="2" charset="-79"/>
+            </a:endParaRPr>
+          </a:p>
+        </p:txBody>
+      </p:sp>
+      <p:pic>
+        <p:nvPicPr>
+          <p:cNvPr id="6" name="Picture 3" descr="C:\Users\destreek\Downloads\1-140219130T0.gif"/>
+          <p:cNvPicPr>
+            <a:picLocks noChangeAspect="1" noChangeArrowheads="1" noCrop="1"/>
+          </p:cNvPicPr>
+          <p:nvPr/>
+        </p:nvPicPr>
+        <p:blipFill>
+          <a:blip r:embed="rId3" cstate="print">
+            <a:extLst>
+              <a:ext uri="{28A0092B-C50C-407E-A947-70E740481C1C}">
+                <a14:useLocalDpi xmlns:a14="http://schemas.microsoft.com/office/drawing/2010/main" val="0"/>
+              </a:ext>
+            </a:extLst>
+          </a:blip>
+          <a:srcRect/>
+          <a:stretch>
+            <a:fillRect/>
+          </a:stretch>
+        </p:blipFill>
+        <p:spPr bwMode="auto">
+          <a:xfrm>
+            <a:off x="304800" y="101600"/>
+            <a:ext cx="604837" cy="806450"/>
+          </a:xfrm>
+          <a:prstGeom prst="rect">
+            <a:avLst/>
+          </a:prstGeom>
+          <a:noFill/>
+          <a:extLst>
+            <a:ext uri="{909E8E84-426E-40DD-AFC4-6F175D3DCCD1}">
+              <a14:hiddenFill xmlns:a14="http://schemas.microsoft.com/office/drawing/2010/main">
+                <a:solidFill>
+                  <a:srgbClr val="FFFFFF"/>
+                </a:solidFill>
+              </a14:hiddenFill>
+            </a:ext>
+          </a:extLst>
+        </p:spPr>
+      </p:pic>
+    </p:spTree>
+    <p:extLst>
+      <p:ext uri="{BB962C8B-B14F-4D97-AF65-F5344CB8AC3E}">
+        <p14:creationId xmlns:p14="http://schemas.microsoft.com/office/powerpoint/2010/main" val="897774434"/>
+      </p:ext>
+    </p:extLst>
+  </p:cSld>
+  <p:clrMapOvr>
+    <a:masterClrMapping/>
+  </p:clrMapOvr>
+  <p:timing>
+    <p:tnLst>
+      <p:par>
+        <p:cTn id="1" dur="indefinite" restart="never" nodeType="tmRoot"/>
+      </p:par>
+    </p:tnLst>
+  </p:timing>
+</p:sld>
+</file>
+
+<file path=ppt/slides/slide11.xml><?xml version="1.0" encoding="utf-8"?>
+<p:sld xmlns:a="http://schemas.openxmlformats.org/drawingml/2006/main" xmlns:r="http://schemas.openxmlformats.org/officeDocument/2006/relationships" xmlns:p="http://schemas.openxmlformats.org/presentationml/2006/main">
+  <p:cSld>
+    <p:spTree>
+      <p:nvGrpSpPr>
+        <p:cNvPr id="1" name=""/>
+        <p:cNvGrpSpPr/>
+        <p:nvPr/>
+      </p:nvGrpSpPr>
+      <p:grpSpPr>
+        <a:xfrm>
+          <a:off x="0" y="0"/>
+          <a:ext cx="0" cy="0"/>
+          <a:chOff x="0" y="0"/>
+          <a:chExt cx="0" cy="0"/>
+        </a:xfrm>
+      </p:grpSpPr>
+      <p:sp>
+        <p:nvSpPr>
+          <p:cNvPr id="3" name="Title 2"/>
+          <p:cNvSpPr>
+            <a:spLocks noGrp="1"/>
+          </p:cNvSpPr>
+          <p:nvPr>
+            <p:ph type="title"/>
+          </p:nvPr>
+        </p:nvSpPr>
+        <p:spPr>
+          <a:xfrm>
+            <a:off x="381000" y="304800"/>
+            <a:ext cx="8305800" cy="533400"/>
+          </a:xfrm>
+        </p:spPr>
+        <p:txBody>
+          <a:bodyPr>
+            <a:normAutofit fontScale="90000"/>
+          </a:bodyPr>
+          <a:lstStyle/>
+          <a:p>
+            <a:r>
+              <a:rPr lang="en-US" b="1" dirty="0" smtClean="0">
+                <a:effectLst>
+                  <a:outerShdw blurRad="38100" dist="38100" dir="2700000" algn="tl">
+                    <a:srgbClr val="000000">
+                      <a:alpha val="43137"/>
+                    </a:srgbClr>
+                  </a:outerShdw>
+                </a:effectLst>
+                <a:latin typeface="Aharoni" panose="02010803020104030203" pitchFamily="2" charset="-79"/>
+                <a:cs typeface="Aharoni" panose="02010803020104030203" pitchFamily="2" charset="-79"/>
+              </a:rPr>
               <a:t>End</a:t>
             </a:r>
             <a:endParaRPr lang="en-US" b="1" dirty="0">
@@ -5444,46 +5983,31 @@
           <a:p>
             <a:r>
               <a:rPr lang="en-US" sz="2800" b="1" dirty="0" smtClean="0"/>
-              <a:t>Project: Differential gene expression in yeast</a:t>
-            </a:r>
-          </a:p>
-          <a:p>
-            <a:r>
-              <a:rPr lang="en-US" sz="2800" b="1" dirty="0"/>
-              <a:t>Discussed:</a:t>
-            </a:r>
-            <a:endParaRPr lang="en-US" sz="3600" b="1" dirty="0"/>
+              <a:t>Project: Differential gene expression in </a:t>
+            </a:r>
+            <a:r>
+              <a:rPr lang="en-US" sz="2800" b="1" dirty="0" smtClean="0"/>
+              <a:t>yeast</a:t>
+            </a:r>
           </a:p>
           <a:p>
             <a:pPr lvl="1"/>
             <a:r>
-              <a:rPr lang="en-US" sz="2800" dirty="0"/>
-              <a:t>Biological framework of the pipeline</a:t>
+              <a:rPr lang="en-US" dirty="0" smtClean="0"/>
+              <a:t>Training dataset: published paper</a:t>
             </a:r>
           </a:p>
           <a:p>
             <a:pPr lvl="1"/>
             <a:r>
-              <a:rPr lang="en-US" sz="2800" dirty="0"/>
-              <a:t>Assign priorities to the parts of the pipeline</a:t>
-            </a:r>
-          </a:p>
-          <a:p>
-            <a:pPr lvl="1"/>
-            <a:r>
-              <a:rPr lang="en-US" sz="2800" dirty="0"/>
-              <a:t>Draft planning</a:t>
-            </a:r>
-          </a:p>
-          <a:p>
-            <a:pPr lvl="1"/>
-            <a:r>
-              <a:rPr lang="en-US" sz="2800" dirty="0"/>
-              <a:t>Source control and project management</a:t>
-            </a:r>
-          </a:p>
-          <a:p>
-            <a:endParaRPr lang="en-US" dirty="0"/>
+              <a:rPr lang="en-US" dirty="0" smtClean="0"/>
+              <a:t>Test dataset</a:t>
+            </a:r>
+            <a:r>
+              <a:rPr lang="en-US" smtClean="0"/>
+              <a:t>: Yeast</a:t>
+            </a:r>
+            <a:endParaRPr lang="en-US" dirty="0" smtClean="0"/>
           </a:p>
         </p:txBody>
       </p:sp>
@@ -5650,6 +6174,375 @@
         </p:nvSpPr>
         <p:spPr>
           <a:xfrm>
+            <a:off x="333375" y="368300"/>
+            <a:ext cx="8305800" cy="533400"/>
+          </a:xfrm>
+        </p:spPr>
+        <p:txBody>
+          <a:bodyPr>
+            <a:normAutofit fontScale="90000"/>
+          </a:bodyPr>
+          <a:lstStyle/>
+          <a:p>
+            <a:r>
+              <a:rPr lang="en-US" b="1" dirty="0" smtClean="0">
+                <a:effectLst>
+                  <a:outerShdw blurRad="38100" dist="38100" dir="2700000" algn="tl">
+                    <a:srgbClr val="000000">
+                      <a:alpha val="43137"/>
+                    </a:srgbClr>
+                  </a:outerShdw>
+                </a:effectLst>
+                <a:latin typeface="Aharoni" panose="02010803020104030203" pitchFamily="2" charset="-79"/>
+                <a:cs typeface="Aharoni" panose="02010803020104030203" pitchFamily="2" charset="-79"/>
+              </a:rPr>
+              <a:t>Project kickoff</a:t>
+            </a:r>
+            <a:endParaRPr lang="en-US" b="1" dirty="0">
+              <a:effectLst>
+                <a:outerShdw blurRad="38100" dist="38100" dir="2700000" algn="tl">
+                  <a:srgbClr val="000000">
+                    <a:alpha val="43137"/>
+                  </a:srgbClr>
+                </a:outerShdw>
+              </a:effectLst>
+              <a:latin typeface="Aharoni" panose="02010803020104030203" pitchFamily="2" charset="-79"/>
+              <a:cs typeface="Aharoni" panose="02010803020104030203" pitchFamily="2" charset="-79"/>
+            </a:endParaRPr>
+          </a:p>
+        </p:txBody>
+      </p:sp>
+      <p:sp>
+        <p:nvSpPr>
+          <p:cNvPr id="2" name="Content Placeholder 1"/>
+          <p:cNvSpPr>
+            <a:spLocks noGrp="1"/>
+          </p:cNvSpPr>
+          <p:nvPr>
+            <p:ph idx="1"/>
+          </p:nvPr>
+        </p:nvSpPr>
+        <p:spPr>
+          <a:xfrm>
+            <a:off x="457200" y="1295400"/>
+            <a:ext cx="8229600" cy="5181599"/>
+          </a:xfrm>
+        </p:spPr>
+        <p:txBody>
+          <a:bodyPr/>
+          <a:lstStyle/>
+          <a:p>
+            <a:r>
+              <a:rPr lang="en-US" sz="2800" b="1" dirty="0" smtClean="0"/>
+              <a:t>Discussed</a:t>
+            </a:r>
+            <a:r>
+              <a:rPr lang="en-US" sz="2800" b="1" dirty="0"/>
+              <a:t>:</a:t>
+            </a:r>
+            <a:endParaRPr lang="en-US" sz="3600" b="1" dirty="0"/>
+          </a:p>
+          <a:p>
+            <a:pPr lvl="1"/>
+            <a:r>
+              <a:rPr lang="en-US" sz="2800" dirty="0"/>
+              <a:t>Biological framework of the pipeline</a:t>
+            </a:r>
+          </a:p>
+          <a:p>
+            <a:pPr lvl="1"/>
+            <a:r>
+              <a:rPr lang="en-US" sz="2800" dirty="0"/>
+              <a:t>Assign priorities to the parts of the </a:t>
+            </a:r>
+            <a:r>
+              <a:rPr lang="en-US" sz="2800" dirty="0" smtClean="0"/>
+              <a:t>pipeline</a:t>
+            </a:r>
+          </a:p>
+          <a:p>
+            <a:pPr lvl="1"/>
+            <a:r>
+              <a:rPr lang="en-US" sz="2800" dirty="0" smtClean="0"/>
+              <a:t>Draft planning</a:t>
+            </a:r>
+          </a:p>
+          <a:p>
+            <a:pPr lvl="1"/>
+            <a:r>
+              <a:rPr lang="en-US" sz="2800" dirty="0" smtClean="0"/>
+              <a:t>Source control and project management</a:t>
+            </a:r>
+          </a:p>
+          <a:p>
+            <a:endParaRPr lang="en-US" dirty="0"/>
+          </a:p>
+        </p:txBody>
+      </p:sp>
+      <p:sp>
+        <p:nvSpPr>
+          <p:cNvPr id="4" name="Title 1"/>
+          <p:cNvSpPr txBox="1">
+            <a:spLocks/>
+          </p:cNvSpPr>
+          <p:nvPr/>
+        </p:nvSpPr>
+        <p:spPr>
+          <a:xfrm>
+            <a:off x="190500" y="908050"/>
+            <a:ext cx="1828800" cy="304800"/>
+          </a:xfrm>
+          <a:prstGeom prst="rect">
+            <a:avLst/>
+          </a:prstGeom>
+        </p:spPr>
+        <p:txBody>
+          <a:bodyPr vert="horz" lIns="91440" tIns="45720" rIns="91440" bIns="45720" rtlCol="0" anchor="b">
+            <a:normAutofit fontScale="55000" lnSpcReduction="20000"/>
+          </a:bodyPr>
+          <a:lstStyle>
+            <a:lvl1pPr algn="r" defTabSz="914400" rtl="0" eaLnBrk="1" latinLnBrk="0" hangingPunct="1">
+              <a:spcBef>
+                <a:spcPct val="0"/>
+              </a:spcBef>
+              <a:buNone/>
+              <a:defRPr sz="2800" kern="1200">
+                <a:gradFill>
+                  <a:gsLst>
+                    <a:gs pos="0">
+                      <a:schemeClr val="tx1">
+                        <a:lumMod val="50000"/>
+                      </a:schemeClr>
+                    </a:gs>
+                    <a:gs pos="61000">
+                      <a:schemeClr val="tx1"/>
+                    </a:gs>
+                  </a:gsLst>
+                  <a:lin ang="5400000" scaled="0"/>
+                </a:gradFill>
+                <a:effectLst/>
+                <a:latin typeface="+mj-lt"/>
+                <a:ea typeface="+mj-ea"/>
+                <a:cs typeface="+mj-cs"/>
+              </a:defRPr>
+            </a:lvl1pPr>
+          </a:lstStyle>
+          <a:p>
+            <a:pPr algn="l"/>
+            <a:r>
+              <a:rPr lang="en-US" dirty="0" smtClean="0">
+                <a:effectLst>
+                  <a:outerShdw blurRad="38100" dist="38100" dir="2700000" algn="tl">
+                    <a:srgbClr val="000000">
+                      <a:alpha val="43137"/>
+                    </a:srgbClr>
+                  </a:outerShdw>
+                </a:effectLst>
+                <a:latin typeface="Aharoni" panose="02010803020104030203" pitchFamily="2" charset="-79"/>
+                <a:cs typeface="Aharoni" panose="02010803020104030203" pitchFamily="2" charset="-79"/>
+              </a:rPr>
+              <a:t>Mango</a:t>
+            </a:r>
+            <a:endParaRPr lang="en-US" dirty="0">
+              <a:effectLst>
+                <a:outerShdw blurRad="38100" dist="38100" dir="2700000" algn="tl">
+                  <a:srgbClr val="000000">
+                    <a:alpha val="43137"/>
+                  </a:srgbClr>
+                </a:outerShdw>
+              </a:effectLst>
+              <a:latin typeface="Aharoni" panose="02010803020104030203" pitchFamily="2" charset="-79"/>
+              <a:cs typeface="Aharoni" panose="02010803020104030203" pitchFamily="2" charset="-79"/>
+            </a:endParaRPr>
+          </a:p>
+        </p:txBody>
+      </p:sp>
+      <p:pic>
+        <p:nvPicPr>
+          <p:cNvPr id="3075" name="Picture 3" descr="C:\Users\destreek\Downloads\1-140219130T0.gif"/>
+          <p:cNvPicPr>
+            <a:picLocks noChangeAspect="1" noChangeArrowheads="1" noCrop="1"/>
+          </p:cNvPicPr>
+          <p:nvPr/>
+        </p:nvPicPr>
+        <p:blipFill>
+          <a:blip r:embed="rId3" cstate="print">
+            <a:extLst>
+              <a:ext uri="{28A0092B-C50C-407E-A947-70E740481C1C}">
+                <a14:useLocalDpi xmlns:a14="http://schemas.microsoft.com/office/drawing/2010/main" val="0"/>
+              </a:ext>
+            </a:extLst>
+          </a:blip>
+          <a:srcRect/>
+          <a:stretch>
+            <a:fillRect/>
+          </a:stretch>
+        </p:blipFill>
+        <p:spPr bwMode="auto">
+          <a:xfrm>
+            <a:off x="304800" y="101600"/>
+            <a:ext cx="604837" cy="806450"/>
+          </a:xfrm>
+          <a:prstGeom prst="rect">
+            <a:avLst/>
+          </a:prstGeom>
+          <a:solidFill>
+            <a:schemeClr val="bg2">
+              <a:lumMod val="75000"/>
+            </a:schemeClr>
+          </a:solidFill>
+        </p:spPr>
+      </p:pic>
+    </p:spTree>
+    <p:extLst>
+      <p:ext uri="{BB962C8B-B14F-4D97-AF65-F5344CB8AC3E}">
+        <p14:creationId xmlns:p14="http://schemas.microsoft.com/office/powerpoint/2010/main" val="3736764803"/>
+      </p:ext>
+    </p:extLst>
+  </p:cSld>
+  <p:clrMapOvr>
+    <a:masterClrMapping/>
+  </p:clrMapOvr>
+  <p:timing>
+    <p:tnLst>
+      <p:par>
+        <p:cTn id="1" dur="indefinite" restart="never" nodeType="tmRoot">
+          <p:childTnLst>
+            <p:seq concurrent="1" nextAc="seek">
+              <p:cTn id="2" dur="indefinite" nodeType="mainSeq">
+                <p:childTnLst>
+                  <p:par>
+                    <p:cTn id="3" fill="hold">
+                      <p:stCondLst>
+                        <p:cond delay="indefinite"/>
+                      </p:stCondLst>
+                      <p:childTnLst>
+                        <p:par>
+                          <p:cTn id="4" fill="hold">
+                            <p:stCondLst>
+                              <p:cond delay="0"/>
+                            </p:stCondLst>
+                            <p:childTnLst>
+                              <p:par>
+                                <p:cTn id="5" presetID="15" presetClass="emph" presetSubtype="0" nodeType="clickEffect">
+                                  <p:stCondLst>
+                                    <p:cond delay="0"/>
+                                  </p:stCondLst>
+                                  <p:iterate type="lt">
+                                    <p:tmAbs val="25"/>
+                                  </p:iterate>
+                                  <p:childTnLst>
+                                    <p:set>
+                                      <p:cBhvr override="childStyle">
+                                        <p:cTn id="6" dur="10"/>
+                                        <p:tgtEl>
+                                          <p:spTgt spid="2">
+                                            <p:txEl>
+                                              <p:pRg st="1" end="1"/>
+                                            </p:txEl>
+                                          </p:spTgt>
+                                        </p:tgtEl>
+                                        <p:attrNameLst>
+                                          <p:attrName>style.fontWeight</p:attrName>
+                                        </p:attrNameLst>
+                                      </p:cBhvr>
+                                      <p:to>
+                                        <p:strVal val="bold"/>
+                                      </p:to>
+                                    </p:set>
+                                  </p:childTnLst>
+                                </p:cTn>
+                              </p:par>
+                              <p:par>
+                                <p:cTn id="7" presetID="15" presetClass="emph" presetSubtype="0" nodeType="withEffect">
+                                  <p:stCondLst>
+                                    <p:cond delay="0"/>
+                                  </p:stCondLst>
+                                  <p:iterate type="lt">
+                                    <p:tmAbs val="25"/>
+                                  </p:iterate>
+                                  <p:childTnLst>
+                                    <p:set>
+                                      <p:cBhvr override="childStyle">
+                                        <p:cTn id="8" dur="10"/>
+                                        <p:tgtEl>
+                                          <p:spTgt spid="2">
+                                            <p:txEl>
+                                              <p:pRg st="2" end="2"/>
+                                            </p:txEl>
+                                          </p:spTgt>
+                                        </p:tgtEl>
+                                        <p:attrNameLst>
+                                          <p:attrName>style.fontWeight</p:attrName>
+                                        </p:attrNameLst>
+                                      </p:cBhvr>
+                                      <p:to>
+                                        <p:strVal val="bold"/>
+                                      </p:to>
+                                    </p:set>
+                                  </p:childTnLst>
+                                </p:cTn>
+                              </p:par>
+                            </p:childTnLst>
+                          </p:cTn>
+                        </p:par>
+                      </p:childTnLst>
+                    </p:cTn>
+                  </p:par>
+                </p:childTnLst>
+              </p:cTn>
+              <p:prevCondLst>
+                <p:cond evt="onPrev" delay="0">
+                  <p:tgtEl>
+                    <p:sldTgt/>
+                  </p:tgtEl>
+                </p:cond>
+              </p:prevCondLst>
+              <p:nextCondLst>
+                <p:cond evt="onNext" delay="0">
+                  <p:tgtEl>
+                    <p:sldTgt/>
+                  </p:tgtEl>
+                </p:cond>
+              </p:nextCondLst>
+            </p:seq>
+          </p:childTnLst>
+        </p:cTn>
+      </p:par>
+    </p:tnLst>
+  </p:timing>
+</p:sld>
+</file>
+
+<file path=ppt/slides/slide5.xml><?xml version="1.0" encoding="utf-8"?>
+<p:sld xmlns:a="http://schemas.openxmlformats.org/drawingml/2006/main" xmlns:r="http://schemas.openxmlformats.org/officeDocument/2006/relationships" xmlns:p="http://schemas.openxmlformats.org/presentationml/2006/main">
+  <p:cSld>
+    <p:spTree>
+      <p:nvGrpSpPr>
+        <p:cNvPr id="1" name=""/>
+        <p:cNvGrpSpPr/>
+        <p:nvPr/>
+      </p:nvGrpSpPr>
+      <p:grpSpPr>
+        <a:xfrm>
+          <a:off x="0" y="0"/>
+          <a:ext cx="0" cy="0"/>
+          <a:chOff x="0" y="0"/>
+          <a:chExt cx="0" cy="0"/>
+        </a:xfrm>
+      </p:grpSpPr>
+      <p:sp>
+        <p:nvSpPr>
+          <p:cNvPr id="3" name="Title 2"/>
+          <p:cNvSpPr>
+            <a:spLocks noGrp="1"/>
+          </p:cNvSpPr>
+          <p:nvPr>
+            <p:ph type="title"/>
+          </p:nvPr>
+        </p:nvSpPr>
+        <p:spPr>
+          <a:xfrm>
             <a:off x="381000" y="304800"/>
             <a:ext cx="8305800" cy="533400"/>
           </a:xfrm>
@@ -5721,79 +6614,153 @@
           <a:p>
             <a:pPr lvl="1"/>
             <a:r>
-              <a:rPr lang="en-GB" sz="2000" dirty="0" smtClean="0"/>
+              <a:rPr lang="en-GB" sz="2000" dirty="0" smtClean="0">
+                <a:solidFill>
+                  <a:srgbClr val="0000CC"/>
+                </a:solidFill>
+              </a:rPr>
               <a:t>Data </a:t>
             </a:r>
             <a:r>
-              <a:rPr lang="en-GB" sz="2000" dirty="0"/>
+              <a:rPr lang="en-GB" sz="2000" dirty="0">
+                <a:solidFill>
+                  <a:srgbClr val="0000CC"/>
+                </a:solidFill>
+              </a:rPr>
               <a:t>format</a:t>
             </a:r>
-            <a:endParaRPr lang="en-US" sz="2000" dirty="0"/>
+            <a:endParaRPr lang="en-US" sz="2000" dirty="0">
+              <a:solidFill>
+                <a:srgbClr val="0000CC"/>
+              </a:solidFill>
+            </a:endParaRPr>
           </a:p>
           <a:p>
             <a:pPr lvl="1"/>
             <a:r>
-              <a:rPr lang="en-GB" sz="2000" dirty="0"/>
+              <a:rPr lang="en-GB" sz="2000" dirty="0">
+                <a:solidFill>
+                  <a:srgbClr val="0000CC"/>
+                </a:solidFill>
+              </a:rPr>
               <a:t>Quality </a:t>
             </a:r>
             <a:r>
-              <a:rPr lang="en-GB" sz="2000" dirty="0" smtClean="0"/>
+              <a:rPr lang="en-GB" sz="2000" dirty="0" smtClean="0">
+                <a:solidFill>
+                  <a:srgbClr val="0000CC"/>
+                </a:solidFill>
+              </a:rPr>
               <a:t>control</a:t>
             </a:r>
-            <a:endParaRPr lang="en-US" sz="2000" dirty="0"/>
+            <a:endParaRPr lang="en-US" sz="2000" dirty="0">
+              <a:solidFill>
+                <a:srgbClr val="0000CC"/>
+              </a:solidFill>
+            </a:endParaRPr>
           </a:p>
           <a:p>
             <a:pPr lvl="1"/>
             <a:r>
-              <a:rPr lang="en-GB" sz="2000" dirty="0"/>
+              <a:rPr lang="en-GB" sz="2000" dirty="0">
+                <a:solidFill>
+                  <a:srgbClr val="0000CC"/>
+                </a:solidFill>
+              </a:rPr>
               <a:t>Quality </a:t>
             </a:r>
             <a:r>
-              <a:rPr lang="en-GB" sz="2000" dirty="0" smtClean="0"/>
+              <a:rPr lang="en-GB" sz="2000" dirty="0" smtClean="0">
+                <a:solidFill>
+                  <a:srgbClr val="0000CC"/>
+                </a:solidFill>
+              </a:rPr>
               <a:t>improvement</a:t>
             </a:r>
-            <a:endParaRPr lang="en-US" sz="2000" dirty="0"/>
+            <a:endParaRPr lang="en-US" sz="2000" dirty="0">
+              <a:solidFill>
+                <a:srgbClr val="0000CC"/>
+              </a:solidFill>
+            </a:endParaRPr>
           </a:p>
           <a:p>
             <a:pPr lvl="1"/>
             <a:r>
-              <a:rPr lang="en-GB" sz="2000" dirty="0" smtClean="0"/>
+              <a:rPr lang="en-GB" sz="2000" dirty="0" smtClean="0">
+                <a:solidFill>
+                  <a:srgbClr val="FF0000"/>
+                </a:solidFill>
+              </a:rPr>
               <a:t>Mapping</a:t>
             </a:r>
           </a:p>
           <a:p>
             <a:pPr lvl="1"/>
             <a:r>
-              <a:rPr lang="en-GB" sz="2000" dirty="0" smtClean="0"/>
+              <a:rPr lang="en-GB" sz="2000" dirty="0" smtClean="0">
+                <a:solidFill>
+                  <a:srgbClr val="008000"/>
+                </a:solidFill>
+              </a:rPr>
               <a:t>Count reads</a:t>
             </a:r>
           </a:p>
           <a:p>
             <a:pPr lvl="1"/>
             <a:r>
-              <a:rPr lang="en-GB" sz="2000" dirty="0" smtClean="0"/>
+              <a:rPr lang="en-GB" sz="2000" dirty="0" smtClean="0">
+                <a:solidFill>
+                  <a:srgbClr val="008000"/>
+                </a:solidFill>
+              </a:rPr>
               <a:t>Data normalization</a:t>
             </a:r>
           </a:p>
           <a:p>
             <a:pPr lvl="1"/>
             <a:r>
-              <a:rPr lang="en-GB" sz="2000" dirty="0" smtClean="0"/>
+              <a:rPr lang="en-GB" sz="2000" dirty="0" smtClean="0">
+                <a:solidFill>
+                  <a:schemeClr val="accent6">
+                    <a:lumMod val="75000"/>
+                  </a:schemeClr>
+                </a:solidFill>
+              </a:rPr>
               <a:t>Differential </a:t>
             </a:r>
             <a:r>
-              <a:rPr lang="en-GB" sz="2000" dirty="0"/>
+              <a:rPr lang="en-GB" sz="2000" dirty="0">
+                <a:solidFill>
+                  <a:schemeClr val="accent6">
+                    <a:lumMod val="75000"/>
+                  </a:schemeClr>
+                </a:solidFill>
+              </a:rPr>
               <a:t>expression  </a:t>
             </a:r>
-            <a:endParaRPr lang="en-GB" sz="2000" dirty="0" smtClean="0"/>
+            <a:endParaRPr lang="en-GB" sz="2000" dirty="0" smtClean="0">
+              <a:solidFill>
+                <a:schemeClr val="accent6">
+                  <a:lumMod val="75000"/>
+                </a:schemeClr>
+              </a:solidFill>
+            </a:endParaRPr>
           </a:p>
           <a:p>
             <a:pPr lvl="1"/>
             <a:r>
-              <a:rPr lang="en-GB" sz="2000" dirty="0" smtClean="0"/>
+              <a:rPr lang="en-GB" sz="2000" dirty="0" smtClean="0">
+                <a:solidFill>
+                  <a:srgbClr val="CC0099"/>
+                </a:solidFill>
+              </a:rPr>
               <a:t>Enrichment</a:t>
             </a:r>
-            <a:endParaRPr lang="en-US" sz="2400" dirty="0"/>
+            <a:endParaRPr lang="en-US" sz="2400" dirty="0">
+              <a:solidFill>
+                <a:srgbClr val="CC0099"/>
+              </a:solidFill>
+            </a:endParaRPr>
           </a:p>
           <a:p>
             <a:pPr marL="0" indent="0">
@@ -5805,7 +6772,69 @@
             <a:pPr marL="0" indent="0">
               <a:buNone/>
             </a:pPr>
-            <a:endParaRPr lang="en-GB" sz="1200" dirty="0"/>
+            <a:r>
+              <a:rPr lang="en-GB" sz="1200" b="1" dirty="0" smtClean="0">
+                <a:solidFill>
+                  <a:srgbClr val="0000CC"/>
+                </a:solidFill>
+              </a:rPr>
+              <a:t>GEERT </a:t>
+            </a:r>
+            <a:r>
+              <a:rPr lang="en-GB" sz="1200" b="1" dirty="0" smtClean="0"/>
+              <a:t>– </a:t>
+            </a:r>
+            <a:r>
+              <a:rPr lang="en-GB" sz="1200" b="1" dirty="0" smtClean="0">
+                <a:solidFill>
+                  <a:srgbClr val="FF0000"/>
+                </a:solidFill>
+              </a:rPr>
+              <a:t>NIKOLAOS</a:t>
+            </a:r>
+            <a:r>
+              <a:rPr lang="en-GB" sz="1200" b="1" dirty="0" smtClean="0"/>
+              <a:t> – </a:t>
+            </a:r>
+            <a:r>
+              <a:rPr lang="en-GB" sz="1200" b="1" dirty="0" smtClean="0">
+                <a:solidFill>
+                  <a:srgbClr val="008000"/>
+                </a:solidFill>
+              </a:rPr>
+              <a:t>ADITHI</a:t>
+            </a:r>
+            <a:r>
+              <a:rPr lang="en-GB" sz="1200" b="1" dirty="0" smtClean="0"/>
+              <a:t> – </a:t>
+            </a:r>
+            <a:r>
+              <a:rPr lang="en-GB" sz="1200" b="1" dirty="0" smtClean="0">
+                <a:solidFill>
+                  <a:schemeClr val="accent6">
+                    <a:lumMod val="75000"/>
+                  </a:schemeClr>
+                </a:solidFill>
+              </a:rPr>
+              <a:t>MARCEL</a:t>
+            </a:r>
+            <a:r>
+              <a:rPr lang="en-GB" sz="1200" b="1" dirty="0" smtClean="0"/>
+              <a:t> - </a:t>
+            </a:r>
+            <a:r>
+              <a:rPr lang="en-GB" sz="1200" b="1" dirty="0" smtClean="0">
+                <a:solidFill>
+                  <a:srgbClr val="CC0099"/>
+                </a:solidFill>
+              </a:rPr>
+              <a:t>NICK</a:t>
+            </a:r>
+            <a:endParaRPr lang="en-GB" sz="1200" b="1" dirty="0">
+              <a:solidFill>
+                <a:srgbClr val="CC0099"/>
+              </a:solidFill>
+            </a:endParaRPr>
           </a:p>
           <a:p>
             <a:pPr marL="0" indent="0">
@@ -6178,17 +7207,6 @@
               </a:rPr>
               <a:t> list</a:t>
             </a:r>
-            <a:endParaRPr lang="en-US" sz="2800" b="1" dirty="0" smtClean="0">
-              <a:effectLst>
-                <a:outerShdw blurRad="38100" dist="38100" dir="2700000" algn="tl">
-                  <a:srgbClr val="000000">
-                    <a:alpha val="43137"/>
-                  </a:srgbClr>
-                </a:outerShdw>
-              </a:effectLst>
-              <a:latin typeface="Aharoni" panose="02010803020104030203" pitchFamily="2" charset="-79"/>
-              <a:cs typeface="Aharoni" panose="02010803020104030203" pitchFamily="2" charset="-79"/>
-            </a:endParaRPr>
           </a:p>
         </p:txBody>
       </p:sp>
@@ -6204,27 +7222,578 @@
   </p:clrMapOvr>
   <mc:AlternateContent xmlns:mc="http://schemas.openxmlformats.org/markup-compatibility/2006">
     <mc:Choice xmlns:p14="http://schemas.microsoft.com/office/powerpoint/2010/main" Requires="p14">
-      <p:transition spd="slow" p14:dur="2500">
-        <p:checker/>
-      </p:transition>
+      <p:transition p14:dur="0"/>
     </mc:Choice>
     <mc:Fallback>
-      <p:transition spd="slow">
-        <p:checker/>
-      </p:transition>
+      <p:transition/>
     </mc:Fallback>
   </mc:AlternateContent>
   <p:timing>
     <p:tnLst>
       <p:par>
-        <p:cTn id="1" dur="indefinite" restart="never" nodeType="tmRoot"/>
+        <p:cTn id="1" dur="indefinite" restart="never" nodeType="tmRoot">
+          <p:childTnLst>
+            <p:seq concurrent="1" nextAc="seek">
+              <p:cTn id="2" dur="indefinite" nodeType="mainSeq">
+                <p:childTnLst>
+                  <p:par>
+                    <p:cTn id="3" fill="hold">
+                      <p:stCondLst>
+                        <p:cond delay="indefinite"/>
+                      </p:stCondLst>
+                      <p:childTnLst>
+                        <p:par>
+                          <p:cTn id="4" fill="hold">
+                            <p:stCondLst>
+                              <p:cond delay="0"/>
+                            </p:stCondLst>
+                            <p:childTnLst>
+                              <p:par>
+                                <p:cTn id="5" presetID="1" presetClass="entr" presetSubtype="0" fill="hold" nodeType="clickEffect">
+                                  <p:stCondLst>
+                                    <p:cond delay="0"/>
+                                  </p:stCondLst>
+                                  <p:childTnLst>
+                                    <p:set>
+                                      <p:cBhvr>
+                                        <p:cTn id="6" dur="1" fill="hold">
+                                          <p:stCondLst>
+                                            <p:cond delay="9"/>
+                                          </p:stCondLst>
+                                        </p:cTn>
+                                        <p:tgtEl>
+                                          <p:spTgt spid="2">
+                                            <p:txEl>
+                                              <p:pRg st="12" end="12"/>
+                                            </p:txEl>
+                                          </p:spTgt>
+                                        </p:tgtEl>
+                                        <p:attrNameLst>
+                                          <p:attrName>style.visibility</p:attrName>
+                                        </p:attrNameLst>
+                                      </p:cBhvr>
+                                      <p:to>
+                                        <p:strVal val="visible"/>
+                                      </p:to>
+                                    </p:set>
+                                  </p:childTnLst>
+                                </p:cTn>
+                              </p:par>
+                              <p:par>
+                                <p:cTn id="7" presetID="1" presetClass="entr" presetSubtype="0" fill="hold" nodeType="withEffect">
+                                  <p:stCondLst>
+                                    <p:cond delay="0"/>
+                                  </p:stCondLst>
+                                  <p:childTnLst>
+                                    <p:set>
+                                      <p:cBhvr>
+                                        <p:cTn id="8" dur="1" fill="hold">
+                                          <p:stCondLst>
+                                            <p:cond delay="9"/>
+                                          </p:stCondLst>
+                                        </p:cTn>
+                                        <p:tgtEl>
+                                          <p:spTgt spid="2">
+                                            <p:txEl>
+                                              <p:pRg st="13" end="13"/>
+                                            </p:txEl>
+                                          </p:spTgt>
+                                        </p:tgtEl>
+                                        <p:attrNameLst>
+                                          <p:attrName>style.visibility</p:attrName>
+                                        </p:attrNameLst>
+                                      </p:cBhvr>
+                                      <p:to>
+                                        <p:strVal val="visible"/>
+                                      </p:to>
+                                    </p:set>
+                                  </p:childTnLst>
+                                </p:cTn>
+                              </p:par>
+                              <p:par>
+                                <p:cTn id="9" presetID="1" presetClass="entr" presetSubtype="0" fill="hold" nodeType="withEffect">
+                                  <p:stCondLst>
+                                    <p:cond delay="0"/>
+                                  </p:stCondLst>
+                                  <p:childTnLst>
+                                    <p:set>
+                                      <p:cBhvr>
+                                        <p:cTn id="10" dur="1" fill="hold">
+                                          <p:stCondLst>
+                                            <p:cond delay="9"/>
+                                          </p:stCondLst>
+                                        </p:cTn>
+                                        <p:tgtEl>
+                                          <p:spTgt spid="2">
+                                            <p:txEl>
+                                              <p:pRg st="14" end="14"/>
+                                            </p:txEl>
+                                          </p:spTgt>
+                                        </p:tgtEl>
+                                        <p:attrNameLst>
+                                          <p:attrName>style.visibility</p:attrName>
+                                        </p:attrNameLst>
+                                      </p:cBhvr>
+                                      <p:to>
+                                        <p:strVal val="visible"/>
+                                      </p:to>
+                                    </p:set>
+                                  </p:childTnLst>
+                                </p:cTn>
+                              </p:par>
+                              <p:par>
+                                <p:cTn id="11" presetID="1" presetClass="entr" presetSubtype="0" fill="hold" nodeType="withEffect">
+                                  <p:stCondLst>
+                                    <p:cond delay="0"/>
+                                  </p:stCondLst>
+                                  <p:childTnLst>
+                                    <p:set>
+                                      <p:cBhvr>
+                                        <p:cTn id="12" dur="1" fill="hold">
+                                          <p:stCondLst>
+                                            <p:cond delay="9"/>
+                                          </p:stCondLst>
+                                        </p:cTn>
+                                        <p:tgtEl>
+                                          <p:spTgt spid="2">
+                                            <p:txEl>
+                                              <p:pRg st="15" end="15"/>
+                                            </p:txEl>
+                                          </p:spTgt>
+                                        </p:tgtEl>
+                                        <p:attrNameLst>
+                                          <p:attrName>style.visibility</p:attrName>
+                                        </p:attrNameLst>
+                                      </p:cBhvr>
+                                      <p:to>
+                                        <p:strVal val="visible"/>
+                                      </p:to>
+                                    </p:set>
+                                  </p:childTnLst>
+                                </p:cTn>
+                              </p:par>
+                              <p:par>
+                                <p:cTn id="13" presetID="1" presetClass="entr" presetSubtype="0" fill="hold" nodeType="withEffect">
+                                  <p:stCondLst>
+                                    <p:cond delay="0"/>
+                                  </p:stCondLst>
+                                  <p:childTnLst>
+                                    <p:set>
+                                      <p:cBhvr>
+                                        <p:cTn id="14" dur="1" fill="hold">
+                                          <p:stCondLst>
+                                            <p:cond delay="9"/>
+                                          </p:stCondLst>
+                                        </p:cTn>
+                                        <p:tgtEl>
+                                          <p:spTgt spid="2">
+                                            <p:txEl>
+                                              <p:pRg st="16" end="16"/>
+                                            </p:txEl>
+                                          </p:spTgt>
+                                        </p:tgtEl>
+                                        <p:attrNameLst>
+                                          <p:attrName>style.visibility</p:attrName>
+                                        </p:attrNameLst>
+                                      </p:cBhvr>
+                                      <p:to>
+                                        <p:strVal val="visible"/>
+                                      </p:to>
+                                    </p:set>
+                                  </p:childTnLst>
+                                </p:cTn>
+                              </p:par>
+                              <p:par>
+                                <p:cTn id="15" presetID="1" presetClass="entr" presetSubtype="0" fill="hold" nodeType="withEffect">
+                                  <p:stCondLst>
+                                    <p:cond delay="0"/>
+                                  </p:stCondLst>
+                                  <p:childTnLst>
+                                    <p:set>
+                                      <p:cBhvr>
+                                        <p:cTn id="16" dur="1" fill="hold">
+                                          <p:stCondLst>
+                                            <p:cond delay="9"/>
+                                          </p:stCondLst>
+                                        </p:cTn>
+                                        <p:tgtEl>
+                                          <p:spTgt spid="2">
+                                            <p:txEl>
+                                              <p:pRg st="17" end="17"/>
+                                            </p:txEl>
+                                          </p:spTgt>
+                                        </p:tgtEl>
+                                        <p:attrNameLst>
+                                          <p:attrName>style.visibility</p:attrName>
+                                        </p:attrNameLst>
+                                      </p:cBhvr>
+                                      <p:to>
+                                        <p:strVal val="visible"/>
+                                      </p:to>
+                                    </p:set>
+                                  </p:childTnLst>
+                                </p:cTn>
+                              </p:par>
+                              <p:par>
+                                <p:cTn id="17" presetID="1" presetClass="entr" presetSubtype="0" fill="hold" nodeType="withEffect">
+                                  <p:stCondLst>
+                                    <p:cond delay="0"/>
+                                  </p:stCondLst>
+                                  <p:childTnLst>
+                                    <p:set>
+                                      <p:cBhvr>
+                                        <p:cTn id="18" dur="1" fill="hold">
+                                          <p:stCondLst>
+                                            <p:cond delay="9"/>
+                                          </p:stCondLst>
+                                        </p:cTn>
+                                        <p:tgtEl>
+                                          <p:spTgt spid="2">
+                                            <p:txEl>
+                                              <p:pRg st="18" end="18"/>
+                                            </p:txEl>
+                                          </p:spTgt>
+                                        </p:tgtEl>
+                                        <p:attrNameLst>
+                                          <p:attrName>style.visibility</p:attrName>
+                                        </p:attrNameLst>
+                                      </p:cBhvr>
+                                      <p:to>
+                                        <p:strVal val="visible"/>
+                                      </p:to>
+                                    </p:set>
+                                  </p:childTnLst>
+                                </p:cTn>
+                              </p:par>
+                              <p:par>
+                                <p:cTn id="19" presetID="1" presetClass="entr" presetSubtype="0" fill="hold" nodeType="withEffect">
+                                  <p:stCondLst>
+                                    <p:cond delay="0"/>
+                                  </p:stCondLst>
+                                  <p:childTnLst>
+                                    <p:set>
+                                      <p:cBhvr>
+                                        <p:cTn id="20" dur="1" fill="hold">
+                                          <p:stCondLst>
+                                            <p:cond delay="9"/>
+                                          </p:stCondLst>
+                                        </p:cTn>
+                                        <p:tgtEl>
+                                          <p:spTgt spid="2">
+                                            <p:txEl>
+                                              <p:pRg st="19" end="19"/>
+                                            </p:txEl>
+                                          </p:spTgt>
+                                        </p:tgtEl>
+                                        <p:attrNameLst>
+                                          <p:attrName>style.visibility</p:attrName>
+                                        </p:attrNameLst>
+                                      </p:cBhvr>
+                                      <p:to>
+                                        <p:strVal val="visible"/>
+                                      </p:to>
+                                    </p:set>
+                                  </p:childTnLst>
+                                </p:cTn>
+                              </p:par>
+                            </p:childTnLst>
+                          </p:cTn>
+                        </p:par>
+                      </p:childTnLst>
+                    </p:cTn>
+                  </p:par>
+                  <p:par>
+                    <p:cTn id="21" fill="hold">
+                      <p:stCondLst>
+                        <p:cond delay="indefinite"/>
+                      </p:stCondLst>
+                      <p:childTnLst>
+                        <p:par>
+                          <p:cTn id="22" fill="hold">
+                            <p:stCondLst>
+                              <p:cond delay="0"/>
+                            </p:stCondLst>
+                            <p:childTnLst>
+                              <p:par>
+                                <p:cTn id="23" presetID="1" presetClass="entr" presetSubtype="0" fill="hold" nodeType="clickEffect">
+                                  <p:stCondLst>
+                                    <p:cond delay="0"/>
+                                  </p:stCondLst>
+                                  <p:childTnLst>
+                                    <p:set>
+                                      <p:cBhvr>
+                                        <p:cTn id="24" dur="1" fill="hold">
+                                          <p:stCondLst>
+                                            <p:cond delay="9"/>
+                                          </p:stCondLst>
+                                        </p:cTn>
+                                        <p:tgtEl>
+                                          <p:spTgt spid="2">
+                                            <p:txEl>
+                                              <p:pRg st="24" end="24"/>
+                                            </p:txEl>
+                                          </p:spTgt>
+                                        </p:tgtEl>
+                                        <p:attrNameLst>
+                                          <p:attrName>style.visibility</p:attrName>
+                                        </p:attrNameLst>
+                                      </p:cBhvr>
+                                      <p:to>
+                                        <p:strVal val="visible"/>
+                                      </p:to>
+                                    </p:set>
+                                  </p:childTnLst>
+                                </p:cTn>
+                              </p:par>
+                              <p:par>
+                                <p:cTn id="25" presetID="1" presetClass="entr" presetSubtype="0" fill="hold" nodeType="withEffect">
+                                  <p:stCondLst>
+                                    <p:cond delay="0"/>
+                                  </p:stCondLst>
+                                  <p:childTnLst>
+                                    <p:set>
+                                      <p:cBhvr>
+                                        <p:cTn id="26" dur="1" fill="hold">
+                                          <p:stCondLst>
+                                            <p:cond delay="9"/>
+                                          </p:stCondLst>
+                                        </p:cTn>
+                                        <p:tgtEl>
+                                          <p:spTgt spid="2">
+                                            <p:txEl>
+                                              <p:pRg st="25" end="25"/>
+                                            </p:txEl>
+                                          </p:spTgt>
+                                        </p:tgtEl>
+                                        <p:attrNameLst>
+                                          <p:attrName>style.visibility</p:attrName>
+                                        </p:attrNameLst>
+                                      </p:cBhvr>
+                                      <p:to>
+                                        <p:strVal val="visible"/>
+                                      </p:to>
+                                    </p:set>
+                                  </p:childTnLst>
+                                </p:cTn>
+                              </p:par>
+                              <p:par>
+                                <p:cTn id="27" presetID="1" presetClass="entr" presetSubtype="0" fill="hold" nodeType="withEffect">
+                                  <p:stCondLst>
+                                    <p:cond delay="0"/>
+                                  </p:stCondLst>
+                                  <p:childTnLst>
+                                    <p:set>
+                                      <p:cBhvr>
+                                        <p:cTn id="28" dur="1" fill="hold">
+                                          <p:stCondLst>
+                                            <p:cond delay="9"/>
+                                          </p:stCondLst>
+                                        </p:cTn>
+                                        <p:tgtEl>
+                                          <p:spTgt spid="2">
+                                            <p:txEl>
+                                              <p:pRg st="26" end="26"/>
+                                            </p:txEl>
+                                          </p:spTgt>
+                                        </p:tgtEl>
+                                        <p:attrNameLst>
+                                          <p:attrName>style.visibility</p:attrName>
+                                        </p:attrNameLst>
+                                      </p:cBhvr>
+                                      <p:to>
+                                        <p:strVal val="visible"/>
+                                      </p:to>
+                                    </p:set>
+                                  </p:childTnLst>
+                                </p:cTn>
+                              </p:par>
+                              <p:par>
+                                <p:cTn id="29" presetID="1" presetClass="entr" presetSubtype="0" fill="hold" nodeType="withEffect">
+                                  <p:stCondLst>
+                                    <p:cond delay="0"/>
+                                  </p:stCondLst>
+                                  <p:childTnLst>
+                                    <p:set>
+                                      <p:cBhvr>
+                                        <p:cTn id="30" dur="1" fill="hold">
+                                          <p:stCondLst>
+                                            <p:cond delay="9"/>
+                                          </p:stCondLst>
+                                        </p:cTn>
+                                        <p:tgtEl>
+                                          <p:spTgt spid="2">
+                                            <p:txEl>
+                                              <p:pRg st="27" end="27"/>
+                                            </p:txEl>
+                                          </p:spTgt>
+                                        </p:tgtEl>
+                                        <p:attrNameLst>
+                                          <p:attrName>style.visibility</p:attrName>
+                                        </p:attrNameLst>
+                                      </p:cBhvr>
+                                      <p:to>
+                                        <p:strVal val="visible"/>
+                                      </p:to>
+                                    </p:set>
+                                  </p:childTnLst>
+                                </p:cTn>
+                              </p:par>
+                              <p:par>
+                                <p:cTn id="31" presetID="1" presetClass="entr" presetSubtype="0" fill="hold" nodeType="withEffect">
+                                  <p:stCondLst>
+                                    <p:cond delay="0"/>
+                                  </p:stCondLst>
+                                  <p:childTnLst>
+                                    <p:set>
+                                      <p:cBhvr>
+                                        <p:cTn id="32" dur="1" fill="hold">
+                                          <p:stCondLst>
+                                            <p:cond delay="9"/>
+                                          </p:stCondLst>
+                                        </p:cTn>
+                                        <p:tgtEl>
+                                          <p:spTgt spid="2">
+                                            <p:txEl>
+                                              <p:pRg st="28" end="28"/>
+                                            </p:txEl>
+                                          </p:spTgt>
+                                        </p:tgtEl>
+                                        <p:attrNameLst>
+                                          <p:attrName>style.visibility</p:attrName>
+                                        </p:attrNameLst>
+                                      </p:cBhvr>
+                                      <p:to>
+                                        <p:strVal val="visible"/>
+                                      </p:to>
+                                    </p:set>
+                                  </p:childTnLst>
+                                </p:cTn>
+                              </p:par>
+                              <p:par>
+                                <p:cTn id="33" presetID="1" presetClass="entr" presetSubtype="0" fill="hold" nodeType="withEffect">
+                                  <p:stCondLst>
+                                    <p:cond delay="0"/>
+                                  </p:stCondLst>
+                                  <p:childTnLst>
+                                    <p:set>
+                                      <p:cBhvr>
+                                        <p:cTn id="34" dur="1" fill="hold">
+                                          <p:stCondLst>
+                                            <p:cond delay="9"/>
+                                          </p:stCondLst>
+                                        </p:cTn>
+                                        <p:tgtEl>
+                                          <p:spTgt spid="2">
+                                            <p:txEl>
+                                              <p:pRg st="29" end="29"/>
+                                            </p:txEl>
+                                          </p:spTgt>
+                                        </p:tgtEl>
+                                        <p:attrNameLst>
+                                          <p:attrName>style.visibility</p:attrName>
+                                        </p:attrNameLst>
+                                      </p:cBhvr>
+                                      <p:to>
+                                        <p:strVal val="visible"/>
+                                      </p:to>
+                                    </p:set>
+                                  </p:childTnLst>
+                                </p:cTn>
+                              </p:par>
+                              <p:par>
+                                <p:cTn id="35" presetID="1" presetClass="entr" presetSubtype="0" fill="hold" nodeType="withEffect">
+                                  <p:stCondLst>
+                                    <p:cond delay="0"/>
+                                  </p:stCondLst>
+                                  <p:childTnLst>
+                                    <p:set>
+                                      <p:cBhvr>
+                                        <p:cTn id="36" dur="1" fill="hold">
+                                          <p:stCondLst>
+                                            <p:cond delay="9"/>
+                                          </p:stCondLst>
+                                        </p:cTn>
+                                        <p:tgtEl>
+                                          <p:spTgt spid="2">
+                                            <p:txEl>
+                                              <p:pRg st="30" end="30"/>
+                                            </p:txEl>
+                                          </p:spTgt>
+                                        </p:tgtEl>
+                                        <p:attrNameLst>
+                                          <p:attrName>style.visibility</p:attrName>
+                                        </p:attrNameLst>
+                                      </p:cBhvr>
+                                      <p:to>
+                                        <p:strVal val="visible"/>
+                                      </p:to>
+                                    </p:set>
+                                  </p:childTnLst>
+                                </p:cTn>
+                              </p:par>
+                              <p:par>
+                                <p:cTn id="37" presetID="1" presetClass="entr" presetSubtype="0" fill="hold" nodeType="withEffect">
+                                  <p:stCondLst>
+                                    <p:cond delay="0"/>
+                                  </p:stCondLst>
+                                  <p:childTnLst>
+                                    <p:set>
+                                      <p:cBhvr>
+                                        <p:cTn id="38" dur="1" fill="hold">
+                                          <p:stCondLst>
+                                            <p:cond delay="9"/>
+                                          </p:stCondLst>
+                                        </p:cTn>
+                                        <p:tgtEl>
+                                          <p:spTgt spid="2">
+                                            <p:txEl>
+                                              <p:pRg st="31" end="31"/>
+                                            </p:txEl>
+                                          </p:spTgt>
+                                        </p:tgtEl>
+                                        <p:attrNameLst>
+                                          <p:attrName>style.visibility</p:attrName>
+                                        </p:attrNameLst>
+                                      </p:cBhvr>
+                                      <p:to>
+                                        <p:strVal val="visible"/>
+                                      </p:to>
+                                    </p:set>
+                                  </p:childTnLst>
+                                </p:cTn>
+                              </p:par>
+                            </p:childTnLst>
+                          </p:cTn>
+                        </p:par>
+                      </p:childTnLst>
+                    </p:cTn>
+                  </p:par>
+                </p:childTnLst>
+              </p:cTn>
+              <p:prevCondLst>
+                <p:cond evt="onPrev" delay="0">
+                  <p:tgtEl>
+                    <p:sldTgt/>
+                  </p:tgtEl>
+                </p:cond>
+              </p:prevCondLst>
+              <p:nextCondLst>
+                <p:cond evt="onNext" delay="0">
+                  <p:tgtEl>
+                    <p:sldTgt/>
+                  </p:tgtEl>
+                </p:cond>
+              </p:nextCondLst>
+            </p:seq>
+          </p:childTnLst>
+        </p:cTn>
       </p:par>
     </p:tnLst>
   </p:timing>
 </p:sld>
 </file>
 
-<file path=ppt/slides/slide5.xml><?xml version="1.0" encoding="utf-8"?>
+<file path=ppt/slides/slide6.xml><?xml version="1.0" encoding="utf-8"?>
 <p:sld xmlns:a="http://schemas.openxmlformats.org/drawingml/2006/main" xmlns:r="http://schemas.openxmlformats.org/officeDocument/2006/relationships" xmlns:p="http://schemas.openxmlformats.org/presentationml/2006/main">
   <p:cSld>
     <p:spTree>
@@ -6935,7 +8504,7 @@
 </p:sld>
 </file>
 
-<file path=ppt/slides/slide6.xml><?xml version="1.0" encoding="utf-8"?>
+<file path=ppt/slides/slide7.xml><?xml version="1.0" encoding="utf-8"?>
 <p:sld xmlns:a="http://schemas.openxmlformats.org/drawingml/2006/main" xmlns:r="http://schemas.openxmlformats.org/officeDocument/2006/relationships" xmlns:p="http://schemas.openxmlformats.org/presentationml/2006/main">
   <p:cSld>
     <p:spTree>
@@ -6964,7 +8533,7 @@
         </p:nvSpPr>
         <p:spPr>
           <a:xfrm>
-            <a:off x="381000" y="304800"/>
+            <a:off x="333375" y="368300"/>
             <a:ext cx="8305800" cy="533400"/>
           </a:xfrm>
         </p:spPr>
@@ -6986,7 +8555,7 @@
                 <a:latin typeface="Aharoni" panose="02010803020104030203" pitchFamily="2" charset="-79"/>
                 <a:cs typeface="Aharoni" panose="02010803020104030203" pitchFamily="2" charset="-79"/>
               </a:rPr>
-              <a:t>Background</a:t>
+              <a:t>Project kickoff</a:t>
             </a:r>
             <a:endParaRPr lang="en-US" b="1" dirty="0">
               <a:effectLst>
@@ -7014,7 +8583,7 @@
         </p:nvSpPr>
         <p:spPr>
           <a:xfrm>
-            <a:off x="457200" y="1212850"/>
+            <a:off x="457200" y="1295400"/>
             <a:ext cx="8229600" cy="5181599"/>
           </a:xfrm>
         </p:spPr>
@@ -7022,21 +8591,13 @@
           <a:bodyPr/>
           <a:lstStyle/>
           <a:p>
-            <a:pPr marL="0" indent="0">
-              <a:buNone/>
-            </a:pPr>
-            <a:endParaRPr lang="en-US" sz="2800" dirty="0" smtClean="0"/>
-          </a:p>
-          <a:p>
             <a:r>
               <a:rPr lang="en-US" sz="2800" b="1" dirty="0" smtClean="0"/>
-              <a:t>Project: Differential gene expression in yeast</a:t>
-            </a:r>
-          </a:p>
-          <a:p>
+              <a:t>Discussed</a:t>
+            </a:r>
             <a:r>
               <a:rPr lang="en-US" sz="2800" b="1" dirty="0"/>
-              <a:t>Discussed:</a:t>
+              <a:t>:</a:t>
             </a:r>
             <a:endParaRPr lang="en-US" sz="3600" b="1" dirty="0"/>
           </a:p>
@@ -7051,36 +8612,26 @@
             <a:pPr lvl="1"/>
             <a:r>
               <a:rPr lang="en-US" sz="2800" dirty="0"/>
-              <a:t>Assign priorities to the parts of the pipeline</a:t>
+              <a:t>Assign priorities to the parts of the </a:t>
+            </a:r>
+            <a:r>
+              <a:rPr lang="en-US" sz="2800" dirty="0" smtClean="0"/>
+              <a:t>pipeline</a:t>
             </a:r>
           </a:p>
           <a:p>
             <a:pPr lvl="1"/>
             <a:r>
-              <a:rPr lang="en-US" sz="2800" dirty="0" smtClean="0"/>
-              <a:t>Version </a:t>
-            </a:r>
-            <a:r>
-              <a:rPr lang="en-US" sz="2800" dirty="0"/>
-              <a:t>control and project </a:t>
-            </a:r>
-            <a:r>
-              <a:rPr lang="en-US" sz="2800" dirty="0" smtClean="0"/>
-              <a:t>management</a:t>
+              <a:rPr lang="en-US" sz="2800" b="1" dirty="0" smtClean="0"/>
+              <a:t>Draft planning</a:t>
             </a:r>
           </a:p>
           <a:p>
             <a:pPr lvl="1"/>
             <a:r>
-              <a:rPr lang="en-US" sz="2800" dirty="0"/>
-              <a:t>Draft planning</a:t>
-            </a:r>
-          </a:p>
-          <a:p>
-            <a:pPr marL="228600" lvl="1" indent="0">
-              <a:buNone/>
-            </a:pPr>
-            <a:endParaRPr lang="en-US" sz="2800" dirty="0"/>
+              <a:rPr lang="en-US" sz="2800" b="1" dirty="0" smtClean="0"/>
+              <a:t>Source control and project management</a:t>
+            </a:r>
           </a:p>
           <a:p>
             <a:endParaRPr lang="en-US" dirty="0"/>
@@ -7194,22 +8745,17 @@
           <a:prstGeom prst="rect">
             <a:avLst/>
           </a:prstGeom>
-          <a:noFill/>
-          <a:extLst>
-            <a:ext uri="{909E8E84-426E-40DD-AFC4-6F175D3DCCD1}">
-              <a14:hiddenFill xmlns:a14="http://schemas.microsoft.com/office/drawing/2010/main">
-                <a:solidFill>
-                  <a:srgbClr val="FFFFFF"/>
-                </a:solidFill>
-              </a14:hiddenFill>
-            </a:ext>
-          </a:extLst>
+          <a:solidFill>
+            <a:schemeClr val="bg2">
+              <a:lumMod val="75000"/>
+            </a:schemeClr>
+          </a:solidFill>
         </p:spPr>
       </p:pic>
     </p:spTree>
     <p:extLst>
       <p:ext uri="{BB962C8B-B14F-4D97-AF65-F5344CB8AC3E}">
-        <p14:creationId xmlns:p14="http://schemas.microsoft.com/office/powerpoint/2010/main" val="1422724304"/>
+        <p14:creationId xmlns:p14="http://schemas.microsoft.com/office/powerpoint/2010/main" val="3686480584"/>
       </p:ext>
     </p:extLst>
   </p:cSld>
@@ -7226,7 +8772,7 @@
 </p:sld>
 </file>
 
-<file path=ppt/slides/slide7.xml><?xml version="1.0" encoding="utf-8"?>
+<file path=ppt/slides/slide8.xml><?xml version="1.0" encoding="utf-8"?>
 <p:sld xmlns:a="http://schemas.openxmlformats.org/drawingml/2006/main" xmlns:r="http://schemas.openxmlformats.org/officeDocument/2006/relationships" xmlns:p="http://schemas.openxmlformats.org/presentationml/2006/main">
   <p:cSld>
     <p:spTree>
@@ -7525,7 +9071,7 @@
 </p:sld>
 </file>
 
-<file path=ppt/slides/slide8.xml><?xml version="1.0" encoding="utf-8"?>
+<file path=ppt/slides/slide9.xml><?xml version="1.0" encoding="utf-8"?>
 <p:sld xmlns:a="http://schemas.openxmlformats.org/drawingml/2006/main" xmlns:r="http://schemas.openxmlformats.org/officeDocument/2006/relationships" xmlns:p="http://schemas.openxmlformats.org/presentationml/2006/main">
   <p:cSld>
     <p:spTree>
@@ -7786,278 +9332,6 @@
     <p:extLst>
       <p:ext uri="{BB962C8B-B14F-4D97-AF65-F5344CB8AC3E}">
         <p14:creationId xmlns:p14="http://schemas.microsoft.com/office/powerpoint/2010/main" val="4108902384"/>
-      </p:ext>
-    </p:extLst>
-  </p:cSld>
-  <p:clrMapOvr>
-    <a:masterClrMapping/>
-  </p:clrMapOvr>
-  <p:timing>
-    <p:tnLst>
-      <p:par>
-        <p:cTn id="1" dur="indefinite" restart="never" nodeType="tmRoot"/>
-      </p:par>
-    </p:tnLst>
-  </p:timing>
-</p:sld>
-</file>
-
-<file path=ppt/slides/slide9.xml><?xml version="1.0" encoding="utf-8"?>
-<p:sld xmlns:a="http://schemas.openxmlformats.org/drawingml/2006/main" xmlns:r="http://schemas.openxmlformats.org/officeDocument/2006/relationships" xmlns:p="http://schemas.openxmlformats.org/presentationml/2006/main">
-  <p:cSld>
-    <p:spTree>
-      <p:nvGrpSpPr>
-        <p:cNvPr id="1" name=""/>
-        <p:cNvGrpSpPr/>
-        <p:nvPr/>
-      </p:nvGrpSpPr>
-      <p:grpSpPr>
-        <a:xfrm>
-          <a:off x="0" y="0"/>
-          <a:ext cx="0" cy="0"/>
-          <a:chOff x="0" y="0"/>
-          <a:chExt cx="0" cy="0"/>
-        </a:xfrm>
-      </p:grpSpPr>
-      <p:sp>
-        <p:nvSpPr>
-          <p:cNvPr id="3" name="Title 2"/>
-          <p:cNvSpPr>
-            <a:spLocks noGrp="1"/>
-          </p:cNvSpPr>
-          <p:nvPr>
-            <p:ph type="title"/>
-          </p:nvPr>
-        </p:nvSpPr>
-        <p:spPr>
-          <a:xfrm>
-            <a:off x="381000" y="304800"/>
-            <a:ext cx="8305800" cy="533400"/>
-          </a:xfrm>
-        </p:spPr>
-        <p:txBody>
-          <a:bodyPr>
-            <a:normAutofit fontScale="90000"/>
-          </a:bodyPr>
-          <a:lstStyle/>
-          <a:p>
-            <a:r>
-              <a:rPr lang="en-US" b="1" dirty="0" smtClean="0">
-                <a:effectLst>
-                  <a:outerShdw blurRad="38100" dist="38100" dir="2700000" algn="tl">
-                    <a:srgbClr val="000000">
-                      <a:alpha val="43137"/>
-                    </a:srgbClr>
-                  </a:outerShdw>
-                </a:effectLst>
-                <a:latin typeface="Aharoni" panose="02010803020104030203" pitchFamily="2" charset="-79"/>
-                <a:cs typeface="Aharoni" panose="02010803020104030203" pitchFamily="2" charset="-79"/>
-              </a:rPr>
-              <a:t>Project-progress</a:t>
-            </a:r>
-            <a:endParaRPr lang="en-US" b="1" dirty="0">
-              <a:effectLst>
-                <a:outerShdw blurRad="38100" dist="38100" dir="2700000" algn="tl">
-                  <a:srgbClr val="000000">
-                    <a:alpha val="43137"/>
-                  </a:srgbClr>
-                </a:outerShdw>
-              </a:effectLst>
-              <a:latin typeface="Aharoni" panose="02010803020104030203" pitchFamily="2" charset="-79"/>
-              <a:cs typeface="Aharoni" panose="02010803020104030203" pitchFamily="2" charset="-79"/>
-            </a:endParaRPr>
-          </a:p>
-        </p:txBody>
-      </p:sp>
-      <p:sp>
-        <p:nvSpPr>
-          <p:cNvPr id="2" name="Content Placeholder 1"/>
-          <p:cNvSpPr>
-            <a:spLocks noGrp="1"/>
-          </p:cNvSpPr>
-          <p:nvPr>
-            <p:ph idx="1"/>
-          </p:nvPr>
-        </p:nvSpPr>
-        <p:spPr>
-          <a:xfrm>
-            <a:off x="457200" y="1447800"/>
-            <a:ext cx="8229600" cy="5181599"/>
-          </a:xfrm>
-        </p:spPr>
-        <p:txBody>
-          <a:bodyPr>
-            <a:normAutofit/>
-          </a:bodyPr>
-          <a:lstStyle/>
-          <a:p>
-            <a:r>
-              <a:rPr lang="en-US" sz="3600" b="1" dirty="0"/>
-              <a:t>Run suggested protocol on server 15</a:t>
-            </a:r>
-          </a:p>
-          <a:p>
-            <a:pPr lvl="1"/>
-            <a:r>
-              <a:rPr lang="en-US" sz="3200" dirty="0"/>
-              <a:t>Become familiar with the </a:t>
-            </a:r>
-            <a:r>
-              <a:rPr lang="en-US" sz="3200" dirty="0" smtClean="0"/>
-              <a:t>different components of the pipeline and the pipeline as a whole</a:t>
-            </a:r>
-            <a:endParaRPr lang="en-US" sz="3200" dirty="0"/>
-          </a:p>
-          <a:p>
-            <a:pPr lvl="1"/>
-            <a:r>
-              <a:rPr lang="en-US" sz="3200" dirty="0"/>
-              <a:t>Evaluate it for backbone usage</a:t>
-            </a:r>
-          </a:p>
-          <a:p>
-            <a:pPr lvl="1"/>
-            <a:r>
-              <a:rPr lang="en-US" sz="3200" dirty="0"/>
-              <a:t>Creating a set of training files we can use to program each individual step</a:t>
-            </a:r>
-          </a:p>
-          <a:p>
-            <a:pPr lvl="1"/>
-            <a:r>
-              <a:rPr lang="en-US" sz="3200" dirty="0" smtClean="0"/>
-              <a:t>Compare the </a:t>
-            </a:r>
-            <a:r>
-              <a:rPr lang="en-US" sz="3200" dirty="0"/>
-              <a:t>scientific results from the paper</a:t>
-            </a:r>
-          </a:p>
-        </p:txBody>
-      </p:sp>
-      <p:sp>
-        <p:nvSpPr>
-          <p:cNvPr id="5" name="Title 1"/>
-          <p:cNvSpPr txBox="1">
-            <a:spLocks/>
-          </p:cNvSpPr>
-          <p:nvPr/>
-        </p:nvSpPr>
-        <p:spPr>
-          <a:xfrm>
-            <a:off x="190500" y="908050"/>
-            <a:ext cx="1828800" cy="304800"/>
-          </a:xfrm>
-          <a:prstGeom prst="rect">
-            <a:avLst/>
-          </a:prstGeom>
-        </p:spPr>
-        <p:txBody>
-          <a:bodyPr vert="horz" lIns="91440" tIns="45720" rIns="91440" bIns="45720" rtlCol="0" anchor="b">
-            <a:normAutofit fontScale="55000" lnSpcReduction="20000"/>
-          </a:bodyPr>
-          <a:lstStyle>
-            <a:lvl1pPr algn="r" defTabSz="914400" rtl="0" eaLnBrk="1" latinLnBrk="0" hangingPunct="1">
-              <a:spcBef>
-                <a:spcPct val="0"/>
-              </a:spcBef>
-              <a:buNone/>
-              <a:defRPr sz="2800" kern="1200">
-                <a:gradFill>
-                  <a:gsLst>
-                    <a:gs pos="0">
-                      <a:schemeClr val="tx1">
-                        <a:lumMod val="50000"/>
-                      </a:schemeClr>
-                    </a:gs>
-                    <a:gs pos="61000">
-                      <a:schemeClr val="tx1"/>
-                    </a:gs>
-                  </a:gsLst>
-                  <a:lin ang="5400000" scaled="0"/>
-                </a:gradFill>
-                <a:effectLst/>
-                <a:latin typeface="+mj-lt"/>
-                <a:ea typeface="+mj-ea"/>
-                <a:cs typeface="+mj-cs"/>
-              </a:defRPr>
-            </a:lvl1pPr>
-          </a:lstStyle>
-          <a:p>
-            <a:pPr algn="l"/>
-            <a:r>
-              <a:rPr lang="en-US" dirty="0" smtClean="0">
-                <a:effectLst>
-                  <a:outerShdw blurRad="38100" dist="38100" dir="2700000" algn="tl">
-                    <a:srgbClr val="000000">
-                      <a:alpha val="43137"/>
-                    </a:srgbClr>
-                  </a:outerShdw>
-                </a:effectLst>
-                <a:latin typeface="Aharoni" panose="02010803020104030203" pitchFamily="2" charset="-79"/>
-                <a:cs typeface="Aharoni" panose="02010803020104030203" pitchFamily="2" charset="-79"/>
-              </a:rPr>
-              <a:t>Mango</a:t>
-            </a:r>
-            <a:endParaRPr lang="en-US" dirty="0">
-              <a:effectLst>
-                <a:outerShdw blurRad="38100" dist="38100" dir="2700000" algn="tl">
-                  <a:srgbClr val="000000">
-                    <a:alpha val="43137"/>
-                  </a:srgbClr>
-                </a:outerShdw>
-              </a:effectLst>
-              <a:latin typeface="Aharoni" panose="02010803020104030203" pitchFamily="2" charset="-79"/>
-              <a:cs typeface="Aharoni" panose="02010803020104030203" pitchFamily="2" charset="-79"/>
-            </a:endParaRPr>
-          </a:p>
-        </p:txBody>
-      </p:sp>
-      <p:pic>
-        <p:nvPicPr>
-          <p:cNvPr id="6" name="Picture 3" descr="C:\Users\destreek\Downloads\1-140219130T0.gif"/>
-          <p:cNvPicPr>
-            <a:picLocks noChangeAspect="1" noChangeArrowheads="1" noCrop="1"/>
-          </p:cNvPicPr>
-          <p:nvPr/>
-        </p:nvPicPr>
-        <p:blipFill>
-          <a:blip r:embed="rId3" cstate="print">
-            <a:extLst>
-              <a:ext uri="{28A0092B-C50C-407E-A947-70E740481C1C}">
-                <a14:useLocalDpi xmlns:a14="http://schemas.microsoft.com/office/drawing/2010/main" val="0"/>
-              </a:ext>
-            </a:extLst>
-          </a:blip>
-          <a:srcRect/>
-          <a:stretch>
-            <a:fillRect/>
-          </a:stretch>
-        </p:blipFill>
-        <p:spPr bwMode="auto">
-          <a:xfrm>
-            <a:off x="304800" y="101600"/>
-            <a:ext cx="604837" cy="806450"/>
-          </a:xfrm>
-          <a:prstGeom prst="rect">
-            <a:avLst/>
-          </a:prstGeom>
-          <a:noFill/>
-          <a:extLst>
-            <a:ext uri="{909E8E84-426E-40DD-AFC4-6F175D3DCCD1}">
-              <a14:hiddenFill xmlns:a14="http://schemas.microsoft.com/office/drawing/2010/main">
-                <a:solidFill>
-                  <a:srgbClr val="FFFFFF"/>
-                </a:solidFill>
-              </a14:hiddenFill>
-            </a:ext>
-          </a:extLst>
-        </p:spPr>
-      </p:pic>
-    </p:spTree>
-    <p:extLst>
-      <p:ext uri="{BB962C8B-B14F-4D97-AF65-F5344CB8AC3E}">
-        <p14:creationId xmlns:p14="http://schemas.microsoft.com/office/powerpoint/2010/main" val="897774434"/>
       </p:ext>
     </p:extLst>
   </p:cSld>

</xml_diff>